<commit_message>
DEV_NOTE 110924.2 change the ppt to show a commit in git gui
</commit_message>
<xml_diff>
--- a/BREAULT SWD TRAINING.pptx
+++ b/BREAULT SWD TRAINING.pptx
@@ -12,12 +12,13 @@
     <p:sldId id="260" r:id="rId6"/>
     <p:sldId id="262" r:id="rId7"/>
     <p:sldId id="261" r:id="rId8"/>
-    <p:sldId id="266" r:id="rId9"/>
-    <p:sldId id="264" r:id="rId10"/>
-    <p:sldId id="265" r:id="rId11"/>
-    <p:sldId id="263" r:id="rId12"/>
-    <p:sldId id="267" r:id="rId13"/>
-    <p:sldId id="268" r:id="rId14"/>
+    <p:sldId id="268" r:id="rId9"/>
+    <p:sldId id="267" r:id="rId10"/>
+    <p:sldId id="264" r:id="rId11"/>
+    <p:sldId id="266" r:id="rId12"/>
+    <p:sldId id="265" r:id="rId13"/>
+    <p:sldId id="269" r:id="rId14"/>
+    <p:sldId id="263" r:id="rId15"/>
   </p:sldIdLst>
   <p:sldSz cx="12192000" cy="6858000"/>
   <p:notesSz cx="6858000" cy="9144000"/>
@@ -12588,6 +12589,557 @@
           <p:cNvPr id="2" name="Title 1">
             <a:extLst>
               <a:ext uri="{FF2B5EF4-FFF2-40B4-BE49-F238E27FC236}">
+                <a16:creationId xmlns:a16="http://schemas.microsoft.com/office/drawing/2014/main" id="{940A8AC8-75DF-B1EF-EF4E-3B0B9AF067DA}"/>
+              </a:ext>
+            </a:extLst>
+          </p:cNvPr>
+          <p:cNvSpPr>
+            <a:spLocks noGrp="1"/>
+          </p:cNvSpPr>
+          <p:nvPr>
+            <p:ph type="title"/>
+          </p:nvPr>
+        </p:nvSpPr>
+        <p:spPr/>
+        <p:txBody>
+          <a:bodyPr/>
+          <a:lstStyle/>
+          <a:p>
+            <a:r>
+              <a:rPr lang="en-US" dirty="0"/>
+              <a:t>Commits in bash</a:t>
+            </a:r>
+          </a:p>
+        </p:txBody>
+      </p:sp>
+      <p:pic>
+        <p:nvPicPr>
+          <p:cNvPr id="5" name="Content Placeholder 4">
+            <a:extLst>
+              <a:ext uri="{FF2B5EF4-FFF2-40B4-BE49-F238E27FC236}">
+                <a16:creationId xmlns:a16="http://schemas.microsoft.com/office/drawing/2014/main" id="{F8560C1A-7386-18D9-9A51-B40E593F25C8}"/>
+              </a:ext>
+            </a:extLst>
+          </p:cNvPr>
+          <p:cNvPicPr>
+            <a:picLocks noGrp="1" noChangeAspect="1"/>
+          </p:cNvPicPr>
+          <p:nvPr>
+            <p:ph idx="1"/>
+          </p:nvPr>
+        </p:nvPicPr>
+        <p:blipFill>
+          <a:blip r:embed="rId2"/>
+          <a:stretch>
+            <a:fillRect/>
+          </a:stretch>
+        </p:blipFill>
+        <p:spPr>
+          <a:xfrm>
+            <a:off x="5160397" y="1948875"/>
+            <a:ext cx="6782497" cy="2761445"/>
+          </a:xfrm>
+        </p:spPr>
+      </p:pic>
+      <p:sp>
+        <p:nvSpPr>
+          <p:cNvPr id="6" name="TextBox 5">
+            <a:extLst>
+              <a:ext uri="{FF2B5EF4-FFF2-40B4-BE49-F238E27FC236}">
+                <a16:creationId xmlns:a16="http://schemas.microsoft.com/office/drawing/2014/main" id="{4B3908E8-E7C2-0A08-F649-4D1054BB9D7F}"/>
+              </a:ext>
+            </a:extLst>
+          </p:cNvPr>
+          <p:cNvSpPr txBox="1"/>
+          <p:nvPr/>
+        </p:nvSpPr>
+        <p:spPr>
+          <a:xfrm>
+            <a:off x="730370" y="2097088"/>
+            <a:ext cx="4268797" cy="3162019"/>
+          </a:xfrm>
+          <a:prstGeom prst="rect">
+            <a:avLst/>
+          </a:prstGeom>
+          <a:noFill/>
+        </p:spPr>
+        <p:txBody>
+          <a:bodyPr wrap="none" rtlCol="0">
+            <a:spAutoFit/>
+          </a:bodyPr>
+          <a:lstStyle/>
+          <a:p>
+            <a:pPr marL="0" marR="0">
+              <a:lnSpc>
+                <a:spcPct val="107000"/>
+              </a:lnSpc>
+              <a:spcBef>
+                <a:spcPts val="0"/>
+              </a:spcBef>
+              <a:spcAft>
+                <a:spcPts val="800"/>
+              </a:spcAft>
+            </a:pPr>
+            <a:r>
+              <a:rPr lang="en-US" sz="1800" i="1" kern="100" dirty="0">
+                <a:effectLst/>
+                <a:latin typeface="Aptos" panose="020B0004020202020204" pitchFamily="34" charset="0"/>
+                <a:ea typeface="Aptos" panose="020B0004020202020204" pitchFamily="34" charset="0"/>
+                <a:cs typeface="Times New Roman" panose="02020603050405020304" pitchFamily="18" charset="0"/>
+              </a:rPr>
+              <a:t>git </a:t>
+            </a:r>
+            <a:r>
+              <a:rPr lang="en-US" sz="1800" i="1" kern="100" dirty="0" err="1">
+                <a:effectLst/>
+                <a:latin typeface="Aptos" panose="020B0004020202020204" pitchFamily="34" charset="0"/>
+                <a:ea typeface="Aptos" panose="020B0004020202020204" pitchFamily="34" charset="0"/>
+                <a:cs typeface="Times New Roman" panose="02020603050405020304" pitchFamily="18" charset="0"/>
+              </a:rPr>
+              <a:t>init</a:t>
+            </a:r>
+            <a:r>
+              <a:rPr lang="en-US" sz="1800" i="1" kern="100" dirty="0">
+                <a:effectLst/>
+                <a:latin typeface="Aptos" panose="020B0004020202020204" pitchFamily="34" charset="0"/>
+                <a:ea typeface="Aptos" panose="020B0004020202020204" pitchFamily="34" charset="0"/>
+                <a:cs typeface="Times New Roman" panose="02020603050405020304" pitchFamily="18" charset="0"/>
+              </a:rPr>
+              <a:t> -b &lt;name of the local branch&gt;</a:t>
+            </a:r>
+            <a:endParaRPr lang="en-US" sz="1800" kern="100" dirty="0">
+              <a:effectLst/>
+              <a:latin typeface="Aptos" panose="020B0004020202020204" pitchFamily="34" charset="0"/>
+              <a:ea typeface="Aptos" panose="020B0004020202020204" pitchFamily="34" charset="0"/>
+              <a:cs typeface="Times New Roman" panose="02020603050405020304" pitchFamily="18" charset="0"/>
+            </a:endParaRPr>
+          </a:p>
+          <a:p>
+            <a:pPr marL="0" marR="0">
+              <a:lnSpc>
+                <a:spcPct val="107000"/>
+              </a:lnSpc>
+              <a:spcBef>
+                <a:spcPts val="0"/>
+              </a:spcBef>
+              <a:spcAft>
+                <a:spcPts val="800"/>
+              </a:spcAft>
+            </a:pPr>
+            <a:r>
+              <a:rPr lang="en-US" sz="1800" i="1" kern="100" dirty="0">
+                <a:effectLst/>
+                <a:latin typeface="Aptos" panose="020B0004020202020204" pitchFamily="34" charset="0"/>
+                <a:ea typeface="Aptos" panose="020B0004020202020204" pitchFamily="34" charset="0"/>
+                <a:cs typeface="Times New Roman" panose="02020603050405020304" pitchFamily="18" charset="0"/>
+              </a:rPr>
+              <a:t>Git checkout -b &lt;name of branch&gt;</a:t>
+            </a:r>
+            <a:endParaRPr lang="en-US" sz="1800" kern="100" dirty="0">
+              <a:effectLst/>
+              <a:latin typeface="Aptos" panose="020B0004020202020204" pitchFamily="34" charset="0"/>
+              <a:ea typeface="Aptos" panose="020B0004020202020204" pitchFamily="34" charset="0"/>
+              <a:cs typeface="Times New Roman" panose="02020603050405020304" pitchFamily="18" charset="0"/>
+            </a:endParaRPr>
+          </a:p>
+          <a:p>
+            <a:pPr marL="0" marR="0">
+              <a:lnSpc>
+                <a:spcPct val="107000"/>
+              </a:lnSpc>
+              <a:spcBef>
+                <a:spcPts val="0"/>
+              </a:spcBef>
+              <a:spcAft>
+                <a:spcPts val="800"/>
+              </a:spcAft>
+            </a:pPr>
+            <a:r>
+              <a:rPr lang="en-US" sz="1800" kern="100" dirty="0">
+                <a:effectLst/>
+                <a:latin typeface="Aptos" panose="020B0004020202020204" pitchFamily="34" charset="0"/>
+                <a:ea typeface="Aptos" panose="020B0004020202020204" pitchFamily="34" charset="0"/>
+                <a:cs typeface="Times New Roman" panose="02020603050405020304" pitchFamily="18" charset="0"/>
+              </a:rPr>
+              <a:t>Add the files to your current local Branch:</a:t>
+            </a:r>
+          </a:p>
+          <a:p>
+            <a:pPr marL="0" marR="0">
+              <a:lnSpc>
+                <a:spcPct val="107000"/>
+              </a:lnSpc>
+              <a:spcBef>
+                <a:spcPts val="0"/>
+              </a:spcBef>
+              <a:spcAft>
+                <a:spcPts val="800"/>
+              </a:spcAft>
+            </a:pPr>
+            <a:r>
+              <a:rPr lang="en-US" sz="1800" i="1" kern="100" dirty="0">
+                <a:effectLst/>
+                <a:latin typeface="Aptos" panose="020B0004020202020204" pitchFamily="34" charset="0"/>
+                <a:ea typeface="Aptos" panose="020B0004020202020204" pitchFamily="34" charset="0"/>
+                <a:cs typeface="Times New Roman" panose="02020603050405020304" pitchFamily="18" charset="0"/>
+              </a:rPr>
+              <a:t>git add .</a:t>
+            </a:r>
+            <a:endParaRPr lang="en-US" sz="1800" kern="100" dirty="0">
+              <a:effectLst/>
+              <a:latin typeface="Aptos" panose="020B0004020202020204" pitchFamily="34" charset="0"/>
+              <a:ea typeface="Aptos" panose="020B0004020202020204" pitchFamily="34" charset="0"/>
+              <a:cs typeface="Times New Roman" panose="02020603050405020304" pitchFamily="18" charset="0"/>
+            </a:endParaRPr>
+          </a:p>
+          <a:p>
+            <a:pPr marL="0" marR="0">
+              <a:lnSpc>
+                <a:spcPct val="107000"/>
+              </a:lnSpc>
+              <a:spcBef>
+                <a:spcPts val="0"/>
+              </a:spcBef>
+              <a:spcAft>
+                <a:spcPts val="800"/>
+              </a:spcAft>
+            </a:pPr>
+            <a:r>
+              <a:rPr lang="en-US" sz="1800" i="1" kern="100" dirty="0">
+                <a:effectLst/>
+                <a:latin typeface="Aptos" panose="020B0004020202020204" pitchFamily="34" charset="0"/>
+                <a:ea typeface="Aptos" panose="020B0004020202020204" pitchFamily="34" charset="0"/>
+                <a:cs typeface="Times New Roman" panose="02020603050405020304" pitchFamily="18" charset="0"/>
+              </a:rPr>
+              <a:t>git commit -m “&lt;</a:t>
+            </a:r>
+            <a:r>
+              <a:rPr lang="en-US" sz="1800" i="1" kern="100" dirty="0" err="1">
+                <a:effectLst/>
+                <a:latin typeface="Aptos" panose="020B0004020202020204" pitchFamily="34" charset="0"/>
+                <a:ea typeface="Aptos" panose="020B0004020202020204" pitchFamily="34" charset="0"/>
+                <a:cs typeface="Times New Roman" panose="02020603050405020304" pitchFamily="18" charset="0"/>
+              </a:rPr>
+              <a:t>DEV_</a:t>
+            </a:r>
+            <a:r>
+              <a:rPr lang="en-US" i="1" kern="100" dirty="0" err="1">
+                <a:latin typeface="Aptos" panose="020B0004020202020204" pitchFamily="34" charset="0"/>
+                <a:ea typeface="Aptos" panose="020B0004020202020204" pitchFamily="34" charset="0"/>
+                <a:cs typeface="Times New Roman" panose="02020603050405020304" pitchFamily="18" charset="0"/>
+              </a:rPr>
+              <a:t>note</a:t>
+            </a:r>
+            <a:r>
+              <a:rPr lang="en-US" sz="1800" i="1" kern="100" dirty="0">
+                <a:effectLst/>
+                <a:latin typeface="Aptos" panose="020B0004020202020204" pitchFamily="34" charset="0"/>
+                <a:ea typeface="Aptos" panose="020B0004020202020204" pitchFamily="34" charset="0"/>
+                <a:cs typeface="Times New Roman" panose="02020603050405020304" pitchFamily="18" charset="0"/>
+              </a:rPr>
+              <a:t>&gt;”</a:t>
+            </a:r>
+            <a:endParaRPr lang="en-US" sz="1800" kern="100" dirty="0">
+              <a:effectLst/>
+              <a:latin typeface="Aptos" panose="020B0004020202020204" pitchFamily="34" charset="0"/>
+              <a:ea typeface="Aptos" panose="020B0004020202020204" pitchFamily="34" charset="0"/>
+              <a:cs typeface="Times New Roman" panose="02020603050405020304" pitchFamily="18" charset="0"/>
+            </a:endParaRPr>
+          </a:p>
+          <a:p>
+            <a:pPr marL="0" marR="0">
+              <a:lnSpc>
+                <a:spcPct val="107000"/>
+              </a:lnSpc>
+              <a:spcBef>
+                <a:spcPts val="0"/>
+              </a:spcBef>
+              <a:spcAft>
+                <a:spcPts val="800"/>
+              </a:spcAft>
+            </a:pPr>
+            <a:r>
+              <a:rPr lang="en-US" sz="1800" i="1" kern="100" dirty="0">
+                <a:effectLst/>
+                <a:latin typeface="Aptos" panose="020B0004020202020204" pitchFamily="34" charset="0"/>
+                <a:ea typeface="Aptos" panose="020B0004020202020204" pitchFamily="34" charset="0"/>
+                <a:cs typeface="Times New Roman" panose="02020603050405020304" pitchFamily="18" charset="0"/>
+              </a:rPr>
+              <a:t>git remote add &lt;name&gt; &lt;URL fork link&gt;</a:t>
+            </a:r>
+            <a:endParaRPr lang="en-US" sz="1800" kern="100" dirty="0">
+              <a:effectLst/>
+              <a:latin typeface="Aptos" panose="020B0004020202020204" pitchFamily="34" charset="0"/>
+              <a:ea typeface="Aptos" panose="020B0004020202020204" pitchFamily="34" charset="0"/>
+              <a:cs typeface="Times New Roman" panose="02020603050405020304" pitchFamily="18" charset="0"/>
+            </a:endParaRPr>
+          </a:p>
+          <a:p>
+            <a:pPr marL="0" marR="0">
+              <a:lnSpc>
+                <a:spcPct val="107000"/>
+              </a:lnSpc>
+              <a:spcBef>
+                <a:spcPts val="0"/>
+              </a:spcBef>
+              <a:spcAft>
+                <a:spcPts val="800"/>
+              </a:spcAft>
+            </a:pPr>
+            <a:r>
+              <a:rPr lang="en-US" sz="1800" i="1" kern="100" dirty="0">
+                <a:effectLst/>
+                <a:latin typeface="Aptos" panose="020B0004020202020204" pitchFamily="34" charset="0"/>
+                <a:ea typeface="Aptos" panose="020B0004020202020204" pitchFamily="34" charset="0"/>
+                <a:cs typeface="Times New Roman" panose="02020603050405020304" pitchFamily="18" charset="0"/>
+              </a:rPr>
+              <a:t>git push &lt;remote&gt; &lt;branch&gt;</a:t>
+            </a:r>
+            <a:endParaRPr lang="en-US" sz="1800" kern="100" dirty="0">
+              <a:effectLst/>
+              <a:latin typeface="Aptos" panose="020B0004020202020204" pitchFamily="34" charset="0"/>
+              <a:ea typeface="Aptos" panose="020B0004020202020204" pitchFamily="34" charset="0"/>
+              <a:cs typeface="Times New Roman" panose="02020603050405020304" pitchFamily="18" charset="0"/>
+            </a:endParaRPr>
+          </a:p>
+          <a:p>
+            <a:endParaRPr lang="en-US" dirty="0"/>
+          </a:p>
+        </p:txBody>
+      </p:sp>
+    </p:spTree>
+    <p:extLst>
+      <p:ext uri="{BB962C8B-B14F-4D97-AF65-F5344CB8AC3E}">
+        <p14:creationId xmlns:p14="http://schemas.microsoft.com/office/powerpoint/2010/main" val="3641515971"/>
+      </p:ext>
+    </p:extLst>
+  </p:cSld>
+  <p:clrMapOvr>
+    <a:masterClrMapping/>
+  </p:clrMapOvr>
+</p:sld>
+</file>
+
+<file path=ppt/slides/slide11.xml><?xml version="1.0" encoding="utf-8"?>
+<p:sld xmlns:a="http://schemas.openxmlformats.org/drawingml/2006/main" xmlns:r="http://schemas.openxmlformats.org/officeDocument/2006/relationships" xmlns:p="http://schemas.openxmlformats.org/presentationml/2006/main">
+  <p:cSld>
+    <p:spTree>
+      <p:nvGrpSpPr>
+        <p:cNvPr id="1" name=""/>
+        <p:cNvGrpSpPr/>
+        <p:nvPr/>
+      </p:nvGrpSpPr>
+      <p:grpSpPr>
+        <a:xfrm>
+          <a:off x="0" y="0"/>
+          <a:ext cx="0" cy="0"/>
+          <a:chOff x="0" y="0"/>
+          <a:chExt cx="0" cy="0"/>
+        </a:xfrm>
+      </p:grpSpPr>
+      <p:sp>
+        <p:nvSpPr>
+          <p:cNvPr id="2" name="Title 1">
+            <a:extLst>
+              <a:ext uri="{FF2B5EF4-FFF2-40B4-BE49-F238E27FC236}">
+                <a16:creationId xmlns:a16="http://schemas.microsoft.com/office/drawing/2014/main" id="{48DFBDBF-7B87-A11F-42DD-AC8E4F665B84}"/>
+              </a:ext>
+            </a:extLst>
+          </p:cNvPr>
+          <p:cNvSpPr>
+            <a:spLocks noGrp="1"/>
+          </p:cNvSpPr>
+          <p:nvPr>
+            <p:ph type="title"/>
+          </p:nvPr>
+        </p:nvSpPr>
+        <p:spPr/>
+        <p:txBody>
+          <a:bodyPr/>
+          <a:lstStyle/>
+          <a:p>
+            <a:r>
+              <a:rPr lang="en-US" dirty="0"/>
+              <a:t>Cloning in git </a:t>
+            </a:r>
+            <a:r>
+              <a:rPr lang="en-US" dirty="0" err="1"/>
+              <a:t>gui</a:t>
+            </a:r>
+            <a:endParaRPr lang="en-US" dirty="0"/>
+          </a:p>
+        </p:txBody>
+      </p:sp>
+      <p:pic>
+        <p:nvPicPr>
+          <p:cNvPr id="5" name="Content Placeholder 4">
+            <a:extLst>
+              <a:ext uri="{FF2B5EF4-FFF2-40B4-BE49-F238E27FC236}">
+                <a16:creationId xmlns:a16="http://schemas.microsoft.com/office/drawing/2014/main" id="{FC1A7F4C-C83B-8476-2BE9-598AA5375DD2}"/>
+              </a:ext>
+            </a:extLst>
+          </p:cNvPr>
+          <p:cNvPicPr>
+            <a:picLocks noGrp="1" noChangeAspect="1"/>
+          </p:cNvPicPr>
+          <p:nvPr>
+            <p:ph idx="1"/>
+          </p:nvPr>
+        </p:nvPicPr>
+        <p:blipFill>
+          <a:blip r:embed="rId2"/>
+          <a:srcRect l="4241" t="3764" r="3469" b="5719"/>
+          <a:stretch/>
+        </p:blipFill>
+        <p:spPr>
+          <a:xfrm>
+            <a:off x="164432" y="1641987"/>
+            <a:ext cx="3903406" cy="2635045"/>
+          </a:xfrm>
+        </p:spPr>
+      </p:pic>
+      <p:pic>
+        <p:nvPicPr>
+          <p:cNvPr id="7" name="Picture 6" descr="A screenshot of a computer&#10;&#10;Description automatically generated">
+            <a:extLst>
+              <a:ext uri="{FF2B5EF4-FFF2-40B4-BE49-F238E27FC236}">
+                <a16:creationId xmlns:a16="http://schemas.microsoft.com/office/drawing/2014/main" id="{675B8239-103E-84C4-4A67-9F8418662FC4}"/>
+              </a:ext>
+            </a:extLst>
+          </p:cNvPr>
+          <p:cNvPicPr>
+            <a:picLocks noChangeAspect="1"/>
+          </p:cNvPicPr>
+          <p:nvPr/>
+        </p:nvPicPr>
+        <p:blipFill>
+          <a:blip r:embed="rId3">
+            <a:extLst>
+              <a:ext uri="{28A0092B-C50C-407E-A947-70E740481C1C}">
+                <a14:useLocalDpi xmlns:a14="http://schemas.microsoft.com/office/drawing/2010/main" val="0"/>
+              </a:ext>
+            </a:extLst>
+          </a:blip>
+          <a:stretch>
+            <a:fillRect/>
+          </a:stretch>
+        </p:blipFill>
+        <p:spPr>
+          <a:xfrm>
+            <a:off x="1" y="3535107"/>
+            <a:ext cx="6596882" cy="2684068"/>
+          </a:xfrm>
+          <a:prstGeom prst="rect">
+            <a:avLst/>
+          </a:prstGeom>
+        </p:spPr>
+      </p:pic>
+      <p:pic>
+        <p:nvPicPr>
+          <p:cNvPr id="9" name="Picture 8" descr="A screenshot of a computer&#10;&#10;Description automatically generated">
+            <a:extLst>
+              <a:ext uri="{FF2B5EF4-FFF2-40B4-BE49-F238E27FC236}">
+                <a16:creationId xmlns:a16="http://schemas.microsoft.com/office/drawing/2014/main" id="{E525984E-43DE-6331-17FB-EA6706FA3DBA}"/>
+              </a:ext>
+            </a:extLst>
+          </p:cNvPr>
+          <p:cNvPicPr>
+            <a:picLocks noChangeAspect="1"/>
+          </p:cNvPicPr>
+          <p:nvPr/>
+        </p:nvPicPr>
+        <p:blipFill>
+          <a:blip r:embed="rId4">
+            <a:extLst>
+              <a:ext uri="{28A0092B-C50C-407E-A947-70E740481C1C}">
+                <a14:useLocalDpi xmlns:a14="http://schemas.microsoft.com/office/drawing/2010/main" val="0"/>
+              </a:ext>
+            </a:extLst>
+          </a:blip>
+          <a:stretch>
+            <a:fillRect/>
+          </a:stretch>
+        </p:blipFill>
+        <p:spPr>
+          <a:xfrm>
+            <a:off x="6499121" y="112797"/>
+            <a:ext cx="5525271" cy="6106377"/>
+          </a:xfrm>
+          <a:prstGeom prst="rect">
+            <a:avLst/>
+          </a:prstGeom>
+        </p:spPr>
+      </p:pic>
+      <p:sp>
+        <p:nvSpPr>
+          <p:cNvPr id="10" name="TextBox 9">
+            <a:extLst>
+              <a:ext uri="{FF2B5EF4-FFF2-40B4-BE49-F238E27FC236}">
+                <a16:creationId xmlns:a16="http://schemas.microsoft.com/office/drawing/2014/main" id="{738D293C-EB03-1DA9-1A92-8D7203AB9B94}"/>
+              </a:ext>
+            </a:extLst>
+          </p:cNvPr>
+          <p:cNvSpPr txBox="1"/>
+          <p:nvPr/>
+        </p:nvSpPr>
+        <p:spPr>
+          <a:xfrm>
+            <a:off x="2261419" y="6489290"/>
+            <a:ext cx="5048113" cy="369332"/>
+          </a:xfrm>
+          <a:prstGeom prst="rect">
+            <a:avLst/>
+          </a:prstGeom>
+          <a:noFill/>
+        </p:spPr>
+        <p:txBody>
+          <a:bodyPr wrap="none" rtlCol="0">
+            <a:spAutoFit/>
+          </a:bodyPr>
+          <a:lstStyle/>
+          <a:p>
+            <a:r>
+              <a:rPr lang="en-US" dirty="0"/>
+              <a:t>NOTE: The last /APXSRC folder cannot exist in clone</a:t>
+            </a:r>
+          </a:p>
+        </p:txBody>
+      </p:sp>
+    </p:spTree>
+    <p:extLst>
+      <p:ext uri="{BB962C8B-B14F-4D97-AF65-F5344CB8AC3E}">
+        <p14:creationId xmlns:p14="http://schemas.microsoft.com/office/powerpoint/2010/main" val="819485861"/>
+      </p:ext>
+    </p:extLst>
+  </p:cSld>
+  <p:clrMapOvr>
+    <a:masterClrMapping/>
+  </p:clrMapOvr>
+</p:sld>
+</file>
+
+<file path=ppt/slides/slide12.xml><?xml version="1.0" encoding="utf-8"?>
+<p:sld xmlns:a="http://schemas.openxmlformats.org/drawingml/2006/main" xmlns:r="http://schemas.openxmlformats.org/officeDocument/2006/relationships" xmlns:p="http://schemas.openxmlformats.org/presentationml/2006/main">
+  <p:cSld>
+    <p:spTree>
+      <p:nvGrpSpPr>
+        <p:cNvPr id="1" name=""/>
+        <p:cNvGrpSpPr/>
+        <p:nvPr/>
+      </p:nvGrpSpPr>
+      <p:grpSpPr>
+        <a:xfrm>
+          <a:off x="0" y="0"/>
+          <a:ext cx="0" cy="0"/>
+          <a:chOff x="0" y="0"/>
+          <a:chExt cx="0" cy="0"/>
+        </a:xfrm>
+      </p:grpSpPr>
+      <p:sp>
+        <p:nvSpPr>
+          <p:cNvPr id="2" name="Title 1">
+            <a:extLst>
+              <a:ext uri="{FF2B5EF4-FFF2-40B4-BE49-F238E27FC236}">
                 <a16:creationId xmlns:a16="http://schemas.microsoft.com/office/drawing/2014/main" id="{1C75A40D-3E81-4D0C-4F9B-6C6D6AFEBA7E}"/>
               </a:ext>
             </a:extLst>
@@ -12654,7 +13206,95 @@
 </p:sld>
 </file>
 
-<file path=ppt/slides/slide11.xml><?xml version="1.0" encoding="utf-8"?>
+<file path=ppt/slides/slide13.xml><?xml version="1.0" encoding="utf-8"?>
+<p:sld xmlns:a="http://schemas.openxmlformats.org/drawingml/2006/main" xmlns:r="http://schemas.openxmlformats.org/officeDocument/2006/relationships" xmlns:p="http://schemas.openxmlformats.org/presentationml/2006/main">
+  <p:cSld>
+    <p:spTree>
+      <p:nvGrpSpPr>
+        <p:cNvPr id="1" name=""/>
+        <p:cNvGrpSpPr/>
+        <p:nvPr/>
+      </p:nvGrpSpPr>
+      <p:grpSpPr>
+        <a:xfrm>
+          <a:off x="0" y="0"/>
+          <a:ext cx="0" cy="0"/>
+          <a:chOff x="0" y="0"/>
+          <a:chExt cx="0" cy="0"/>
+        </a:xfrm>
+      </p:grpSpPr>
+      <p:sp>
+        <p:nvSpPr>
+          <p:cNvPr id="2" name="Title 1">
+            <a:extLst>
+              <a:ext uri="{FF2B5EF4-FFF2-40B4-BE49-F238E27FC236}">
+                <a16:creationId xmlns:a16="http://schemas.microsoft.com/office/drawing/2014/main" id="{413557E4-A4EB-FDFA-B561-32F6AB6CAFFB}"/>
+              </a:ext>
+            </a:extLst>
+          </p:cNvPr>
+          <p:cNvSpPr>
+            <a:spLocks noGrp="1"/>
+          </p:cNvSpPr>
+          <p:nvPr>
+            <p:ph type="title"/>
+          </p:nvPr>
+        </p:nvSpPr>
+        <p:spPr/>
+        <p:txBody>
+          <a:bodyPr/>
+          <a:lstStyle/>
+          <a:p>
+            <a:r>
+              <a:rPr lang="en-US" dirty="0"/>
+              <a:t>Zip download from </a:t>
+            </a:r>
+            <a:r>
+              <a:rPr lang="en-US" dirty="0" err="1"/>
+              <a:t>github</a:t>
+            </a:r>
+            <a:endParaRPr lang="en-US" dirty="0"/>
+          </a:p>
+        </p:txBody>
+      </p:sp>
+      <p:sp>
+        <p:nvSpPr>
+          <p:cNvPr id="3" name="Content Placeholder 2">
+            <a:extLst>
+              <a:ext uri="{FF2B5EF4-FFF2-40B4-BE49-F238E27FC236}">
+                <a16:creationId xmlns:a16="http://schemas.microsoft.com/office/drawing/2014/main" id="{E675F19F-90C4-20CF-64FE-8DF23108E66A}"/>
+              </a:ext>
+            </a:extLst>
+          </p:cNvPr>
+          <p:cNvSpPr>
+            <a:spLocks noGrp="1"/>
+          </p:cNvSpPr>
+          <p:nvPr>
+            <p:ph idx="1"/>
+          </p:nvPr>
+        </p:nvSpPr>
+        <p:spPr/>
+        <p:txBody>
+          <a:bodyPr/>
+          <a:lstStyle/>
+          <a:p>
+            <a:endParaRPr lang="en-US"/>
+          </a:p>
+        </p:txBody>
+      </p:sp>
+    </p:spTree>
+    <p:extLst>
+      <p:ext uri="{BB962C8B-B14F-4D97-AF65-F5344CB8AC3E}">
+        <p14:creationId xmlns:p14="http://schemas.microsoft.com/office/powerpoint/2010/main" val="1854116891"/>
+      </p:ext>
+    </p:extLst>
+  </p:cSld>
+  <p:clrMapOvr>
+    <a:masterClrMapping/>
+  </p:clrMapOvr>
+</p:sld>
+</file>
+
+<file path=ppt/slides/slide14.xml><?xml version="1.0" encoding="utf-8"?>
 <p:sld xmlns:a="http://schemas.openxmlformats.org/drawingml/2006/main" xmlns:r="http://schemas.openxmlformats.org/officeDocument/2006/relationships" xmlns:p="http://schemas.openxmlformats.org/presentationml/2006/main">
   <p:cSld>
     <p:spTree>
@@ -12753,390 +13393,6 @@
     <p:extLst>
       <p:ext uri="{BB962C8B-B14F-4D97-AF65-F5344CB8AC3E}">
         <p14:creationId xmlns:p14="http://schemas.microsoft.com/office/powerpoint/2010/main" val="2514870190"/>
-      </p:ext>
-    </p:extLst>
-  </p:cSld>
-  <p:clrMapOvr>
-    <a:masterClrMapping/>
-  </p:clrMapOvr>
-</p:sld>
-</file>
-
-<file path=ppt/slides/slide12.xml><?xml version="1.0" encoding="utf-8"?>
-<p:sld xmlns:a="http://schemas.openxmlformats.org/drawingml/2006/main" xmlns:r="http://schemas.openxmlformats.org/officeDocument/2006/relationships" xmlns:p="http://schemas.openxmlformats.org/presentationml/2006/main">
-  <p:cSld>
-    <p:spTree>
-      <p:nvGrpSpPr>
-        <p:cNvPr id="1" name=""/>
-        <p:cNvGrpSpPr/>
-        <p:nvPr/>
-      </p:nvGrpSpPr>
-      <p:grpSpPr>
-        <a:xfrm>
-          <a:off x="0" y="0"/>
-          <a:ext cx="0" cy="0"/>
-          <a:chOff x="0" y="0"/>
-          <a:chExt cx="0" cy="0"/>
-        </a:xfrm>
-      </p:grpSpPr>
-      <p:sp>
-        <p:nvSpPr>
-          <p:cNvPr id="2" name="Title 1">
-            <a:extLst>
-              <a:ext uri="{FF2B5EF4-FFF2-40B4-BE49-F238E27FC236}">
-                <a16:creationId xmlns:a16="http://schemas.microsoft.com/office/drawing/2014/main" id="{8A9F7A48-AB86-2BE9-3939-F96156266CB7}"/>
-              </a:ext>
-            </a:extLst>
-          </p:cNvPr>
-          <p:cNvSpPr>
-            <a:spLocks noGrp="1"/>
-          </p:cNvSpPr>
-          <p:nvPr>
-            <p:ph type="title"/>
-          </p:nvPr>
-        </p:nvSpPr>
-        <p:spPr/>
-        <p:txBody>
-          <a:bodyPr/>
-          <a:lstStyle/>
-          <a:p>
-            <a:r>
-              <a:rPr lang="en-US" dirty="0"/>
-              <a:t>Bash scripts to call for every dev</a:t>
-            </a:r>
-          </a:p>
-        </p:txBody>
-      </p:sp>
-      <p:sp>
-        <p:nvSpPr>
-          <p:cNvPr id="3" name="Content Placeholder 2">
-            <a:extLst>
-              <a:ext uri="{FF2B5EF4-FFF2-40B4-BE49-F238E27FC236}">
-                <a16:creationId xmlns:a16="http://schemas.microsoft.com/office/drawing/2014/main" id="{560E46F6-2C1C-38E4-F921-833EDCE9FF65}"/>
-              </a:ext>
-            </a:extLst>
-          </p:cNvPr>
-          <p:cNvSpPr>
-            <a:spLocks noGrp="1"/>
-          </p:cNvSpPr>
-          <p:nvPr>
-            <p:ph idx="1"/>
-          </p:nvPr>
-        </p:nvSpPr>
-        <p:spPr/>
-        <p:txBody>
-          <a:bodyPr/>
-          <a:lstStyle/>
-          <a:p>
-            <a:r>
-              <a:rPr lang="en-US" dirty="0"/>
-              <a:t>Delete the files within and keep the  main folders</a:t>
-            </a:r>
-          </a:p>
-          <a:p>
-            <a:r>
-              <a:rPr lang="en-US" dirty="0"/>
-              <a:t>From VS7ZARBC call a git bash here</a:t>
-            </a:r>
-          </a:p>
-        </p:txBody>
-      </p:sp>
-      <p:pic>
-        <p:nvPicPr>
-          <p:cNvPr id="5" name="Picture 4">
-            <a:extLst>
-              <a:ext uri="{FF2B5EF4-FFF2-40B4-BE49-F238E27FC236}">
-                <a16:creationId xmlns:a16="http://schemas.microsoft.com/office/drawing/2014/main" id="{C175FC0D-A2F9-9DE7-8436-033C31F01F93}"/>
-              </a:ext>
-            </a:extLst>
-          </p:cNvPr>
-          <p:cNvPicPr>
-            <a:picLocks noChangeAspect="1"/>
-          </p:cNvPicPr>
-          <p:nvPr/>
-        </p:nvPicPr>
-        <p:blipFill>
-          <a:blip r:embed="rId2"/>
-          <a:srcRect l="6692"/>
-          <a:stretch/>
-        </p:blipFill>
-        <p:spPr>
-          <a:xfrm>
-            <a:off x="7555832" y="2097088"/>
-            <a:ext cx="4636168" cy="1996613"/>
-          </a:xfrm>
-          <a:prstGeom prst="rect">
-            <a:avLst/>
-          </a:prstGeom>
-        </p:spPr>
-      </p:pic>
-      <p:pic>
-        <p:nvPicPr>
-          <p:cNvPr id="7" name="Picture 6">
-            <a:extLst>
-              <a:ext uri="{FF2B5EF4-FFF2-40B4-BE49-F238E27FC236}">
-                <a16:creationId xmlns:a16="http://schemas.microsoft.com/office/drawing/2014/main" id="{78D65101-9341-7C7A-31D7-C3B092D33495}"/>
-              </a:ext>
-            </a:extLst>
-          </p:cNvPr>
-          <p:cNvPicPr>
-            <a:picLocks noChangeAspect="1"/>
-          </p:cNvPicPr>
-          <p:nvPr/>
-        </p:nvPicPr>
-        <p:blipFill>
-          <a:blip r:embed="rId3"/>
-          <a:srcRect b="36573"/>
-          <a:stretch/>
-        </p:blipFill>
-        <p:spPr>
-          <a:xfrm>
-            <a:off x="718014" y="3344955"/>
-            <a:ext cx="6264183" cy="3296477"/>
-          </a:xfrm>
-          <a:prstGeom prst="rect">
-            <a:avLst/>
-          </a:prstGeom>
-        </p:spPr>
-      </p:pic>
-    </p:spTree>
-    <p:extLst>
-      <p:ext uri="{BB962C8B-B14F-4D97-AF65-F5344CB8AC3E}">
-        <p14:creationId xmlns:p14="http://schemas.microsoft.com/office/powerpoint/2010/main" val="2374872806"/>
-      </p:ext>
-    </p:extLst>
-  </p:cSld>
-  <p:clrMapOvr>
-    <a:masterClrMapping/>
-  </p:clrMapOvr>
-</p:sld>
-</file>
-
-<file path=ppt/slides/slide13.xml><?xml version="1.0" encoding="utf-8"?>
-<p:sld xmlns:a="http://schemas.openxmlformats.org/drawingml/2006/main" xmlns:r="http://schemas.openxmlformats.org/officeDocument/2006/relationships" xmlns:p="http://schemas.openxmlformats.org/presentationml/2006/main">
-  <p:cSld>
-    <p:spTree>
-      <p:nvGrpSpPr>
-        <p:cNvPr id="1" name=""/>
-        <p:cNvGrpSpPr/>
-        <p:nvPr/>
-      </p:nvGrpSpPr>
-      <p:grpSpPr>
-        <a:xfrm>
-          <a:off x="0" y="0"/>
-          <a:ext cx="0" cy="0"/>
-          <a:chOff x="0" y="0"/>
-          <a:chExt cx="0" cy="0"/>
-        </a:xfrm>
-      </p:grpSpPr>
-      <p:sp>
-        <p:nvSpPr>
-          <p:cNvPr id="2" name="Title 1">
-            <a:extLst>
-              <a:ext uri="{FF2B5EF4-FFF2-40B4-BE49-F238E27FC236}">
-                <a16:creationId xmlns:a16="http://schemas.microsoft.com/office/drawing/2014/main" id="{B1E6B509-D646-0A5F-3992-1A3FD82E9B96}"/>
-              </a:ext>
-            </a:extLst>
-          </p:cNvPr>
-          <p:cNvSpPr>
-            <a:spLocks noGrp="1"/>
-          </p:cNvSpPr>
-          <p:nvPr>
-            <p:ph type="title"/>
-          </p:nvPr>
-        </p:nvSpPr>
-        <p:spPr/>
-        <p:txBody>
-          <a:bodyPr/>
-          <a:lstStyle/>
-          <a:p>
-            <a:r>
-              <a:rPr lang="en-US" dirty="0"/>
-              <a:t>Bash scripts to call for every dev</a:t>
-            </a:r>
-          </a:p>
-        </p:txBody>
-      </p:sp>
-      <p:pic>
-        <p:nvPicPr>
-          <p:cNvPr id="5" name="Content Placeholder 4">
-            <a:extLst>
-              <a:ext uri="{FF2B5EF4-FFF2-40B4-BE49-F238E27FC236}">
-                <a16:creationId xmlns:a16="http://schemas.microsoft.com/office/drawing/2014/main" id="{9CC74138-30F1-A759-3365-79AD508846CC}"/>
-              </a:ext>
-            </a:extLst>
-          </p:cNvPr>
-          <p:cNvPicPr>
-            <a:picLocks noGrp="1" noChangeAspect="1"/>
-          </p:cNvPicPr>
-          <p:nvPr>
-            <p:ph idx="1"/>
-          </p:nvPr>
-        </p:nvPicPr>
-        <p:blipFill>
-          <a:blip r:embed="rId2"/>
-          <a:stretch>
-            <a:fillRect/>
-          </a:stretch>
-        </p:blipFill>
-        <p:spPr>
-          <a:xfrm>
-            <a:off x="404081" y="1770119"/>
-            <a:ext cx="5804819" cy="1023072"/>
-          </a:xfrm>
-        </p:spPr>
-      </p:pic>
-      <p:pic>
-        <p:nvPicPr>
-          <p:cNvPr id="7" name="Picture 6">
-            <a:extLst>
-              <a:ext uri="{FF2B5EF4-FFF2-40B4-BE49-F238E27FC236}">
-                <a16:creationId xmlns:a16="http://schemas.microsoft.com/office/drawing/2014/main" id="{C1BD4D47-0EBC-43AF-F57B-DF8E4AB05A6F}"/>
-              </a:ext>
-            </a:extLst>
-          </p:cNvPr>
-          <p:cNvPicPr>
-            <a:picLocks noChangeAspect="1"/>
-          </p:cNvPicPr>
-          <p:nvPr/>
-        </p:nvPicPr>
-        <p:blipFill>
-          <a:blip r:embed="rId3"/>
-          <a:stretch>
-            <a:fillRect/>
-          </a:stretch>
-        </p:blipFill>
-        <p:spPr>
-          <a:xfrm>
-            <a:off x="6368119" y="1798902"/>
-            <a:ext cx="5695545" cy="994289"/>
-          </a:xfrm>
-          <a:prstGeom prst="rect">
-            <a:avLst/>
-          </a:prstGeom>
-        </p:spPr>
-      </p:pic>
-      <p:pic>
-        <p:nvPicPr>
-          <p:cNvPr id="9" name="Picture 8">
-            <a:extLst>
-              <a:ext uri="{FF2B5EF4-FFF2-40B4-BE49-F238E27FC236}">
-                <a16:creationId xmlns:a16="http://schemas.microsoft.com/office/drawing/2014/main" id="{527BC7B9-85BD-F25B-9731-5D4237EF6F82}"/>
-              </a:ext>
-            </a:extLst>
-          </p:cNvPr>
-          <p:cNvPicPr>
-            <a:picLocks noChangeAspect="1"/>
-          </p:cNvPicPr>
-          <p:nvPr/>
-        </p:nvPicPr>
-        <p:blipFill>
-          <a:blip r:embed="rId4"/>
-          <a:stretch>
-            <a:fillRect/>
-          </a:stretch>
-        </p:blipFill>
-        <p:spPr>
-          <a:xfrm>
-            <a:off x="6034372" y="2924519"/>
-            <a:ext cx="6118157" cy="960293"/>
-          </a:xfrm>
-          <a:prstGeom prst="rect">
-            <a:avLst/>
-          </a:prstGeom>
-        </p:spPr>
-      </p:pic>
-      <p:pic>
-        <p:nvPicPr>
-          <p:cNvPr id="11" name="Picture 10">
-            <a:extLst>
-              <a:ext uri="{FF2B5EF4-FFF2-40B4-BE49-F238E27FC236}">
-                <a16:creationId xmlns:a16="http://schemas.microsoft.com/office/drawing/2014/main" id="{B655EBFB-C680-620C-9A77-249A86853C5E}"/>
-              </a:ext>
-            </a:extLst>
-          </p:cNvPr>
-          <p:cNvPicPr>
-            <a:picLocks noChangeAspect="1"/>
-          </p:cNvPicPr>
-          <p:nvPr/>
-        </p:nvPicPr>
-        <p:blipFill>
-          <a:blip r:embed="rId5"/>
-          <a:stretch>
-            <a:fillRect/>
-          </a:stretch>
-        </p:blipFill>
-        <p:spPr>
-          <a:xfrm>
-            <a:off x="140688" y="2904589"/>
-            <a:ext cx="5804819" cy="1000154"/>
-          </a:xfrm>
-          <a:prstGeom prst="rect">
-            <a:avLst/>
-          </a:prstGeom>
-        </p:spPr>
-      </p:pic>
-      <p:sp>
-        <p:nvSpPr>
-          <p:cNvPr id="12" name="TextBox 11">
-            <a:extLst>
-              <a:ext uri="{FF2B5EF4-FFF2-40B4-BE49-F238E27FC236}">
-                <a16:creationId xmlns:a16="http://schemas.microsoft.com/office/drawing/2014/main" id="{B2B4D9EA-36AC-7B82-2802-FACBBE7602B6}"/>
-              </a:ext>
-            </a:extLst>
-          </p:cNvPr>
-          <p:cNvSpPr txBox="1"/>
-          <p:nvPr/>
-        </p:nvSpPr>
-        <p:spPr>
-          <a:xfrm>
-            <a:off x="1572126" y="4780547"/>
-            <a:ext cx="3350148" cy="646331"/>
-          </a:xfrm>
-          <a:prstGeom prst="rect">
-            <a:avLst/>
-          </a:prstGeom>
-          <a:noFill/>
-        </p:spPr>
-        <p:txBody>
-          <a:bodyPr wrap="none" rtlCol="0">
-            <a:spAutoFit/>
-          </a:bodyPr>
-          <a:lstStyle/>
-          <a:p>
-            <a:r>
-              <a:rPr lang="en-US" dirty="0"/>
-              <a:t>Bash </a:t>
-            </a:r>
-            <a:r>
-              <a:rPr lang="en-US" dirty="0" err="1"/>
-              <a:t>repo_clone</a:t>
-            </a:r>
-            <a:r>
-              <a:rPr lang="en-US" dirty="0"/>
-              <a:t> first</a:t>
-            </a:r>
-          </a:p>
-          <a:p>
-            <a:r>
-              <a:rPr lang="en-US" dirty="0"/>
-              <a:t>Bash </a:t>
-            </a:r>
-            <a:r>
-              <a:rPr lang="en-US" dirty="0" err="1"/>
-              <a:t>bulk_branch</a:t>
-            </a:r>
-            <a:r>
-              <a:rPr lang="en-US" dirty="0"/>
-              <a:t> &lt;DEV_ branch&gt;</a:t>
-            </a:r>
-          </a:p>
-        </p:txBody>
-      </p:sp>
-    </p:spTree>
-    <p:extLst>
-      <p:ext uri="{BB962C8B-B14F-4D97-AF65-F5344CB8AC3E}">
-        <p14:creationId xmlns:p14="http://schemas.microsoft.com/office/powerpoint/2010/main" val="3808483206"/>
       </p:ext>
     </p:extLst>
   </p:cSld>
@@ -13522,6 +13778,12 @@
               <a:rPr lang="en-US" dirty="0" err="1"/>
               <a:t>Test_Repo</a:t>
             </a:r>
+            <a:endParaRPr lang="en-US" dirty="0"/>
+          </a:p>
+          <a:p>
+            <a:pPr marL="0" indent="0">
+              <a:buNone/>
+            </a:pPr>
             <a:endParaRPr lang="en-US" dirty="0"/>
           </a:p>
         </p:txBody>
@@ -13753,7 +14015,7 @@
           <a:p>
             <a:r>
               <a:rPr lang="en-US" dirty="0"/>
-              <a:t>Shall be from the back-log</a:t>
+              <a:t>Shall be from the back-log &gt; moved to Current Development</a:t>
             </a:r>
           </a:p>
           <a:p>
@@ -13771,7 +14033,7 @@
           <a:p>
             <a:r>
               <a:rPr lang="en-US" dirty="0"/>
-              <a:t>Developer cannot close out issue without review</a:t>
+              <a:t>Developer shall not close out issue without review</a:t>
             </a:r>
           </a:p>
           <a:p>
@@ -13926,7 +14188,7 @@
           <p:cNvPr id="2" name="Title 1">
             <a:extLst>
               <a:ext uri="{FF2B5EF4-FFF2-40B4-BE49-F238E27FC236}">
-                <a16:creationId xmlns:a16="http://schemas.microsoft.com/office/drawing/2014/main" id="{48DFBDBF-7B87-A11F-42DD-AC8E4F665B84}"/>
+                <a16:creationId xmlns:a16="http://schemas.microsoft.com/office/drawing/2014/main" id="{B1E6B509-D646-0A5F-3992-1A3FD82E9B96}"/>
               </a:ext>
             </a:extLst>
           </p:cNvPr>
@@ -13949,35 +14211,203 @@
           </a:p>
         </p:txBody>
       </p:sp>
-      <p:sp>
-        <p:nvSpPr>
-          <p:cNvPr id="3" name="Content Placeholder 2">
+      <p:pic>
+        <p:nvPicPr>
+          <p:cNvPr id="5" name="Content Placeholder 4">
             <a:extLst>
               <a:ext uri="{FF2B5EF4-FFF2-40B4-BE49-F238E27FC236}">
-                <a16:creationId xmlns:a16="http://schemas.microsoft.com/office/drawing/2014/main" id="{37004F8C-88EC-EEFA-7036-55B34A399328}"/>
+                <a16:creationId xmlns:a16="http://schemas.microsoft.com/office/drawing/2014/main" id="{9CC74138-30F1-A759-3365-79AD508846CC}"/>
               </a:ext>
             </a:extLst>
           </p:cNvPr>
-          <p:cNvSpPr>
-            <a:spLocks noGrp="1"/>
-          </p:cNvSpPr>
+          <p:cNvPicPr>
+            <a:picLocks noGrp="1" noChangeAspect="1"/>
+          </p:cNvPicPr>
           <p:nvPr>
             <p:ph idx="1"/>
           </p:nvPr>
+        </p:nvPicPr>
+        <p:blipFill>
+          <a:blip r:embed="rId2"/>
+          <a:stretch>
+            <a:fillRect/>
+          </a:stretch>
+        </p:blipFill>
+        <p:spPr>
+          <a:xfrm>
+            <a:off x="404081" y="1770119"/>
+            <a:ext cx="5804819" cy="1023072"/>
+          </a:xfrm>
+        </p:spPr>
+      </p:pic>
+      <p:pic>
+        <p:nvPicPr>
+          <p:cNvPr id="7" name="Picture 6">
+            <a:extLst>
+              <a:ext uri="{FF2B5EF4-FFF2-40B4-BE49-F238E27FC236}">
+                <a16:creationId xmlns:a16="http://schemas.microsoft.com/office/drawing/2014/main" id="{C1BD4D47-0EBC-43AF-F57B-DF8E4AB05A6F}"/>
+              </a:ext>
+            </a:extLst>
+          </p:cNvPr>
+          <p:cNvPicPr>
+            <a:picLocks noChangeAspect="1"/>
+          </p:cNvPicPr>
+          <p:nvPr/>
+        </p:nvPicPr>
+        <p:blipFill>
+          <a:blip r:embed="rId3"/>
+          <a:stretch>
+            <a:fillRect/>
+          </a:stretch>
+        </p:blipFill>
+        <p:spPr>
+          <a:xfrm>
+            <a:off x="6368119" y="1798902"/>
+            <a:ext cx="5695545" cy="994289"/>
+          </a:xfrm>
+          <a:prstGeom prst="rect">
+            <a:avLst/>
+          </a:prstGeom>
+        </p:spPr>
+      </p:pic>
+      <p:pic>
+        <p:nvPicPr>
+          <p:cNvPr id="9" name="Picture 8">
+            <a:extLst>
+              <a:ext uri="{FF2B5EF4-FFF2-40B4-BE49-F238E27FC236}">
+                <a16:creationId xmlns:a16="http://schemas.microsoft.com/office/drawing/2014/main" id="{527BC7B9-85BD-F25B-9731-5D4237EF6F82}"/>
+              </a:ext>
+            </a:extLst>
+          </p:cNvPr>
+          <p:cNvPicPr>
+            <a:picLocks noChangeAspect="1"/>
+          </p:cNvPicPr>
+          <p:nvPr/>
+        </p:nvPicPr>
+        <p:blipFill>
+          <a:blip r:embed="rId4"/>
+          <a:stretch>
+            <a:fillRect/>
+          </a:stretch>
+        </p:blipFill>
+        <p:spPr>
+          <a:xfrm>
+            <a:off x="6034372" y="2924519"/>
+            <a:ext cx="6118157" cy="960293"/>
+          </a:xfrm>
+          <a:prstGeom prst="rect">
+            <a:avLst/>
+          </a:prstGeom>
+        </p:spPr>
+      </p:pic>
+      <p:pic>
+        <p:nvPicPr>
+          <p:cNvPr id="11" name="Picture 10">
+            <a:extLst>
+              <a:ext uri="{FF2B5EF4-FFF2-40B4-BE49-F238E27FC236}">
+                <a16:creationId xmlns:a16="http://schemas.microsoft.com/office/drawing/2014/main" id="{B655EBFB-C680-620C-9A77-249A86853C5E}"/>
+              </a:ext>
+            </a:extLst>
+          </p:cNvPr>
+          <p:cNvPicPr>
+            <a:picLocks noChangeAspect="1"/>
+          </p:cNvPicPr>
+          <p:nvPr/>
+        </p:nvPicPr>
+        <p:blipFill>
+          <a:blip r:embed="rId5"/>
+          <a:stretch>
+            <a:fillRect/>
+          </a:stretch>
+        </p:blipFill>
+        <p:spPr>
+          <a:xfrm>
+            <a:off x="140688" y="2904589"/>
+            <a:ext cx="5804819" cy="1000154"/>
+          </a:xfrm>
+          <a:prstGeom prst="rect">
+            <a:avLst/>
+          </a:prstGeom>
+        </p:spPr>
+      </p:pic>
+      <p:sp>
+        <p:nvSpPr>
+          <p:cNvPr id="12" name="TextBox 11">
+            <a:extLst>
+              <a:ext uri="{FF2B5EF4-FFF2-40B4-BE49-F238E27FC236}">
+                <a16:creationId xmlns:a16="http://schemas.microsoft.com/office/drawing/2014/main" id="{B2B4D9EA-36AC-7B82-2802-FACBBE7602B6}"/>
+              </a:ext>
+            </a:extLst>
+          </p:cNvPr>
+          <p:cNvSpPr txBox="1"/>
+          <p:nvPr/>
         </p:nvSpPr>
-        <p:spPr/>
+        <p:spPr>
+          <a:xfrm>
+            <a:off x="1572126" y="4780547"/>
+            <a:ext cx="6696449" cy="1200329"/>
+          </a:xfrm>
+          <a:prstGeom prst="rect">
+            <a:avLst/>
+          </a:prstGeom>
+          <a:noFill/>
+        </p:spPr>
         <p:txBody>
-          <a:bodyPr/>
+          <a:bodyPr wrap="none" rtlCol="0">
+            <a:spAutoFit/>
+          </a:bodyPr>
           <a:lstStyle/>
           <a:p>
+            <a:r>
+              <a:rPr lang="en-US" dirty="0"/>
+              <a:t>Bash </a:t>
+            </a:r>
+            <a:r>
+              <a:rPr lang="en-US" dirty="0" err="1"/>
+              <a:t>repo_clone</a:t>
+            </a:r>
+            <a:r>
+              <a:rPr lang="en-US" dirty="0"/>
+              <a:t> first</a:t>
+            </a:r>
+          </a:p>
+          <a:p>
+            <a:r>
+              <a:rPr lang="en-US" dirty="0"/>
+              <a:t>Bash </a:t>
+            </a:r>
+            <a:r>
+              <a:rPr lang="en-US" dirty="0" err="1"/>
+              <a:t>bulk_branch</a:t>
+            </a:r>
+            <a:r>
+              <a:rPr lang="en-US" dirty="0"/>
+              <a:t> &lt;DEV_ branch&gt;</a:t>
+            </a:r>
+          </a:p>
+          <a:p>
             <a:endParaRPr lang="en-US" dirty="0"/>
+          </a:p>
+          <a:p>
+            <a:r>
+              <a:rPr lang="en-US" dirty="0"/>
+              <a:t>NOTE: this pulls from </a:t>
+            </a:r>
+            <a:r>
+              <a:rPr lang="en-US" dirty="0" err="1"/>
+              <a:t>BreaultSWD</a:t>
+            </a:r>
+            <a:r>
+              <a:rPr lang="en-US" dirty="0"/>
+              <a:t> and does not create a link to upload</a:t>
+            </a:r>
           </a:p>
         </p:txBody>
       </p:sp>
     </p:spTree>
     <p:extLst>
       <p:ext uri="{BB962C8B-B14F-4D97-AF65-F5344CB8AC3E}">
-        <p14:creationId xmlns:p14="http://schemas.microsoft.com/office/powerpoint/2010/main" val="819485861"/>
+        <p14:creationId xmlns:p14="http://schemas.microsoft.com/office/powerpoint/2010/main" val="3808483206"/>
       </p:ext>
     </p:extLst>
   </p:cSld>
@@ -14009,7 +14439,7 @@
           <p:cNvPr id="2" name="Title 1">
             <a:extLst>
               <a:ext uri="{FF2B5EF4-FFF2-40B4-BE49-F238E27FC236}">
-                <a16:creationId xmlns:a16="http://schemas.microsoft.com/office/drawing/2014/main" id="{940A8AC8-75DF-B1EF-EF4E-3B0B9AF067DA}"/>
+                <a16:creationId xmlns:a16="http://schemas.microsoft.com/office/drawing/2014/main" id="{8A9F7A48-AB86-2BE9-3939-F96156266CB7}"/>
               </a:ext>
             </a:extLst>
           </p:cNvPr>
@@ -14027,310 +14457,107 @@
           <a:p>
             <a:r>
               <a:rPr lang="en-US" dirty="0"/>
-              <a:t>Commits in bash</a:t>
+              <a:t>Bash scripts to call for new development</a:t>
+            </a:r>
+          </a:p>
+        </p:txBody>
+      </p:sp>
+      <p:sp>
+        <p:nvSpPr>
+          <p:cNvPr id="3" name="Content Placeholder 2">
+            <a:extLst>
+              <a:ext uri="{FF2B5EF4-FFF2-40B4-BE49-F238E27FC236}">
+                <a16:creationId xmlns:a16="http://schemas.microsoft.com/office/drawing/2014/main" id="{560E46F6-2C1C-38E4-F921-833EDCE9FF65}"/>
+              </a:ext>
+            </a:extLst>
+          </p:cNvPr>
+          <p:cNvSpPr>
+            <a:spLocks noGrp="1"/>
+          </p:cNvSpPr>
+          <p:nvPr>
+            <p:ph idx="1"/>
+          </p:nvPr>
+        </p:nvSpPr>
+        <p:spPr/>
+        <p:txBody>
+          <a:bodyPr/>
+          <a:lstStyle/>
+          <a:p>
+            <a:r>
+              <a:rPr lang="en-US" dirty="0"/>
+              <a:t>Delete the files within and keep the  main folders</a:t>
+            </a:r>
+          </a:p>
+          <a:p>
+            <a:r>
+              <a:rPr lang="en-US" dirty="0"/>
+              <a:t>From VS7ZARBC call a git bash here</a:t>
             </a:r>
           </a:p>
         </p:txBody>
       </p:sp>
       <p:pic>
         <p:nvPicPr>
-          <p:cNvPr id="5" name="Content Placeholder 4">
+          <p:cNvPr id="5" name="Picture 4">
             <a:extLst>
               <a:ext uri="{FF2B5EF4-FFF2-40B4-BE49-F238E27FC236}">
-                <a16:creationId xmlns:a16="http://schemas.microsoft.com/office/drawing/2014/main" id="{F8560C1A-7386-18D9-9A51-B40E593F25C8}"/>
+                <a16:creationId xmlns:a16="http://schemas.microsoft.com/office/drawing/2014/main" id="{C175FC0D-A2F9-9DE7-8436-033C31F01F93}"/>
               </a:ext>
             </a:extLst>
           </p:cNvPr>
           <p:cNvPicPr>
-            <a:picLocks noGrp="1" noChangeAspect="1"/>
+            <a:picLocks noChangeAspect="1"/>
           </p:cNvPicPr>
-          <p:nvPr>
-            <p:ph idx="1"/>
-          </p:nvPr>
+          <p:nvPr/>
         </p:nvPicPr>
         <p:blipFill>
           <a:blip r:embed="rId2"/>
-          <a:stretch>
-            <a:fillRect/>
-          </a:stretch>
+          <a:srcRect l="6692"/>
+          <a:stretch/>
         </p:blipFill>
         <p:spPr>
           <a:xfrm>
-            <a:off x="5160397" y="1948875"/>
-            <a:ext cx="6782497" cy="2761445"/>
-          </a:xfrm>
-        </p:spPr>
-      </p:pic>
-      <p:sp>
-        <p:nvSpPr>
-          <p:cNvPr id="6" name="TextBox 5">
-            <a:extLst>
-              <a:ext uri="{FF2B5EF4-FFF2-40B4-BE49-F238E27FC236}">
-                <a16:creationId xmlns:a16="http://schemas.microsoft.com/office/drawing/2014/main" id="{4B3908E8-E7C2-0A08-F649-4D1054BB9D7F}"/>
-              </a:ext>
-            </a:extLst>
-          </p:cNvPr>
-          <p:cNvSpPr txBox="1"/>
-          <p:nvPr/>
-        </p:nvSpPr>
-        <p:spPr>
-          <a:xfrm>
-            <a:off x="730370" y="2097088"/>
-            <a:ext cx="4268797" cy="3162019"/>
+            <a:off x="7555832" y="2097088"/>
+            <a:ext cx="4636168" cy="1996613"/>
           </a:xfrm>
           <a:prstGeom prst="rect">
             <a:avLst/>
           </a:prstGeom>
-          <a:noFill/>
         </p:spPr>
-        <p:txBody>
-          <a:bodyPr wrap="none" rtlCol="0">
-            <a:spAutoFit/>
-          </a:bodyPr>
-          <a:lstStyle/>
-          <a:p>
-            <a:pPr marL="0" marR="0">
-              <a:lnSpc>
-                <a:spcPct val="107000"/>
-              </a:lnSpc>
-              <a:spcBef>
-                <a:spcPts val="0"/>
-              </a:spcBef>
-              <a:spcAft>
-                <a:spcPts val="800"/>
-              </a:spcAft>
-            </a:pPr>
-            <a:r>
-              <a:rPr lang="en-US" sz="1800" i="1" kern="100" dirty="0">
-                <a:effectLst/>
-                <a:latin typeface="Aptos" panose="020B0004020202020204" pitchFamily="34" charset="0"/>
-                <a:ea typeface="Aptos" panose="020B0004020202020204" pitchFamily="34" charset="0"/>
-                <a:cs typeface="Times New Roman" panose="02020603050405020304" pitchFamily="18" charset="0"/>
-              </a:rPr>
-              <a:t>git </a:t>
-            </a:r>
-            <a:r>
-              <a:rPr lang="en-US" sz="1800" i="1" kern="100" dirty="0" err="1">
-                <a:effectLst/>
-                <a:latin typeface="Aptos" panose="020B0004020202020204" pitchFamily="34" charset="0"/>
-                <a:ea typeface="Aptos" panose="020B0004020202020204" pitchFamily="34" charset="0"/>
-                <a:cs typeface="Times New Roman" panose="02020603050405020304" pitchFamily="18" charset="0"/>
-              </a:rPr>
-              <a:t>init</a:t>
-            </a:r>
-            <a:r>
-              <a:rPr lang="en-US" sz="1800" i="1" kern="100" dirty="0">
-                <a:effectLst/>
-                <a:latin typeface="Aptos" panose="020B0004020202020204" pitchFamily="34" charset="0"/>
-                <a:ea typeface="Aptos" panose="020B0004020202020204" pitchFamily="34" charset="0"/>
-                <a:cs typeface="Times New Roman" panose="02020603050405020304" pitchFamily="18" charset="0"/>
-              </a:rPr>
-              <a:t> -b &lt;name of the local branch&gt;</a:t>
-            </a:r>
-            <a:endParaRPr lang="en-US" sz="1800" kern="100" dirty="0">
-              <a:effectLst/>
-              <a:latin typeface="Aptos" panose="020B0004020202020204" pitchFamily="34" charset="0"/>
-              <a:ea typeface="Aptos" panose="020B0004020202020204" pitchFamily="34" charset="0"/>
-              <a:cs typeface="Times New Roman" panose="02020603050405020304" pitchFamily="18" charset="0"/>
-            </a:endParaRPr>
-          </a:p>
-          <a:p>
-            <a:pPr marL="0" marR="0">
-              <a:lnSpc>
-                <a:spcPct val="107000"/>
-              </a:lnSpc>
-              <a:spcBef>
-                <a:spcPts val="0"/>
-              </a:spcBef>
-              <a:spcAft>
-                <a:spcPts val="800"/>
-              </a:spcAft>
-            </a:pPr>
-            <a:r>
-              <a:rPr lang="en-US" sz="1800" i="1" kern="100" dirty="0">
-                <a:effectLst/>
-                <a:latin typeface="Aptos" panose="020B0004020202020204" pitchFamily="34" charset="0"/>
-                <a:ea typeface="Aptos" panose="020B0004020202020204" pitchFamily="34" charset="0"/>
-                <a:cs typeface="Times New Roman" panose="02020603050405020304" pitchFamily="18" charset="0"/>
-              </a:rPr>
-              <a:t>Git checkout -b &lt;name of branch&gt;</a:t>
-            </a:r>
-            <a:endParaRPr lang="en-US" sz="1800" kern="100" dirty="0">
-              <a:effectLst/>
-              <a:latin typeface="Aptos" panose="020B0004020202020204" pitchFamily="34" charset="0"/>
-              <a:ea typeface="Aptos" panose="020B0004020202020204" pitchFamily="34" charset="0"/>
-              <a:cs typeface="Times New Roman" panose="02020603050405020304" pitchFamily="18" charset="0"/>
-            </a:endParaRPr>
-          </a:p>
-          <a:p>
-            <a:pPr marL="0" marR="0">
-              <a:lnSpc>
-                <a:spcPct val="107000"/>
-              </a:lnSpc>
-              <a:spcBef>
-                <a:spcPts val="0"/>
-              </a:spcBef>
-              <a:spcAft>
-                <a:spcPts val="800"/>
-              </a:spcAft>
-            </a:pPr>
-            <a:r>
-              <a:rPr lang="en-US" sz="1800" kern="100" dirty="0">
-                <a:effectLst/>
-                <a:latin typeface="Aptos" panose="020B0004020202020204" pitchFamily="34" charset="0"/>
-                <a:ea typeface="Aptos" panose="020B0004020202020204" pitchFamily="34" charset="0"/>
-                <a:cs typeface="Times New Roman" panose="02020603050405020304" pitchFamily="18" charset="0"/>
-              </a:rPr>
-              <a:t>Add the files to your current local Branch:</a:t>
-            </a:r>
-          </a:p>
-          <a:p>
-            <a:pPr marL="0" marR="0">
-              <a:lnSpc>
-                <a:spcPct val="107000"/>
-              </a:lnSpc>
-              <a:spcBef>
-                <a:spcPts val="0"/>
-              </a:spcBef>
-              <a:spcAft>
-                <a:spcPts val="800"/>
-              </a:spcAft>
-            </a:pPr>
-            <a:r>
-              <a:rPr lang="en-US" sz="1800" i="1" kern="100" dirty="0">
-                <a:effectLst/>
-                <a:latin typeface="Aptos" panose="020B0004020202020204" pitchFamily="34" charset="0"/>
-                <a:ea typeface="Aptos" panose="020B0004020202020204" pitchFamily="34" charset="0"/>
-                <a:cs typeface="Times New Roman" panose="02020603050405020304" pitchFamily="18" charset="0"/>
-              </a:rPr>
-              <a:t>git add .</a:t>
-            </a:r>
-            <a:endParaRPr lang="en-US" sz="1800" kern="100" dirty="0">
-              <a:effectLst/>
-              <a:latin typeface="Aptos" panose="020B0004020202020204" pitchFamily="34" charset="0"/>
-              <a:ea typeface="Aptos" panose="020B0004020202020204" pitchFamily="34" charset="0"/>
-              <a:cs typeface="Times New Roman" panose="02020603050405020304" pitchFamily="18" charset="0"/>
-            </a:endParaRPr>
-          </a:p>
-          <a:p>
-            <a:pPr marL="0" marR="0">
-              <a:lnSpc>
-                <a:spcPct val="107000"/>
-              </a:lnSpc>
-              <a:spcBef>
-                <a:spcPts val="0"/>
-              </a:spcBef>
-              <a:spcAft>
-                <a:spcPts val="800"/>
-              </a:spcAft>
-            </a:pPr>
-            <a:r>
-              <a:rPr lang="en-US" sz="1800" i="1" kern="100" dirty="0">
-                <a:effectLst/>
-                <a:latin typeface="Aptos" panose="020B0004020202020204" pitchFamily="34" charset="0"/>
-                <a:ea typeface="Aptos" panose="020B0004020202020204" pitchFamily="34" charset="0"/>
-                <a:cs typeface="Times New Roman" panose="02020603050405020304" pitchFamily="18" charset="0"/>
-              </a:rPr>
-              <a:t>git commit -m “&lt;</a:t>
-            </a:r>
-            <a:r>
-              <a:rPr lang="en-US" sz="1800" i="1" kern="100" dirty="0" err="1">
-                <a:effectLst/>
-                <a:latin typeface="Aptos" panose="020B0004020202020204" pitchFamily="34" charset="0"/>
-                <a:ea typeface="Aptos" panose="020B0004020202020204" pitchFamily="34" charset="0"/>
-                <a:cs typeface="Times New Roman" panose="02020603050405020304" pitchFamily="18" charset="0"/>
-              </a:rPr>
-              <a:t>DEV_</a:t>
-            </a:r>
-            <a:r>
-              <a:rPr lang="en-US" i="1" kern="100" dirty="0" err="1">
-                <a:latin typeface="Aptos" panose="020B0004020202020204" pitchFamily="34" charset="0"/>
-                <a:ea typeface="Aptos" panose="020B0004020202020204" pitchFamily="34" charset="0"/>
-                <a:cs typeface="Times New Roman" panose="02020603050405020304" pitchFamily="18" charset="0"/>
-              </a:rPr>
-              <a:t>note</a:t>
-            </a:r>
-            <a:r>
-              <a:rPr lang="en-US" sz="1800" i="1" kern="100" dirty="0">
-                <a:effectLst/>
-                <a:latin typeface="Aptos" panose="020B0004020202020204" pitchFamily="34" charset="0"/>
-                <a:ea typeface="Aptos" panose="020B0004020202020204" pitchFamily="34" charset="0"/>
-                <a:cs typeface="Times New Roman" panose="02020603050405020304" pitchFamily="18" charset="0"/>
-              </a:rPr>
-              <a:t>&gt;”</a:t>
-            </a:r>
-            <a:endParaRPr lang="en-US" sz="1800" kern="100" dirty="0">
-              <a:effectLst/>
-              <a:latin typeface="Aptos" panose="020B0004020202020204" pitchFamily="34" charset="0"/>
-              <a:ea typeface="Aptos" panose="020B0004020202020204" pitchFamily="34" charset="0"/>
-              <a:cs typeface="Times New Roman" panose="02020603050405020304" pitchFamily="18" charset="0"/>
-            </a:endParaRPr>
-          </a:p>
-          <a:p>
-            <a:pPr marL="0" marR="0">
-              <a:lnSpc>
-                <a:spcPct val="107000"/>
-              </a:lnSpc>
-              <a:spcBef>
-                <a:spcPts val="0"/>
-              </a:spcBef>
-              <a:spcAft>
-                <a:spcPts val="800"/>
-              </a:spcAft>
-            </a:pPr>
-            <a:r>
-              <a:rPr lang="en-US" sz="1800" i="1" kern="100" dirty="0">
-                <a:effectLst/>
-                <a:latin typeface="Aptos" panose="020B0004020202020204" pitchFamily="34" charset="0"/>
-                <a:ea typeface="Aptos" panose="020B0004020202020204" pitchFamily="34" charset="0"/>
-                <a:cs typeface="Times New Roman" panose="02020603050405020304" pitchFamily="18" charset="0"/>
-              </a:rPr>
-              <a:t>git remote add &lt;name&gt; &lt;URL fork link&gt;</a:t>
-            </a:r>
-            <a:endParaRPr lang="en-US" sz="1800" kern="100" dirty="0">
-              <a:effectLst/>
-              <a:latin typeface="Aptos" panose="020B0004020202020204" pitchFamily="34" charset="0"/>
-              <a:ea typeface="Aptos" panose="020B0004020202020204" pitchFamily="34" charset="0"/>
-              <a:cs typeface="Times New Roman" panose="02020603050405020304" pitchFamily="18" charset="0"/>
-            </a:endParaRPr>
-          </a:p>
-          <a:p>
-            <a:pPr marL="0" marR="0">
-              <a:lnSpc>
-                <a:spcPct val="107000"/>
-              </a:lnSpc>
-              <a:spcBef>
-                <a:spcPts val="0"/>
-              </a:spcBef>
-              <a:spcAft>
-                <a:spcPts val="800"/>
-              </a:spcAft>
-            </a:pPr>
-            <a:r>
-              <a:rPr lang="en-US" sz="1800" i="1" kern="100" dirty="0">
-                <a:effectLst/>
-                <a:latin typeface="Aptos" panose="020B0004020202020204" pitchFamily="34" charset="0"/>
-                <a:ea typeface="Aptos" panose="020B0004020202020204" pitchFamily="34" charset="0"/>
-                <a:cs typeface="Times New Roman" panose="02020603050405020304" pitchFamily="18" charset="0"/>
-              </a:rPr>
-              <a:t>git push &lt;remote&gt; &lt;branch&gt;</a:t>
-            </a:r>
-            <a:endParaRPr lang="en-US" sz="1800" kern="100" dirty="0">
-              <a:effectLst/>
-              <a:latin typeface="Aptos" panose="020B0004020202020204" pitchFamily="34" charset="0"/>
-              <a:ea typeface="Aptos" panose="020B0004020202020204" pitchFamily="34" charset="0"/>
-              <a:cs typeface="Times New Roman" panose="02020603050405020304" pitchFamily="18" charset="0"/>
-            </a:endParaRPr>
-          </a:p>
-          <a:p>
-            <a:endParaRPr lang="en-US" dirty="0"/>
-          </a:p>
-        </p:txBody>
-      </p:sp>
+      </p:pic>
+      <p:pic>
+        <p:nvPicPr>
+          <p:cNvPr id="7" name="Picture 6">
+            <a:extLst>
+              <a:ext uri="{FF2B5EF4-FFF2-40B4-BE49-F238E27FC236}">
+                <a16:creationId xmlns:a16="http://schemas.microsoft.com/office/drawing/2014/main" id="{78D65101-9341-7C7A-31D7-C3B092D33495}"/>
+              </a:ext>
+            </a:extLst>
+          </p:cNvPr>
+          <p:cNvPicPr>
+            <a:picLocks noChangeAspect="1"/>
+          </p:cNvPicPr>
+          <p:nvPr/>
+        </p:nvPicPr>
+        <p:blipFill>
+          <a:blip r:embed="rId3"/>
+          <a:srcRect b="36573"/>
+          <a:stretch/>
+        </p:blipFill>
+        <p:spPr>
+          <a:xfrm>
+            <a:off x="845833" y="3429000"/>
+            <a:ext cx="6264183" cy="3296477"/>
+          </a:xfrm>
+          <a:prstGeom prst="rect">
+            <a:avLst/>
+          </a:prstGeom>
+        </p:spPr>
+      </p:pic>
     </p:spTree>
     <p:extLst>
       <p:ext uri="{BB962C8B-B14F-4D97-AF65-F5344CB8AC3E}">
-        <p14:creationId xmlns:p14="http://schemas.microsoft.com/office/powerpoint/2010/main" val="3641515971"/>
+        <p14:creationId xmlns:p14="http://schemas.microsoft.com/office/powerpoint/2010/main" val="2374872806"/>
       </p:ext>
     </p:extLst>
   </p:cSld>

</xml_diff>

<commit_message>
DEV_NOTE 240911.3 example git gui
</commit_message>
<xml_diff>
--- a/BREAULT SWD TRAINING.pptx
+++ b/BREAULT SWD TRAINING.pptx
@@ -175,7 +175,7 @@
           <a:noFill/>
           <a:extLst>
             <a:ext uri="{909E8E84-426E-40dd-AFC4-6F175D3DCCD1}">
-              <a14:hiddenFill xmlns="" xmlns:a14="http://schemas.microsoft.com/office/drawing/2010/main">
+              <a14:hiddenFill xmlns:a14="http://schemas.microsoft.com/office/drawing/2010/main" xmlns="">
                 <a:solidFill>
                   <a:srgbClr val="FFFFFF"/>
                 </a:solidFill>
@@ -235,7 +235,7 @@
             </a:ln>
             <a:extLst>
               <a:ext uri="{91240B29-F687-4f45-9708-019B960494DF}">
-                <a14:hiddenLine xmlns="" xmlns:a14="http://schemas.microsoft.com/office/drawing/2010/main" w="9525">
+                <a14:hiddenLine xmlns:a14="http://schemas.microsoft.com/office/drawing/2010/main" xmlns="" w="9525">
                   <a:solidFill>
                     <a:srgbClr val="000000"/>
                   </a:solidFill>
@@ -325,7 +325,7 @@
             </a:ln>
             <a:extLst>
               <a:ext uri="{91240B29-F687-4f45-9708-019B960494DF}">
-                <a14:hiddenLine xmlns="" xmlns:a14="http://schemas.microsoft.com/office/drawing/2010/main" w="9525">
+                <a14:hiddenLine xmlns:a14="http://schemas.microsoft.com/office/drawing/2010/main" xmlns="" w="9525">
                   <a:solidFill>
                     <a:srgbClr val="000000"/>
                   </a:solidFill>
@@ -415,7 +415,7 @@
             </a:ln>
             <a:extLst>
               <a:ext uri="{91240B29-F687-4f45-9708-019B960494DF}">
-                <a14:hiddenLine xmlns="" xmlns:a14="http://schemas.microsoft.com/office/drawing/2010/main" w="9525">
+                <a14:hiddenLine xmlns:a14="http://schemas.microsoft.com/office/drawing/2010/main" xmlns="" w="9525">
                   <a:solidFill>
                     <a:srgbClr val="000000"/>
                   </a:solidFill>
@@ -449,7 +449,7 @@
             </a:ln>
             <a:extLst>
               <a:ext uri="{91240B29-F687-4f45-9708-019B960494DF}">
-                <a14:hiddenLine xmlns="" xmlns:a14="http://schemas.microsoft.com/office/drawing/2010/main" w="9525">
+                <a14:hiddenLine xmlns:a14="http://schemas.microsoft.com/office/drawing/2010/main" xmlns="" w="9525">
                   <a:solidFill>
                     <a:srgbClr val="000000"/>
                   </a:solidFill>
@@ -539,7 +539,7 @@
             </a:ln>
             <a:extLst>
               <a:ext uri="{91240B29-F687-4f45-9708-019B960494DF}">
-                <a14:hiddenLine xmlns="" xmlns:a14="http://schemas.microsoft.com/office/drawing/2010/main" w="9525">
+                <a14:hiddenLine xmlns:a14="http://schemas.microsoft.com/office/drawing/2010/main" xmlns="" w="9525">
                   <a:solidFill>
                     <a:srgbClr val="000000"/>
                   </a:solidFill>
@@ -601,7 +601,7 @@
             </a:ln>
             <a:extLst>
               <a:ext uri="{91240B29-F687-4f45-9708-019B960494DF}">
-                <a14:hiddenLine xmlns="" xmlns:a14="http://schemas.microsoft.com/office/drawing/2010/main" w="9525">
+                <a14:hiddenLine xmlns:a14="http://schemas.microsoft.com/office/drawing/2010/main" xmlns="" w="9525">
                   <a:solidFill>
                     <a:srgbClr val="000000"/>
                   </a:solidFill>
@@ -663,7 +663,7 @@
             </a:ln>
             <a:extLst>
               <a:ext uri="{91240B29-F687-4f45-9708-019B960494DF}">
-                <a14:hiddenLine xmlns="" xmlns:a14="http://schemas.microsoft.com/office/drawing/2010/main" w="9525">
+                <a14:hiddenLine xmlns:a14="http://schemas.microsoft.com/office/drawing/2010/main" xmlns="" w="9525">
                   <a:solidFill>
                     <a:srgbClr val="000000"/>
                   </a:solidFill>
@@ -753,7 +753,7 @@
             </a:ln>
             <a:extLst>
               <a:ext uri="{91240B29-F687-4f45-9708-019B960494DF}">
-                <a14:hiddenLine xmlns="" xmlns:a14="http://schemas.microsoft.com/office/drawing/2010/main" w="9525">
+                <a14:hiddenLine xmlns:a14="http://schemas.microsoft.com/office/drawing/2010/main" xmlns="" w="9525">
                   <a:solidFill>
                     <a:srgbClr val="000000"/>
                   </a:solidFill>
@@ -815,7 +815,7 @@
             </a:ln>
             <a:extLst>
               <a:ext uri="{91240B29-F687-4f45-9708-019B960494DF}">
-                <a14:hiddenLine xmlns="" xmlns:a14="http://schemas.microsoft.com/office/drawing/2010/main" w="9525">
+                <a14:hiddenLine xmlns:a14="http://schemas.microsoft.com/office/drawing/2010/main" xmlns="" w="9525">
                   <a:solidFill>
                     <a:srgbClr val="000000"/>
                   </a:solidFill>
@@ -877,7 +877,7 @@
             </a:ln>
             <a:extLst>
               <a:ext uri="{91240B29-F687-4f45-9708-019B960494DF}">
-                <a14:hiddenLine xmlns="" xmlns:a14="http://schemas.microsoft.com/office/drawing/2010/main" w="9525">
+                <a14:hiddenLine xmlns:a14="http://schemas.microsoft.com/office/drawing/2010/main" xmlns="" w="9525">
                   <a:solidFill>
                     <a:srgbClr val="000000"/>
                   </a:solidFill>
@@ -967,7 +967,7 @@
             </a:ln>
             <a:extLst>
               <a:ext uri="{91240B29-F687-4f45-9708-019B960494DF}">
-                <a14:hiddenLine xmlns="" xmlns:a14="http://schemas.microsoft.com/office/drawing/2010/main" w="9525">
+                <a14:hiddenLine xmlns:a14="http://schemas.microsoft.com/office/drawing/2010/main" xmlns="" w="9525">
                   <a:solidFill>
                     <a:srgbClr val="000000"/>
                   </a:solidFill>
@@ -1057,7 +1057,7 @@
             </a:ln>
             <a:extLst>
               <a:ext uri="{91240B29-F687-4f45-9708-019B960494DF}">
-                <a14:hiddenLine xmlns="" xmlns:a14="http://schemas.microsoft.com/office/drawing/2010/main" w="9525">
+                <a14:hiddenLine xmlns:a14="http://schemas.microsoft.com/office/drawing/2010/main" xmlns="" w="9525">
                   <a:solidFill>
                     <a:srgbClr val="000000"/>
                   </a:solidFill>
@@ -1119,7 +1119,7 @@
             </a:ln>
             <a:extLst>
               <a:ext uri="{91240B29-F687-4f45-9708-019B960494DF}">
-                <a14:hiddenLine xmlns="" xmlns:a14="http://schemas.microsoft.com/office/drawing/2010/main" w="9525">
+                <a14:hiddenLine xmlns:a14="http://schemas.microsoft.com/office/drawing/2010/main" xmlns="" w="9525">
                   <a:solidFill>
                     <a:srgbClr val="000000"/>
                   </a:solidFill>
@@ -1229,7 +1229,7 @@
             </a:ln>
             <a:extLst>
               <a:ext uri="{91240B29-F687-4f45-9708-019B960494DF}">
-                <a14:hiddenLine xmlns="" xmlns:a14="http://schemas.microsoft.com/office/drawing/2010/main" w="9525">
+                <a14:hiddenLine xmlns:a14="http://schemas.microsoft.com/office/drawing/2010/main" xmlns="" w="9525">
                   <a:solidFill>
                     <a:srgbClr val="000000"/>
                   </a:solidFill>
@@ -1291,7 +1291,7 @@
             </a:ln>
             <a:extLst>
               <a:ext uri="{91240B29-F687-4f45-9708-019B960494DF}">
-                <a14:hiddenLine xmlns="" xmlns:a14="http://schemas.microsoft.com/office/drawing/2010/main" w="9525">
+                <a14:hiddenLine xmlns:a14="http://schemas.microsoft.com/office/drawing/2010/main" xmlns="" w="9525">
                   <a:solidFill>
                     <a:srgbClr val="000000"/>
                   </a:solidFill>
@@ -1381,7 +1381,7 @@
             </a:ln>
             <a:extLst>
               <a:ext uri="{91240B29-F687-4f45-9708-019B960494DF}">
-                <a14:hiddenLine xmlns="" xmlns:a14="http://schemas.microsoft.com/office/drawing/2010/main" w="9525">
+                <a14:hiddenLine xmlns:a14="http://schemas.microsoft.com/office/drawing/2010/main" xmlns="" w="9525">
                   <a:solidFill>
                     <a:srgbClr val="000000"/>
                   </a:solidFill>
@@ -1471,7 +1471,7 @@
             </a:ln>
             <a:extLst>
               <a:ext uri="{91240B29-F687-4f45-9708-019B960494DF}">
-                <a14:hiddenLine xmlns="" xmlns:a14="http://schemas.microsoft.com/office/drawing/2010/main" w="9525">
+                <a14:hiddenLine xmlns:a14="http://schemas.microsoft.com/office/drawing/2010/main" xmlns="" w="9525">
                   <a:solidFill>
                     <a:srgbClr val="000000"/>
                   </a:solidFill>
@@ -1533,7 +1533,7 @@
             </a:ln>
             <a:extLst>
               <a:ext uri="{91240B29-F687-4f45-9708-019B960494DF}">
-                <a14:hiddenLine xmlns="" xmlns:a14="http://schemas.microsoft.com/office/drawing/2010/main" w="9525">
+                <a14:hiddenLine xmlns:a14="http://schemas.microsoft.com/office/drawing/2010/main" xmlns="" w="9525">
                   <a:solidFill>
                     <a:srgbClr val="000000"/>
                   </a:solidFill>
@@ -1623,7 +1623,7 @@
             </a:ln>
             <a:extLst>
               <a:ext uri="{91240B29-F687-4f45-9708-019B960494DF}">
-                <a14:hiddenLine xmlns="" xmlns:a14="http://schemas.microsoft.com/office/drawing/2010/main" w="9525">
+                <a14:hiddenLine xmlns:a14="http://schemas.microsoft.com/office/drawing/2010/main" xmlns="" w="9525">
                   <a:solidFill>
                     <a:srgbClr val="000000"/>
                   </a:solidFill>
@@ -1713,7 +1713,7 @@
             </a:ln>
             <a:extLst>
               <a:ext uri="{91240B29-F687-4f45-9708-019B960494DF}">
-                <a14:hiddenLine xmlns="" xmlns:a14="http://schemas.microsoft.com/office/drawing/2010/main" w="9525">
+                <a14:hiddenLine xmlns:a14="http://schemas.microsoft.com/office/drawing/2010/main" xmlns="" w="9525">
                   <a:solidFill>
                     <a:srgbClr val="000000"/>
                   </a:solidFill>
@@ -1769,7 +1769,7 @@
             </a:ln>
             <a:extLst>
               <a:ext uri="{91240B29-F687-4f45-9708-019B960494DF}">
-                <a14:hiddenLine xmlns="" xmlns:a14="http://schemas.microsoft.com/office/drawing/2010/main" w="9525">
+                <a14:hiddenLine xmlns:a14="http://schemas.microsoft.com/office/drawing/2010/main" xmlns="" w="9525">
                   <a:solidFill>
                     <a:srgbClr val="000000"/>
                   </a:solidFill>
@@ -1859,7 +1859,7 @@
             </a:ln>
             <a:extLst>
               <a:ext uri="{91240B29-F687-4f45-9708-019B960494DF}">
-                <a14:hiddenLine xmlns="" xmlns:a14="http://schemas.microsoft.com/office/drawing/2010/main" w="9525">
+                <a14:hiddenLine xmlns:a14="http://schemas.microsoft.com/office/drawing/2010/main" xmlns="" w="9525">
                   <a:solidFill>
                     <a:srgbClr val="000000"/>
                   </a:solidFill>
@@ -1915,7 +1915,7 @@
             </a:ln>
             <a:extLst>
               <a:ext uri="{91240B29-F687-4f45-9708-019B960494DF}">
-                <a14:hiddenLine xmlns="" xmlns:a14="http://schemas.microsoft.com/office/drawing/2010/main" w="9525">
+                <a14:hiddenLine xmlns:a14="http://schemas.microsoft.com/office/drawing/2010/main" xmlns="" w="9525">
                   <a:solidFill>
                     <a:srgbClr val="000000"/>
                   </a:solidFill>
@@ -2005,7 +2005,7 @@
             </a:ln>
             <a:extLst>
               <a:ext uri="{91240B29-F687-4f45-9708-019B960494DF}">
-                <a14:hiddenLine xmlns="" xmlns:a14="http://schemas.microsoft.com/office/drawing/2010/main" w="9525">
+                <a14:hiddenLine xmlns:a14="http://schemas.microsoft.com/office/drawing/2010/main" xmlns="" w="9525">
                   <a:solidFill>
                     <a:srgbClr val="000000"/>
                   </a:solidFill>
@@ -2073,7 +2073,7 @@
             </a:ln>
             <a:extLst>
               <a:ext uri="{91240B29-F687-4f45-9708-019B960494DF}">
-                <a14:hiddenLine xmlns="" xmlns:a14="http://schemas.microsoft.com/office/drawing/2010/main" w="9525">
+                <a14:hiddenLine xmlns:a14="http://schemas.microsoft.com/office/drawing/2010/main" xmlns="" w="9525">
                   <a:solidFill>
                     <a:srgbClr val="000000"/>
                   </a:solidFill>
@@ -2163,7 +2163,7 @@
             </a:ln>
             <a:extLst>
               <a:ext uri="{91240B29-F687-4f45-9708-019B960494DF}">
-                <a14:hiddenLine xmlns="" xmlns:a14="http://schemas.microsoft.com/office/drawing/2010/main" w="9525">
+                <a14:hiddenLine xmlns:a14="http://schemas.microsoft.com/office/drawing/2010/main" xmlns="" w="9525">
                   <a:solidFill>
                     <a:srgbClr val="000000"/>
                   </a:solidFill>
@@ -2231,7 +2231,7 @@
             </a:ln>
             <a:extLst>
               <a:ext uri="{91240B29-F687-4f45-9708-019B960494DF}">
-                <a14:hiddenLine xmlns="" xmlns:a14="http://schemas.microsoft.com/office/drawing/2010/main" w="9525">
+                <a14:hiddenLine xmlns:a14="http://schemas.microsoft.com/office/drawing/2010/main" xmlns="" w="9525">
                   <a:solidFill>
                     <a:srgbClr val="000000"/>
                   </a:solidFill>
@@ -2321,7 +2321,7 @@
             </a:ln>
             <a:extLst>
               <a:ext uri="{91240B29-F687-4f45-9708-019B960494DF}">
-                <a14:hiddenLine xmlns="" xmlns:a14="http://schemas.microsoft.com/office/drawing/2010/main" w="9525">
+                <a14:hiddenLine xmlns:a14="http://schemas.microsoft.com/office/drawing/2010/main" xmlns="" w="9525">
                   <a:solidFill>
                     <a:srgbClr val="000000"/>
                   </a:solidFill>
@@ -2355,7 +2355,7 @@
             </a:ln>
             <a:extLst>
               <a:ext uri="{91240B29-F687-4f45-9708-019B960494DF}">
-                <a14:hiddenLine xmlns="" xmlns:a14="http://schemas.microsoft.com/office/drawing/2010/main" w="9525">
+                <a14:hiddenLine xmlns:a14="http://schemas.microsoft.com/office/drawing/2010/main" xmlns="" w="9525">
                   <a:solidFill>
                     <a:srgbClr val="000000"/>
                   </a:solidFill>
@@ -2445,7 +2445,7 @@
             </a:ln>
             <a:extLst>
               <a:ext uri="{91240B29-F687-4f45-9708-019B960494DF}">
-                <a14:hiddenLine xmlns="" xmlns:a14="http://schemas.microsoft.com/office/drawing/2010/main" w="9525">
+                <a14:hiddenLine xmlns:a14="http://schemas.microsoft.com/office/drawing/2010/main" xmlns="" w="9525">
                   <a:solidFill>
                     <a:srgbClr val="000000"/>
                   </a:solidFill>
@@ -2507,7 +2507,7 @@
             </a:ln>
             <a:extLst>
               <a:ext uri="{91240B29-F687-4f45-9708-019B960494DF}">
-                <a14:hiddenLine xmlns="" xmlns:a14="http://schemas.microsoft.com/office/drawing/2010/main" w="9525">
+                <a14:hiddenLine xmlns:a14="http://schemas.microsoft.com/office/drawing/2010/main" xmlns="" w="9525">
                   <a:solidFill>
                     <a:srgbClr val="000000"/>
                   </a:solidFill>
@@ -2569,7 +2569,7 @@
             </a:ln>
             <a:extLst>
               <a:ext uri="{91240B29-F687-4f45-9708-019B960494DF}">
-                <a14:hiddenLine xmlns="" xmlns:a14="http://schemas.microsoft.com/office/drawing/2010/main" w="9525">
+                <a14:hiddenLine xmlns:a14="http://schemas.microsoft.com/office/drawing/2010/main" xmlns="" w="9525">
                   <a:solidFill>
                     <a:srgbClr val="000000"/>
                   </a:solidFill>
@@ -2659,7 +2659,7 @@
             </a:ln>
             <a:extLst>
               <a:ext uri="{91240B29-F687-4f45-9708-019B960494DF}">
-                <a14:hiddenLine xmlns="" xmlns:a14="http://schemas.microsoft.com/office/drawing/2010/main" w="9525">
+                <a14:hiddenLine xmlns:a14="http://schemas.microsoft.com/office/drawing/2010/main" xmlns="" w="9525">
                   <a:solidFill>
                     <a:srgbClr val="000000"/>
                   </a:solidFill>
@@ -2727,7 +2727,7 @@
             </a:ln>
             <a:extLst>
               <a:ext uri="{91240B29-F687-4f45-9708-019B960494DF}">
-                <a14:hiddenLine xmlns="" xmlns:a14="http://schemas.microsoft.com/office/drawing/2010/main" w="9525">
+                <a14:hiddenLine xmlns:a14="http://schemas.microsoft.com/office/drawing/2010/main" xmlns="" w="9525">
                   <a:solidFill>
                     <a:srgbClr val="000000"/>
                   </a:solidFill>
@@ -2789,7 +2789,7 @@
             </a:ln>
             <a:extLst>
               <a:ext uri="{91240B29-F687-4f45-9708-019B960494DF}">
-                <a14:hiddenLine xmlns="" xmlns:a14="http://schemas.microsoft.com/office/drawing/2010/main" w="9525">
+                <a14:hiddenLine xmlns:a14="http://schemas.microsoft.com/office/drawing/2010/main" xmlns="" w="9525">
                   <a:solidFill>
                     <a:srgbClr val="000000"/>
                   </a:solidFill>
@@ -2879,7 +2879,7 @@
             </a:ln>
             <a:extLst>
               <a:ext uri="{91240B29-F687-4f45-9708-019B960494DF}">
-                <a14:hiddenLine xmlns="" xmlns:a14="http://schemas.microsoft.com/office/drawing/2010/main" w="9525">
+                <a14:hiddenLine xmlns:a14="http://schemas.microsoft.com/office/drawing/2010/main" xmlns="" w="9525">
                   <a:solidFill>
                     <a:srgbClr val="000000"/>
                   </a:solidFill>
@@ -2941,7 +2941,7 @@
             </a:ln>
             <a:extLst>
               <a:ext uri="{91240B29-F687-4f45-9708-019B960494DF}">
-                <a14:hiddenLine xmlns="" xmlns:a14="http://schemas.microsoft.com/office/drawing/2010/main" w="9525">
+                <a14:hiddenLine xmlns:a14="http://schemas.microsoft.com/office/drawing/2010/main" xmlns="" w="9525">
                   <a:solidFill>
                     <a:srgbClr val="000000"/>
                   </a:solidFill>
@@ -3031,7 +3031,7 @@
             </a:ln>
             <a:extLst>
               <a:ext uri="{91240B29-F687-4f45-9708-019B960494DF}">
-                <a14:hiddenLine xmlns="" xmlns:a14="http://schemas.microsoft.com/office/drawing/2010/main" w="9525">
+                <a14:hiddenLine xmlns:a14="http://schemas.microsoft.com/office/drawing/2010/main" xmlns="" w="9525">
                   <a:solidFill>
                     <a:srgbClr val="000000"/>
                   </a:solidFill>
@@ -3093,7 +3093,7 @@
             </a:ln>
             <a:extLst>
               <a:ext uri="{91240B29-F687-4f45-9708-019B960494DF}">
-                <a14:hiddenLine xmlns="" xmlns:a14="http://schemas.microsoft.com/office/drawing/2010/main" w="9525">
+                <a14:hiddenLine xmlns:a14="http://schemas.microsoft.com/office/drawing/2010/main" xmlns="" w="9525">
                   <a:solidFill>
                     <a:srgbClr val="000000"/>
                   </a:solidFill>
@@ -3183,7 +3183,7 @@
             </a:ln>
             <a:extLst>
               <a:ext uri="{91240B29-F687-4f45-9708-019B960494DF}">
-                <a14:hiddenLine xmlns="" xmlns:a14="http://schemas.microsoft.com/office/drawing/2010/main" w="9525">
+                <a14:hiddenLine xmlns:a14="http://schemas.microsoft.com/office/drawing/2010/main" xmlns="" w="9525">
                   <a:solidFill>
                     <a:srgbClr val="000000"/>
                   </a:solidFill>
@@ -3217,7 +3217,7 @@
             </a:ln>
             <a:extLst>
               <a:ext uri="{91240B29-F687-4f45-9708-019B960494DF}">
-                <a14:hiddenLine xmlns="" xmlns:a14="http://schemas.microsoft.com/office/drawing/2010/main" w="9525">
+                <a14:hiddenLine xmlns:a14="http://schemas.microsoft.com/office/drawing/2010/main" xmlns="" w="9525">
                   <a:solidFill>
                     <a:srgbClr val="000000"/>
                   </a:solidFill>
@@ -3282,7 +3282,7 @@
             </a:ln>
             <a:extLst>
               <a:ext uri="{91240B29-F687-4f45-9708-019B960494DF}">
-                <a14:hiddenLine xmlns="" xmlns:a14="http://schemas.microsoft.com/office/drawing/2010/main" w="9525">
+                <a14:hiddenLine xmlns:a14="http://schemas.microsoft.com/office/drawing/2010/main" xmlns="" w="9525">
                   <a:solidFill>
                     <a:srgbClr val="000000"/>
                   </a:solidFill>
@@ -3372,7 +3372,7 @@
             </a:ln>
             <a:extLst>
               <a:ext uri="{91240B29-F687-4f45-9708-019B960494DF}">
-                <a14:hiddenLine xmlns="" xmlns:a14="http://schemas.microsoft.com/office/drawing/2010/main" w="9525">
+                <a14:hiddenLine xmlns:a14="http://schemas.microsoft.com/office/drawing/2010/main" xmlns="" w="9525">
                   <a:solidFill>
                     <a:srgbClr val="000000"/>
                   </a:solidFill>
@@ -3434,7 +3434,7 @@
             </a:ln>
             <a:extLst>
               <a:ext uri="{91240B29-F687-4f45-9708-019B960494DF}">
-                <a14:hiddenLine xmlns="" xmlns:a14="http://schemas.microsoft.com/office/drawing/2010/main" w="9525">
+                <a14:hiddenLine xmlns:a14="http://schemas.microsoft.com/office/drawing/2010/main" xmlns="" w="9525">
                   <a:solidFill>
                     <a:srgbClr val="000000"/>
                   </a:solidFill>
@@ -3524,7 +3524,7 @@
             </a:ln>
             <a:extLst>
               <a:ext uri="{91240B29-F687-4f45-9708-019B960494DF}">
-                <a14:hiddenLine xmlns="" xmlns:a14="http://schemas.microsoft.com/office/drawing/2010/main" w="9525">
+                <a14:hiddenLine xmlns:a14="http://schemas.microsoft.com/office/drawing/2010/main" xmlns="" w="9525">
                   <a:solidFill>
                     <a:srgbClr val="000000"/>
                   </a:solidFill>
@@ -3614,7 +3614,7 @@
             </a:ln>
             <a:extLst>
               <a:ext uri="{91240B29-F687-4f45-9708-019B960494DF}">
-                <a14:hiddenLine xmlns="" xmlns:a14="http://schemas.microsoft.com/office/drawing/2010/main" w="9525">
+                <a14:hiddenLine xmlns:a14="http://schemas.microsoft.com/office/drawing/2010/main" xmlns="" w="9525">
                   <a:solidFill>
                     <a:srgbClr val="000000"/>
                   </a:solidFill>
@@ -3679,7 +3679,7 @@
             </a:ln>
             <a:extLst>
               <a:ext uri="{91240B29-F687-4f45-9708-019B960494DF}">
-                <a14:hiddenLine xmlns="" xmlns:a14="http://schemas.microsoft.com/office/drawing/2010/main" w="9525">
+                <a14:hiddenLine xmlns:a14="http://schemas.microsoft.com/office/drawing/2010/main" xmlns="" w="9525">
                   <a:solidFill>
                     <a:srgbClr val="000000"/>
                   </a:solidFill>
@@ -3741,7 +3741,7 @@
             </a:ln>
             <a:extLst>
               <a:ext uri="{91240B29-F687-4f45-9708-019B960494DF}">
-                <a14:hiddenLine xmlns="" xmlns:a14="http://schemas.microsoft.com/office/drawing/2010/main" w="9525">
+                <a14:hiddenLine xmlns:a14="http://schemas.microsoft.com/office/drawing/2010/main" xmlns="" w="9525">
                   <a:solidFill>
                     <a:srgbClr val="000000"/>
                   </a:solidFill>
@@ -3831,7 +3831,7 @@
             </a:ln>
             <a:extLst>
               <a:ext uri="{91240B29-F687-4f45-9708-019B960494DF}">
-                <a14:hiddenLine xmlns="" xmlns:a14="http://schemas.microsoft.com/office/drawing/2010/main" w="9525">
+                <a14:hiddenLine xmlns:a14="http://schemas.microsoft.com/office/drawing/2010/main" xmlns="" w="9525">
                   <a:solidFill>
                     <a:srgbClr val="000000"/>
                   </a:solidFill>
@@ -3921,7 +3921,7 @@
             </a:ln>
             <a:extLst>
               <a:ext uri="{91240B29-F687-4f45-9708-019B960494DF}">
-                <a14:hiddenLine xmlns="" xmlns:a14="http://schemas.microsoft.com/office/drawing/2010/main" w="9525">
+                <a14:hiddenLine xmlns:a14="http://schemas.microsoft.com/office/drawing/2010/main" xmlns="" w="9525">
                   <a:solidFill>
                     <a:srgbClr val="000000"/>
                   </a:solidFill>
@@ -3983,7 +3983,7 @@
             </a:ln>
             <a:extLst>
               <a:ext uri="{91240B29-F687-4f45-9708-019B960494DF}">
-                <a14:hiddenLine xmlns="" xmlns:a14="http://schemas.microsoft.com/office/drawing/2010/main" w="9525">
+                <a14:hiddenLine xmlns:a14="http://schemas.microsoft.com/office/drawing/2010/main" xmlns="" w="9525">
                   <a:solidFill>
                     <a:srgbClr val="000000"/>
                   </a:solidFill>
@@ -4103,7 +4103,7 @@
             </a:ln>
             <a:extLst>
               <a:ext uri="{91240B29-F687-4f45-9708-019B960494DF}">
-                <a14:hiddenLine xmlns="" xmlns:a14="http://schemas.microsoft.com/office/drawing/2010/main" w="9525">
+                <a14:hiddenLine xmlns:a14="http://schemas.microsoft.com/office/drawing/2010/main" xmlns="" w="9525">
                   <a:solidFill>
                     <a:srgbClr val="000000"/>
                   </a:solidFill>
@@ -4171,7 +4171,7 @@
             </a:ln>
             <a:extLst>
               <a:ext uri="{91240B29-F687-4f45-9708-019B960494DF}">
-                <a14:hiddenLine xmlns="" xmlns:a14="http://schemas.microsoft.com/office/drawing/2010/main" w="9525">
+                <a14:hiddenLine xmlns:a14="http://schemas.microsoft.com/office/drawing/2010/main" xmlns="" w="9525">
                   <a:solidFill>
                     <a:srgbClr val="000000"/>
                   </a:solidFill>
@@ -4261,7 +4261,7 @@
             </a:ln>
             <a:extLst>
               <a:ext uri="{91240B29-F687-4f45-9708-019B960494DF}">
-                <a14:hiddenLine xmlns="" xmlns:a14="http://schemas.microsoft.com/office/drawing/2010/main" w="9525">
+                <a14:hiddenLine xmlns:a14="http://schemas.microsoft.com/office/drawing/2010/main" xmlns="" w="9525">
                   <a:solidFill>
                     <a:srgbClr val="000000"/>
                   </a:solidFill>
@@ -9068,7 +9068,7 @@
           <a:noFill/>
           <a:extLst>
             <a:ext uri="{909E8E84-426E-40dd-AFC4-6F175D3DCCD1}">
-              <a14:hiddenFill xmlns="" xmlns:a14="http://schemas.microsoft.com/office/drawing/2010/main">
+              <a14:hiddenFill xmlns:a14="http://schemas.microsoft.com/office/drawing/2010/main" xmlns="">
                 <a:solidFill>
                   <a:srgbClr val="FFFFFF"/>
                 </a:solidFill>
@@ -9142,7 +9142,7 @@
               </a:ln>
               <a:extLst>
                 <a:ext uri="{91240B29-F687-4f45-9708-019B960494DF}">
-                  <a14:hiddenLine xmlns="" xmlns:a14="http://schemas.microsoft.com/office/drawing/2010/main" w="9525">
+                  <a14:hiddenLine xmlns:a14="http://schemas.microsoft.com/office/drawing/2010/main" xmlns="" w="9525">
                     <a:solidFill>
                       <a:srgbClr val="000000"/>
                     </a:solidFill>
@@ -9232,7 +9232,7 @@
               </a:ln>
               <a:extLst>
                 <a:ext uri="{91240B29-F687-4f45-9708-019B960494DF}">
-                  <a14:hiddenLine xmlns="" xmlns:a14="http://schemas.microsoft.com/office/drawing/2010/main" w="9525">
+                  <a14:hiddenLine xmlns:a14="http://schemas.microsoft.com/office/drawing/2010/main" xmlns="" w="9525">
                     <a:solidFill>
                       <a:srgbClr val="000000"/>
                     </a:solidFill>
@@ -9322,7 +9322,7 @@
               </a:ln>
               <a:extLst>
                 <a:ext uri="{91240B29-F687-4f45-9708-019B960494DF}">
-                  <a14:hiddenLine xmlns="" xmlns:a14="http://schemas.microsoft.com/office/drawing/2010/main" w="9525">
+                  <a14:hiddenLine xmlns:a14="http://schemas.microsoft.com/office/drawing/2010/main" xmlns="" w="9525">
                     <a:solidFill>
                       <a:srgbClr val="000000"/>
                     </a:solidFill>
@@ -9384,7 +9384,7 @@
               </a:ln>
               <a:extLst>
                 <a:ext uri="{91240B29-F687-4f45-9708-019B960494DF}">
-                  <a14:hiddenLine xmlns="" xmlns:a14="http://schemas.microsoft.com/office/drawing/2010/main" w="9525">
+                  <a14:hiddenLine xmlns:a14="http://schemas.microsoft.com/office/drawing/2010/main" xmlns="" w="9525">
                     <a:solidFill>
                       <a:srgbClr val="000000"/>
                     </a:solidFill>
@@ -9474,7 +9474,7 @@
               </a:ln>
               <a:extLst>
                 <a:ext uri="{91240B29-F687-4f45-9708-019B960494DF}">
-                  <a14:hiddenLine xmlns="" xmlns:a14="http://schemas.microsoft.com/office/drawing/2010/main" w="9525">
+                  <a14:hiddenLine xmlns:a14="http://schemas.microsoft.com/office/drawing/2010/main" xmlns="" w="9525">
                     <a:solidFill>
                       <a:srgbClr val="000000"/>
                     </a:solidFill>
@@ -9536,7 +9536,7 @@
               </a:ln>
               <a:extLst>
                 <a:ext uri="{91240B29-F687-4f45-9708-019B960494DF}">
-                  <a14:hiddenLine xmlns="" xmlns:a14="http://schemas.microsoft.com/office/drawing/2010/main" w="9525">
+                  <a14:hiddenLine xmlns:a14="http://schemas.microsoft.com/office/drawing/2010/main" xmlns="" w="9525">
                     <a:solidFill>
                       <a:srgbClr val="000000"/>
                     </a:solidFill>
@@ -9598,7 +9598,7 @@
               </a:ln>
               <a:extLst>
                 <a:ext uri="{91240B29-F687-4f45-9708-019B960494DF}">
-                  <a14:hiddenLine xmlns="" xmlns:a14="http://schemas.microsoft.com/office/drawing/2010/main" w="9525">
+                  <a14:hiddenLine xmlns:a14="http://schemas.microsoft.com/office/drawing/2010/main" xmlns="" w="9525">
                     <a:solidFill>
                       <a:srgbClr val="000000"/>
                     </a:solidFill>
@@ -9688,7 +9688,7 @@
               </a:ln>
               <a:extLst>
                 <a:ext uri="{91240B29-F687-4f45-9708-019B960494DF}">
-                  <a14:hiddenLine xmlns="" xmlns:a14="http://schemas.microsoft.com/office/drawing/2010/main" w="9525">
+                  <a14:hiddenLine xmlns:a14="http://schemas.microsoft.com/office/drawing/2010/main" xmlns="" w="9525">
                     <a:solidFill>
                       <a:srgbClr val="000000"/>
                     </a:solidFill>
@@ -9778,7 +9778,7 @@
               </a:ln>
               <a:extLst>
                 <a:ext uri="{91240B29-F687-4f45-9708-019B960494DF}">
-                  <a14:hiddenLine xmlns="" xmlns:a14="http://schemas.microsoft.com/office/drawing/2010/main" w="9525">
+                  <a14:hiddenLine xmlns:a14="http://schemas.microsoft.com/office/drawing/2010/main" xmlns="" w="9525">
                     <a:solidFill>
                       <a:srgbClr val="000000"/>
                     </a:solidFill>
@@ -9840,7 +9840,7 @@
               </a:ln>
               <a:extLst>
                 <a:ext uri="{91240B29-F687-4f45-9708-019B960494DF}">
-                  <a14:hiddenLine xmlns="" xmlns:a14="http://schemas.microsoft.com/office/drawing/2010/main" w="9525">
+                  <a14:hiddenLine xmlns:a14="http://schemas.microsoft.com/office/drawing/2010/main" xmlns="" w="9525">
                     <a:solidFill>
                       <a:srgbClr val="000000"/>
                     </a:solidFill>
@@ -9950,7 +9950,7 @@
               </a:ln>
               <a:extLst>
                 <a:ext uri="{91240B29-F687-4f45-9708-019B960494DF}">
-                  <a14:hiddenLine xmlns="" xmlns:a14="http://schemas.microsoft.com/office/drawing/2010/main" w="9525">
+                  <a14:hiddenLine xmlns:a14="http://schemas.microsoft.com/office/drawing/2010/main" xmlns="" w="9525">
                     <a:solidFill>
                       <a:srgbClr val="000000"/>
                     </a:solidFill>
@@ -10034,7 +10034,7 @@
               </a:ln>
               <a:extLst>
                 <a:ext uri="{91240B29-F687-4f45-9708-019B960494DF}">
-                  <a14:hiddenLine xmlns="" xmlns:a14="http://schemas.microsoft.com/office/drawing/2010/main" w="9525">
+                  <a14:hiddenLine xmlns:a14="http://schemas.microsoft.com/office/drawing/2010/main" xmlns="" w="9525">
                     <a:solidFill>
                       <a:srgbClr val="000000"/>
                     </a:solidFill>
@@ -10096,7 +10096,7 @@
               </a:ln>
               <a:extLst>
                 <a:ext uri="{91240B29-F687-4f45-9708-019B960494DF}">
-                  <a14:hiddenLine xmlns="" xmlns:a14="http://schemas.microsoft.com/office/drawing/2010/main" w="9525">
+                  <a14:hiddenLine xmlns:a14="http://schemas.microsoft.com/office/drawing/2010/main" xmlns="" w="9525">
                     <a:solidFill>
                       <a:srgbClr val="000000"/>
                     </a:solidFill>
@@ -10158,7 +10158,7 @@
               </a:ln>
               <a:extLst>
                 <a:ext uri="{91240B29-F687-4f45-9708-019B960494DF}">
-                  <a14:hiddenLine xmlns="" xmlns:a14="http://schemas.microsoft.com/office/drawing/2010/main" w="9525">
+                  <a14:hiddenLine xmlns:a14="http://schemas.microsoft.com/office/drawing/2010/main" xmlns="" w="9525">
                     <a:solidFill>
                       <a:srgbClr val="000000"/>
                     </a:solidFill>
@@ -10248,7 +10248,7 @@
               </a:ln>
               <a:extLst>
                 <a:ext uri="{91240B29-F687-4f45-9708-019B960494DF}">
-                  <a14:hiddenLine xmlns="" xmlns:a14="http://schemas.microsoft.com/office/drawing/2010/main" w="9525">
+                  <a14:hiddenLine xmlns:a14="http://schemas.microsoft.com/office/drawing/2010/main" xmlns="" w="9525">
                     <a:solidFill>
                       <a:srgbClr val="000000"/>
                     </a:solidFill>
@@ -10282,7 +10282,7 @@
               </a:ln>
               <a:extLst>
                 <a:ext uri="{91240B29-F687-4f45-9708-019B960494DF}">
-                  <a14:hiddenLine xmlns="" xmlns:a14="http://schemas.microsoft.com/office/drawing/2010/main" w="9525">
+                  <a14:hiddenLine xmlns:a14="http://schemas.microsoft.com/office/drawing/2010/main" xmlns="" w="9525">
                     <a:solidFill>
                       <a:srgbClr val="000000"/>
                     </a:solidFill>
@@ -10347,7 +10347,7 @@
               </a:ln>
               <a:extLst>
                 <a:ext uri="{91240B29-F687-4f45-9708-019B960494DF}">
-                  <a14:hiddenLine xmlns="" xmlns:a14="http://schemas.microsoft.com/office/drawing/2010/main" w="9525">
+                  <a14:hiddenLine xmlns:a14="http://schemas.microsoft.com/office/drawing/2010/main" xmlns="" w="9525">
                     <a:solidFill>
                       <a:srgbClr val="000000"/>
                     </a:solidFill>
@@ -10437,7 +10437,7 @@
               </a:ln>
               <a:extLst>
                 <a:ext uri="{91240B29-F687-4f45-9708-019B960494DF}">
-                  <a14:hiddenLine xmlns="" xmlns:a14="http://schemas.microsoft.com/office/drawing/2010/main" w="9525">
+                  <a14:hiddenLine xmlns:a14="http://schemas.microsoft.com/office/drawing/2010/main" xmlns="" w="9525">
                     <a:solidFill>
                       <a:srgbClr val="000000"/>
                     </a:solidFill>
@@ -10499,7 +10499,7 @@
               </a:ln>
               <a:extLst>
                 <a:ext uri="{91240B29-F687-4f45-9708-019B960494DF}">
-                  <a14:hiddenLine xmlns="" xmlns:a14="http://schemas.microsoft.com/office/drawing/2010/main" w="9525">
+                  <a14:hiddenLine xmlns:a14="http://schemas.microsoft.com/office/drawing/2010/main" xmlns="" w="9525">
                     <a:solidFill>
                       <a:srgbClr val="000000"/>
                     </a:solidFill>
@@ -10589,7 +10589,7 @@
               </a:ln>
               <a:extLst>
                 <a:ext uri="{91240B29-F687-4f45-9708-019B960494DF}">
-                  <a14:hiddenLine xmlns="" xmlns:a14="http://schemas.microsoft.com/office/drawing/2010/main" w="9525">
+                  <a14:hiddenLine xmlns:a14="http://schemas.microsoft.com/office/drawing/2010/main" xmlns="" w="9525">
                     <a:solidFill>
                       <a:srgbClr val="000000"/>
                     </a:solidFill>
@@ -10654,7 +10654,7 @@
               </a:ln>
               <a:extLst>
                 <a:ext uri="{91240B29-F687-4f45-9708-019B960494DF}">
-                  <a14:hiddenLine xmlns="" xmlns:a14="http://schemas.microsoft.com/office/drawing/2010/main" w="9525">
+                  <a14:hiddenLine xmlns:a14="http://schemas.microsoft.com/office/drawing/2010/main" xmlns="" w="9525">
                     <a:solidFill>
                       <a:srgbClr val="000000"/>
                     </a:solidFill>
@@ -10716,7 +10716,7 @@
               </a:ln>
               <a:extLst>
                 <a:ext uri="{91240B29-F687-4f45-9708-019B960494DF}">
-                  <a14:hiddenLine xmlns="" xmlns:a14="http://schemas.microsoft.com/office/drawing/2010/main" w="9525">
+                  <a14:hiddenLine xmlns:a14="http://schemas.microsoft.com/office/drawing/2010/main" xmlns="" w="9525">
                     <a:solidFill>
                       <a:srgbClr val="000000"/>
                     </a:solidFill>
@@ -10806,7 +10806,7 @@
               </a:ln>
               <a:extLst>
                 <a:ext uri="{91240B29-F687-4f45-9708-019B960494DF}">
-                  <a14:hiddenLine xmlns="" xmlns:a14="http://schemas.microsoft.com/office/drawing/2010/main" w="9525">
+                  <a14:hiddenLine xmlns:a14="http://schemas.microsoft.com/office/drawing/2010/main" xmlns="" w="9525">
                     <a:solidFill>
                       <a:srgbClr val="000000"/>
                     </a:solidFill>
@@ -10896,7 +10896,7 @@
               </a:ln>
               <a:extLst>
                 <a:ext uri="{91240B29-F687-4f45-9708-019B960494DF}">
-                  <a14:hiddenLine xmlns="" xmlns:a14="http://schemas.microsoft.com/office/drawing/2010/main" w="9525">
+                  <a14:hiddenLine xmlns:a14="http://schemas.microsoft.com/office/drawing/2010/main" xmlns="" w="9525">
                     <a:solidFill>
                       <a:srgbClr val="000000"/>
                     </a:solidFill>
@@ -10961,7 +10961,7 @@
               </a:ln>
               <a:extLst>
                 <a:ext uri="{91240B29-F687-4f45-9708-019B960494DF}">
-                  <a14:hiddenLine xmlns="" xmlns:a14="http://schemas.microsoft.com/office/drawing/2010/main" w="9525">
+                  <a14:hiddenLine xmlns:a14="http://schemas.microsoft.com/office/drawing/2010/main" xmlns="" w="9525">
                     <a:solidFill>
                       <a:srgbClr val="000000"/>
                     </a:solidFill>
@@ -11081,7 +11081,7 @@
               </a:ln>
               <a:extLst>
                 <a:ext uri="{91240B29-F687-4f45-9708-019B960494DF}">
-                  <a14:hiddenLine xmlns="" xmlns:a14="http://schemas.microsoft.com/office/drawing/2010/main" w="9525">
+                  <a14:hiddenLine xmlns:a14="http://schemas.microsoft.com/office/drawing/2010/main" xmlns="" w="9525">
                     <a:solidFill>
                       <a:srgbClr val="000000"/>
                     </a:solidFill>
@@ -11179,7 +11179,7 @@
               </a:ln>
               <a:extLst>
                 <a:ext uri="{91240B29-F687-4f45-9708-019B960494DF}">
-                  <a14:hiddenLine xmlns="" xmlns:a14="http://schemas.microsoft.com/office/drawing/2010/main" w="9525">
+                  <a14:hiddenLine xmlns:a14="http://schemas.microsoft.com/office/drawing/2010/main" xmlns="" w="9525">
                     <a:solidFill>
                       <a:srgbClr val="000000"/>
                     </a:solidFill>
@@ -11294,7 +11294,7 @@
               </a:ln>
               <a:extLst>
                 <a:ext uri="{91240B29-F687-4f45-9708-019B960494DF}">
-                  <a14:hiddenLine xmlns="" xmlns:a14="http://schemas.microsoft.com/office/drawing/2010/main" w="9525">
+                  <a14:hiddenLine xmlns:a14="http://schemas.microsoft.com/office/drawing/2010/main" xmlns="" w="9525">
                     <a:solidFill>
                       <a:srgbClr val="000000"/>
                     </a:solidFill>
@@ -11384,7 +11384,7 @@
               </a:ln>
               <a:extLst>
                 <a:ext uri="{91240B29-F687-4f45-9708-019B960494DF}">
-                  <a14:hiddenLine xmlns="" xmlns:a14="http://schemas.microsoft.com/office/drawing/2010/main" w="9525">
+                  <a14:hiddenLine xmlns:a14="http://schemas.microsoft.com/office/drawing/2010/main" xmlns="" w="9525">
                     <a:solidFill>
                       <a:srgbClr val="000000"/>
                     </a:solidFill>
@@ -11449,7 +11449,7 @@
               </a:ln>
               <a:extLst>
                 <a:ext uri="{91240B29-F687-4f45-9708-019B960494DF}">
-                  <a14:hiddenLine xmlns="" xmlns:a14="http://schemas.microsoft.com/office/drawing/2010/main" w="9525">
+                  <a14:hiddenLine xmlns:a14="http://schemas.microsoft.com/office/drawing/2010/main" xmlns="" w="9525">
                     <a:solidFill>
                       <a:srgbClr val="000000"/>
                     </a:solidFill>
@@ -11539,7 +11539,7 @@
               </a:ln>
               <a:extLst>
                 <a:ext uri="{91240B29-F687-4f45-9708-019B960494DF}">
-                  <a14:hiddenLine xmlns="" xmlns:a14="http://schemas.microsoft.com/office/drawing/2010/main" w="9525">
+                  <a14:hiddenLine xmlns:a14="http://schemas.microsoft.com/office/drawing/2010/main" xmlns="" w="9525">
                     <a:solidFill>
                       <a:srgbClr val="000000"/>
                     </a:solidFill>
@@ -11607,7 +11607,7 @@
               </a:ln>
               <a:extLst>
                 <a:ext uri="{91240B29-F687-4f45-9708-019B960494DF}">
-                  <a14:hiddenLine xmlns="" xmlns:a14="http://schemas.microsoft.com/office/drawing/2010/main" w="9525">
+                  <a14:hiddenLine xmlns:a14="http://schemas.microsoft.com/office/drawing/2010/main" xmlns="" w="9525">
                     <a:solidFill>
                       <a:srgbClr val="000000"/>
                     </a:solidFill>
@@ -11697,7 +11697,7 @@
               </a:ln>
               <a:extLst>
                 <a:ext uri="{91240B29-F687-4f45-9708-019B960494DF}">
-                  <a14:hiddenLine xmlns="" xmlns:a14="http://schemas.microsoft.com/office/drawing/2010/main" w="9525">
+                  <a14:hiddenLine xmlns:a14="http://schemas.microsoft.com/office/drawing/2010/main" xmlns="" w="9525">
                     <a:solidFill>
                       <a:srgbClr val="000000"/>
                     </a:solidFill>
@@ -11765,7 +11765,7 @@
               </a:ln>
               <a:extLst>
                 <a:ext uri="{91240B29-F687-4f45-9708-019B960494DF}">
-                  <a14:hiddenLine xmlns="" xmlns:a14="http://schemas.microsoft.com/office/drawing/2010/main" w="9525">
+                  <a14:hiddenLine xmlns:a14="http://schemas.microsoft.com/office/drawing/2010/main" xmlns="" w="9525">
                     <a:solidFill>
                       <a:srgbClr val="000000"/>
                     </a:solidFill>
@@ -11855,7 +11855,7 @@
               </a:ln>
               <a:extLst>
                 <a:ext uri="{91240B29-F687-4f45-9708-019B960494DF}">
-                  <a14:hiddenLine xmlns="" xmlns:a14="http://schemas.microsoft.com/office/drawing/2010/main" w="9525">
+                  <a14:hiddenLine xmlns:a14="http://schemas.microsoft.com/office/drawing/2010/main" xmlns="" w="9525">
                     <a:solidFill>
                       <a:srgbClr val="000000"/>
                     </a:solidFill>
@@ -11889,7 +11889,7 @@
               </a:ln>
               <a:extLst>
                 <a:ext uri="{91240B29-F687-4f45-9708-019B960494DF}">
-                  <a14:hiddenLine xmlns="" xmlns:a14="http://schemas.microsoft.com/office/drawing/2010/main" w="9525">
+                  <a14:hiddenLine xmlns:a14="http://schemas.microsoft.com/office/drawing/2010/main" xmlns="" w="9525">
                     <a:solidFill>
                       <a:srgbClr val="000000"/>
                     </a:solidFill>
@@ -13168,31 +13168,70 @@
           </a:p>
         </p:txBody>
       </p:sp>
-      <p:sp>
-        <p:nvSpPr>
-          <p:cNvPr id="3" name="Content Placeholder 2">
+      <p:pic>
+        <p:nvPicPr>
+          <p:cNvPr id="7" name="Picture 6" descr="A screenshot of a computer&#10;&#10;Description automatically generated">
             <a:extLst>
               <a:ext uri="{FF2B5EF4-FFF2-40B4-BE49-F238E27FC236}">
-                <a16:creationId xmlns:a16="http://schemas.microsoft.com/office/drawing/2014/main" id="{E453F73B-755D-79A8-C8DB-12E7F2DB815F}"/>
+                <a16:creationId xmlns:a16="http://schemas.microsoft.com/office/drawing/2014/main" id="{7B425F85-17CE-90BF-FC71-54753FCDDAFC}"/>
               </a:ext>
             </a:extLst>
           </p:cNvPr>
-          <p:cNvSpPr>
-            <a:spLocks noGrp="1"/>
-          </p:cNvSpPr>
+          <p:cNvPicPr>
+            <a:picLocks noChangeAspect="1"/>
+          </p:cNvPicPr>
+          <p:nvPr/>
+        </p:nvPicPr>
+        <p:blipFill>
+          <a:blip r:embed="rId2">
+            <a:extLst>
+              <a:ext uri="{28A0092B-C50C-407E-A947-70E740481C1C}">
+                <a14:useLocalDpi xmlns:a14="http://schemas.microsoft.com/office/drawing/2010/main" val="0"/>
+              </a:ext>
+            </a:extLst>
+          </a:blip>
+          <a:srcRect r="14035" b="24682"/>
+          <a:stretch/>
+        </p:blipFill>
+        <p:spPr>
+          <a:xfrm>
+            <a:off x="827327" y="1752410"/>
+            <a:ext cx="9024595" cy="1908557"/>
+          </a:xfrm>
+          <a:prstGeom prst="rect">
+            <a:avLst/>
+          </a:prstGeom>
+        </p:spPr>
+      </p:pic>
+      <p:pic>
+        <p:nvPicPr>
+          <p:cNvPr id="5" name="Content Placeholder 4">
+            <a:extLst>
+              <a:ext uri="{FF2B5EF4-FFF2-40B4-BE49-F238E27FC236}">
+                <a16:creationId xmlns:a16="http://schemas.microsoft.com/office/drawing/2014/main" id="{DA773DB2-7866-946C-ED7E-4B5F87061D58}"/>
+              </a:ext>
+            </a:extLst>
+          </p:cNvPr>
+          <p:cNvPicPr>
+            <a:picLocks noGrp="1" noChangeAspect="1"/>
+          </p:cNvPicPr>
           <p:nvPr>
             <p:ph idx="1"/>
           </p:nvPr>
-        </p:nvSpPr>
-        <p:spPr/>
-        <p:txBody>
-          <a:bodyPr/>
-          <a:lstStyle/>
-          <a:p>
-            <a:endParaRPr lang="en-US"/>
-          </a:p>
-        </p:txBody>
-      </p:sp>
+        </p:nvPicPr>
+        <p:blipFill>
+          <a:blip r:embed="rId3"/>
+          <a:stretch>
+            <a:fillRect/>
+          </a:stretch>
+        </p:blipFill>
+        <p:spPr>
+          <a:xfrm>
+            <a:off x="7101172" y="2605548"/>
+            <a:ext cx="4571191" cy="4252452"/>
+          </a:xfrm>
+        </p:spPr>
+      </p:pic>
     </p:spTree>
     <p:extLst>
       <p:ext uri="{BB962C8B-B14F-4D97-AF65-F5344CB8AC3E}">

</xml_diff>

<commit_message>
DEV_NOTE 240911.4 no force push
</commit_message>
<xml_diff>
--- a/BREAULT SWD TRAINING.pptx
+++ b/BREAULT SWD TRAINING.pptx
@@ -12,12 +12,16 @@
     <p:sldId id="260" r:id="rId6"/>
     <p:sldId id="262" r:id="rId7"/>
     <p:sldId id="261" r:id="rId8"/>
-    <p:sldId id="266" r:id="rId9"/>
-    <p:sldId id="264" r:id="rId10"/>
-    <p:sldId id="265" r:id="rId11"/>
-    <p:sldId id="263" r:id="rId12"/>
-    <p:sldId id="267" r:id="rId13"/>
-    <p:sldId id="268" r:id="rId14"/>
+    <p:sldId id="268" r:id="rId9"/>
+    <p:sldId id="267" r:id="rId10"/>
+    <p:sldId id="264" r:id="rId11"/>
+    <p:sldId id="266" r:id="rId12"/>
+    <p:sldId id="265" r:id="rId13"/>
+    <p:sldId id="269" r:id="rId14"/>
+    <p:sldId id="263" r:id="rId15"/>
+    <p:sldId id="270" r:id="rId16"/>
+    <p:sldId id="271" r:id="rId17"/>
+    <p:sldId id="272" r:id="rId18"/>
   </p:sldIdLst>
   <p:sldSz cx="12192000" cy="6858000"/>
   <p:notesSz cx="6858000" cy="9144000"/>
@@ -174,7 +178,7 @@
           <a:noFill/>
           <a:extLst>
             <a:ext uri="{909E8E84-426E-40dd-AFC4-6F175D3DCCD1}">
-              <a14:hiddenFill xmlns="" xmlns:a14="http://schemas.microsoft.com/office/drawing/2010/main">
+              <a14:hiddenFill xmlns:a14="http://schemas.microsoft.com/office/drawing/2010/main" xmlns="">
                 <a:solidFill>
                   <a:srgbClr val="FFFFFF"/>
                 </a:solidFill>
@@ -234,7 +238,7 @@
             </a:ln>
             <a:extLst>
               <a:ext uri="{91240B29-F687-4f45-9708-019B960494DF}">
-                <a14:hiddenLine xmlns="" xmlns:a14="http://schemas.microsoft.com/office/drawing/2010/main" w="9525">
+                <a14:hiddenLine xmlns:a14="http://schemas.microsoft.com/office/drawing/2010/main" xmlns="" w="9525">
                   <a:solidFill>
                     <a:srgbClr val="000000"/>
                   </a:solidFill>
@@ -324,7 +328,7 @@
             </a:ln>
             <a:extLst>
               <a:ext uri="{91240B29-F687-4f45-9708-019B960494DF}">
-                <a14:hiddenLine xmlns="" xmlns:a14="http://schemas.microsoft.com/office/drawing/2010/main" w="9525">
+                <a14:hiddenLine xmlns:a14="http://schemas.microsoft.com/office/drawing/2010/main" xmlns="" w="9525">
                   <a:solidFill>
                     <a:srgbClr val="000000"/>
                   </a:solidFill>
@@ -414,7 +418,7 @@
             </a:ln>
             <a:extLst>
               <a:ext uri="{91240B29-F687-4f45-9708-019B960494DF}">
-                <a14:hiddenLine xmlns="" xmlns:a14="http://schemas.microsoft.com/office/drawing/2010/main" w="9525">
+                <a14:hiddenLine xmlns:a14="http://schemas.microsoft.com/office/drawing/2010/main" xmlns="" w="9525">
                   <a:solidFill>
                     <a:srgbClr val="000000"/>
                   </a:solidFill>
@@ -448,7 +452,7 @@
             </a:ln>
             <a:extLst>
               <a:ext uri="{91240B29-F687-4f45-9708-019B960494DF}">
-                <a14:hiddenLine xmlns="" xmlns:a14="http://schemas.microsoft.com/office/drawing/2010/main" w="9525">
+                <a14:hiddenLine xmlns:a14="http://schemas.microsoft.com/office/drawing/2010/main" xmlns="" w="9525">
                   <a:solidFill>
                     <a:srgbClr val="000000"/>
                   </a:solidFill>
@@ -538,7 +542,7 @@
             </a:ln>
             <a:extLst>
               <a:ext uri="{91240B29-F687-4f45-9708-019B960494DF}">
-                <a14:hiddenLine xmlns="" xmlns:a14="http://schemas.microsoft.com/office/drawing/2010/main" w="9525">
+                <a14:hiddenLine xmlns:a14="http://schemas.microsoft.com/office/drawing/2010/main" xmlns="" w="9525">
                   <a:solidFill>
                     <a:srgbClr val="000000"/>
                   </a:solidFill>
@@ -600,7 +604,7 @@
             </a:ln>
             <a:extLst>
               <a:ext uri="{91240B29-F687-4f45-9708-019B960494DF}">
-                <a14:hiddenLine xmlns="" xmlns:a14="http://schemas.microsoft.com/office/drawing/2010/main" w="9525">
+                <a14:hiddenLine xmlns:a14="http://schemas.microsoft.com/office/drawing/2010/main" xmlns="" w="9525">
                   <a:solidFill>
                     <a:srgbClr val="000000"/>
                   </a:solidFill>
@@ -662,7 +666,7 @@
             </a:ln>
             <a:extLst>
               <a:ext uri="{91240B29-F687-4f45-9708-019B960494DF}">
-                <a14:hiddenLine xmlns="" xmlns:a14="http://schemas.microsoft.com/office/drawing/2010/main" w="9525">
+                <a14:hiddenLine xmlns:a14="http://schemas.microsoft.com/office/drawing/2010/main" xmlns="" w="9525">
                   <a:solidFill>
                     <a:srgbClr val="000000"/>
                   </a:solidFill>
@@ -752,7 +756,7 @@
             </a:ln>
             <a:extLst>
               <a:ext uri="{91240B29-F687-4f45-9708-019B960494DF}">
-                <a14:hiddenLine xmlns="" xmlns:a14="http://schemas.microsoft.com/office/drawing/2010/main" w="9525">
+                <a14:hiddenLine xmlns:a14="http://schemas.microsoft.com/office/drawing/2010/main" xmlns="" w="9525">
                   <a:solidFill>
                     <a:srgbClr val="000000"/>
                   </a:solidFill>
@@ -814,7 +818,7 @@
             </a:ln>
             <a:extLst>
               <a:ext uri="{91240B29-F687-4f45-9708-019B960494DF}">
-                <a14:hiddenLine xmlns="" xmlns:a14="http://schemas.microsoft.com/office/drawing/2010/main" w="9525">
+                <a14:hiddenLine xmlns:a14="http://schemas.microsoft.com/office/drawing/2010/main" xmlns="" w="9525">
                   <a:solidFill>
                     <a:srgbClr val="000000"/>
                   </a:solidFill>
@@ -876,7 +880,7 @@
             </a:ln>
             <a:extLst>
               <a:ext uri="{91240B29-F687-4f45-9708-019B960494DF}">
-                <a14:hiddenLine xmlns="" xmlns:a14="http://schemas.microsoft.com/office/drawing/2010/main" w="9525">
+                <a14:hiddenLine xmlns:a14="http://schemas.microsoft.com/office/drawing/2010/main" xmlns="" w="9525">
                   <a:solidFill>
                     <a:srgbClr val="000000"/>
                   </a:solidFill>
@@ -966,7 +970,7 @@
             </a:ln>
             <a:extLst>
               <a:ext uri="{91240B29-F687-4f45-9708-019B960494DF}">
-                <a14:hiddenLine xmlns="" xmlns:a14="http://schemas.microsoft.com/office/drawing/2010/main" w="9525">
+                <a14:hiddenLine xmlns:a14="http://schemas.microsoft.com/office/drawing/2010/main" xmlns="" w="9525">
                   <a:solidFill>
                     <a:srgbClr val="000000"/>
                   </a:solidFill>
@@ -1056,7 +1060,7 @@
             </a:ln>
             <a:extLst>
               <a:ext uri="{91240B29-F687-4f45-9708-019B960494DF}">
-                <a14:hiddenLine xmlns="" xmlns:a14="http://schemas.microsoft.com/office/drawing/2010/main" w="9525">
+                <a14:hiddenLine xmlns:a14="http://schemas.microsoft.com/office/drawing/2010/main" xmlns="" w="9525">
                   <a:solidFill>
                     <a:srgbClr val="000000"/>
                   </a:solidFill>
@@ -1118,7 +1122,7 @@
             </a:ln>
             <a:extLst>
               <a:ext uri="{91240B29-F687-4f45-9708-019B960494DF}">
-                <a14:hiddenLine xmlns="" xmlns:a14="http://schemas.microsoft.com/office/drawing/2010/main" w="9525">
+                <a14:hiddenLine xmlns:a14="http://schemas.microsoft.com/office/drawing/2010/main" xmlns="" w="9525">
                   <a:solidFill>
                     <a:srgbClr val="000000"/>
                   </a:solidFill>
@@ -1228,7 +1232,7 @@
             </a:ln>
             <a:extLst>
               <a:ext uri="{91240B29-F687-4f45-9708-019B960494DF}">
-                <a14:hiddenLine xmlns="" xmlns:a14="http://schemas.microsoft.com/office/drawing/2010/main" w="9525">
+                <a14:hiddenLine xmlns:a14="http://schemas.microsoft.com/office/drawing/2010/main" xmlns="" w="9525">
                   <a:solidFill>
                     <a:srgbClr val="000000"/>
                   </a:solidFill>
@@ -1290,7 +1294,7 @@
             </a:ln>
             <a:extLst>
               <a:ext uri="{91240B29-F687-4f45-9708-019B960494DF}">
-                <a14:hiddenLine xmlns="" xmlns:a14="http://schemas.microsoft.com/office/drawing/2010/main" w="9525">
+                <a14:hiddenLine xmlns:a14="http://schemas.microsoft.com/office/drawing/2010/main" xmlns="" w="9525">
                   <a:solidFill>
                     <a:srgbClr val="000000"/>
                   </a:solidFill>
@@ -1380,7 +1384,7 @@
             </a:ln>
             <a:extLst>
               <a:ext uri="{91240B29-F687-4f45-9708-019B960494DF}">
-                <a14:hiddenLine xmlns="" xmlns:a14="http://schemas.microsoft.com/office/drawing/2010/main" w="9525">
+                <a14:hiddenLine xmlns:a14="http://schemas.microsoft.com/office/drawing/2010/main" xmlns="" w="9525">
                   <a:solidFill>
                     <a:srgbClr val="000000"/>
                   </a:solidFill>
@@ -1470,7 +1474,7 @@
             </a:ln>
             <a:extLst>
               <a:ext uri="{91240B29-F687-4f45-9708-019B960494DF}">
-                <a14:hiddenLine xmlns="" xmlns:a14="http://schemas.microsoft.com/office/drawing/2010/main" w="9525">
+                <a14:hiddenLine xmlns:a14="http://schemas.microsoft.com/office/drawing/2010/main" xmlns="" w="9525">
                   <a:solidFill>
                     <a:srgbClr val="000000"/>
                   </a:solidFill>
@@ -1532,7 +1536,7 @@
             </a:ln>
             <a:extLst>
               <a:ext uri="{91240B29-F687-4f45-9708-019B960494DF}">
-                <a14:hiddenLine xmlns="" xmlns:a14="http://schemas.microsoft.com/office/drawing/2010/main" w="9525">
+                <a14:hiddenLine xmlns:a14="http://schemas.microsoft.com/office/drawing/2010/main" xmlns="" w="9525">
                   <a:solidFill>
                     <a:srgbClr val="000000"/>
                   </a:solidFill>
@@ -1622,7 +1626,7 @@
             </a:ln>
             <a:extLst>
               <a:ext uri="{91240B29-F687-4f45-9708-019B960494DF}">
-                <a14:hiddenLine xmlns="" xmlns:a14="http://schemas.microsoft.com/office/drawing/2010/main" w="9525">
+                <a14:hiddenLine xmlns:a14="http://schemas.microsoft.com/office/drawing/2010/main" xmlns="" w="9525">
                   <a:solidFill>
                     <a:srgbClr val="000000"/>
                   </a:solidFill>
@@ -1712,7 +1716,7 @@
             </a:ln>
             <a:extLst>
               <a:ext uri="{91240B29-F687-4f45-9708-019B960494DF}">
-                <a14:hiddenLine xmlns="" xmlns:a14="http://schemas.microsoft.com/office/drawing/2010/main" w="9525">
+                <a14:hiddenLine xmlns:a14="http://schemas.microsoft.com/office/drawing/2010/main" xmlns="" w="9525">
                   <a:solidFill>
                     <a:srgbClr val="000000"/>
                   </a:solidFill>
@@ -1768,7 +1772,7 @@
             </a:ln>
             <a:extLst>
               <a:ext uri="{91240B29-F687-4f45-9708-019B960494DF}">
-                <a14:hiddenLine xmlns="" xmlns:a14="http://schemas.microsoft.com/office/drawing/2010/main" w="9525">
+                <a14:hiddenLine xmlns:a14="http://schemas.microsoft.com/office/drawing/2010/main" xmlns="" w="9525">
                   <a:solidFill>
                     <a:srgbClr val="000000"/>
                   </a:solidFill>
@@ -1858,7 +1862,7 @@
             </a:ln>
             <a:extLst>
               <a:ext uri="{91240B29-F687-4f45-9708-019B960494DF}">
-                <a14:hiddenLine xmlns="" xmlns:a14="http://schemas.microsoft.com/office/drawing/2010/main" w="9525">
+                <a14:hiddenLine xmlns:a14="http://schemas.microsoft.com/office/drawing/2010/main" xmlns="" w="9525">
                   <a:solidFill>
                     <a:srgbClr val="000000"/>
                   </a:solidFill>
@@ -1914,7 +1918,7 @@
             </a:ln>
             <a:extLst>
               <a:ext uri="{91240B29-F687-4f45-9708-019B960494DF}">
-                <a14:hiddenLine xmlns="" xmlns:a14="http://schemas.microsoft.com/office/drawing/2010/main" w="9525">
+                <a14:hiddenLine xmlns:a14="http://schemas.microsoft.com/office/drawing/2010/main" xmlns="" w="9525">
                   <a:solidFill>
                     <a:srgbClr val="000000"/>
                   </a:solidFill>
@@ -2004,7 +2008,7 @@
             </a:ln>
             <a:extLst>
               <a:ext uri="{91240B29-F687-4f45-9708-019B960494DF}">
-                <a14:hiddenLine xmlns="" xmlns:a14="http://schemas.microsoft.com/office/drawing/2010/main" w="9525">
+                <a14:hiddenLine xmlns:a14="http://schemas.microsoft.com/office/drawing/2010/main" xmlns="" w="9525">
                   <a:solidFill>
                     <a:srgbClr val="000000"/>
                   </a:solidFill>
@@ -2072,7 +2076,7 @@
             </a:ln>
             <a:extLst>
               <a:ext uri="{91240B29-F687-4f45-9708-019B960494DF}">
-                <a14:hiddenLine xmlns="" xmlns:a14="http://schemas.microsoft.com/office/drawing/2010/main" w="9525">
+                <a14:hiddenLine xmlns:a14="http://schemas.microsoft.com/office/drawing/2010/main" xmlns="" w="9525">
                   <a:solidFill>
                     <a:srgbClr val="000000"/>
                   </a:solidFill>
@@ -2162,7 +2166,7 @@
             </a:ln>
             <a:extLst>
               <a:ext uri="{91240B29-F687-4f45-9708-019B960494DF}">
-                <a14:hiddenLine xmlns="" xmlns:a14="http://schemas.microsoft.com/office/drawing/2010/main" w="9525">
+                <a14:hiddenLine xmlns:a14="http://schemas.microsoft.com/office/drawing/2010/main" xmlns="" w="9525">
                   <a:solidFill>
                     <a:srgbClr val="000000"/>
                   </a:solidFill>
@@ -2230,7 +2234,7 @@
             </a:ln>
             <a:extLst>
               <a:ext uri="{91240B29-F687-4f45-9708-019B960494DF}">
-                <a14:hiddenLine xmlns="" xmlns:a14="http://schemas.microsoft.com/office/drawing/2010/main" w="9525">
+                <a14:hiddenLine xmlns:a14="http://schemas.microsoft.com/office/drawing/2010/main" xmlns="" w="9525">
                   <a:solidFill>
                     <a:srgbClr val="000000"/>
                   </a:solidFill>
@@ -2320,7 +2324,7 @@
             </a:ln>
             <a:extLst>
               <a:ext uri="{91240B29-F687-4f45-9708-019B960494DF}">
-                <a14:hiddenLine xmlns="" xmlns:a14="http://schemas.microsoft.com/office/drawing/2010/main" w="9525">
+                <a14:hiddenLine xmlns:a14="http://schemas.microsoft.com/office/drawing/2010/main" xmlns="" w="9525">
                   <a:solidFill>
                     <a:srgbClr val="000000"/>
                   </a:solidFill>
@@ -2354,7 +2358,7 @@
             </a:ln>
             <a:extLst>
               <a:ext uri="{91240B29-F687-4f45-9708-019B960494DF}">
-                <a14:hiddenLine xmlns="" xmlns:a14="http://schemas.microsoft.com/office/drawing/2010/main" w="9525">
+                <a14:hiddenLine xmlns:a14="http://schemas.microsoft.com/office/drawing/2010/main" xmlns="" w="9525">
                   <a:solidFill>
                     <a:srgbClr val="000000"/>
                   </a:solidFill>
@@ -2444,7 +2448,7 @@
             </a:ln>
             <a:extLst>
               <a:ext uri="{91240B29-F687-4f45-9708-019B960494DF}">
-                <a14:hiddenLine xmlns="" xmlns:a14="http://schemas.microsoft.com/office/drawing/2010/main" w="9525">
+                <a14:hiddenLine xmlns:a14="http://schemas.microsoft.com/office/drawing/2010/main" xmlns="" w="9525">
                   <a:solidFill>
                     <a:srgbClr val="000000"/>
                   </a:solidFill>
@@ -2506,7 +2510,7 @@
             </a:ln>
             <a:extLst>
               <a:ext uri="{91240B29-F687-4f45-9708-019B960494DF}">
-                <a14:hiddenLine xmlns="" xmlns:a14="http://schemas.microsoft.com/office/drawing/2010/main" w="9525">
+                <a14:hiddenLine xmlns:a14="http://schemas.microsoft.com/office/drawing/2010/main" xmlns="" w="9525">
                   <a:solidFill>
                     <a:srgbClr val="000000"/>
                   </a:solidFill>
@@ -2568,7 +2572,7 @@
             </a:ln>
             <a:extLst>
               <a:ext uri="{91240B29-F687-4f45-9708-019B960494DF}">
-                <a14:hiddenLine xmlns="" xmlns:a14="http://schemas.microsoft.com/office/drawing/2010/main" w="9525">
+                <a14:hiddenLine xmlns:a14="http://schemas.microsoft.com/office/drawing/2010/main" xmlns="" w="9525">
                   <a:solidFill>
                     <a:srgbClr val="000000"/>
                   </a:solidFill>
@@ -2658,7 +2662,7 @@
             </a:ln>
             <a:extLst>
               <a:ext uri="{91240B29-F687-4f45-9708-019B960494DF}">
-                <a14:hiddenLine xmlns="" xmlns:a14="http://schemas.microsoft.com/office/drawing/2010/main" w="9525">
+                <a14:hiddenLine xmlns:a14="http://schemas.microsoft.com/office/drawing/2010/main" xmlns="" w="9525">
                   <a:solidFill>
                     <a:srgbClr val="000000"/>
                   </a:solidFill>
@@ -2726,7 +2730,7 @@
             </a:ln>
             <a:extLst>
               <a:ext uri="{91240B29-F687-4f45-9708-019B960494DF}">
-                <a14:hiddenLine xmlns="" xmlns:a14="http://schemas.microsoft.com/office/drawing/2010/main" w="9525">
+                <a14:hiddenLine xmlns:a14="http://schemas.microsoft.com/office/drawing/2010/main" xmlns="" w="9525">
                   <a:solidFill>
                     <a:srgbClr val="000000"/>
                   </a:solidFill>
@@ -2788,7 +2792,7 @@
             </a:ln>
             <a:extLst>
               <a:ext uri="{91240B29-F687-4f45-9708-019B960494DF}">
-                <a14:hiddenLine xmlns="" xmlns:a14="http://schemas.microsoft.com/office/drawing/2010/main" w="9525">
+                <a14:hiddenLine xmlns:a14="http://schemas.microsoft.com/office/drawing/2010/main" xmlns="" w="9525">
                   <a:solidFill>
                     <a:srgbClr val="000000"/>
                   </a:solidFill>
@@ -2878,7 +2882,7 @@
             </a:ln>
             <a:extLst>
               <a:ext uri="{91240B29-F687-4f45-9708-019B960494DF}">
-                <a14:hiddenLine xmlns="" xmlns:a14="http://schemas.microsoft.com/office/drawing/2010/main" w="9525">
+                <a14:hiddenLine xmlns:a14="http://schemas.microsoft.com/office/drawing/2010/main" xmlns="" w="9525">
                   <a:solidFill>
                     <a:srgbClr val="000000"/>
                   </a:solidFill>
@@ -2940,7 +2944,7 @@
             </a:ln>
             <a:extLst>
               <a:ext uri="{91240B29-F687-4f45-9708-019B960494DF}">
-                <a14:hiddenLine xmlns="" xmlns:a14="http://schemas.microsoft.com/office/drawing/2010/main" w="9525">
+                <a14:hiddenLine xmlns:a14="http://schemas.microsoft.com/office/drawing/2010/main" xmlns="" w="9525">
                   <a:solidFill>
                     <a:srgbClr val="000000"/>
                   </a:solidFill>
@@ -3030,7 +3034,7 @@
             </a:ln>
             <a:extLst>
               <a:ext uri="{91240B29-F687-4f45-9708-019B960494DF}">
-                <a14:hiddenLine xmlns="" xmlns:a14="http://schemas.microsoft.com/office/drawing/2010/main" w="9525">
+                <a14:hiddenLine xmlns:a14="http://schemas.microsoft.com/office/drawing/2010/main" xmlns="" w="9525">
                   <a:solidFill>
                     <a:srgbClr val="000000"/>
                   </a:solidFill>
@@ -3092,7 +3096,7 @@
             </a:ln>
             <a:extLst>
               <a:ext uri="{91240B29-F687-4f45-9708-019B960494DF}">
-                <a14:hiddenLine xmlns="" xmlns:a14="http://schemas.microsoft.com/office/drawing/2010/main" w="9525">
+                <a14:hiddenLine xmlns:a14="http://schemas.microsoft.com/office/drawing/2010/main" xmlns="" w="9525">
                   <a:solidFill>
                     <a:srgbClr val="000000"/>
                   </a:solidFill>
@@ -3182,7 +3186,7 @@
             </a:ln>
             <a:extLst>
               <a:ext uri="{91240B29-F687-4f45-9708-019B960494DF}">
-                <a14:hiddenLine xmlns="" xmlns:a14="http://schemas.microsoft.com/office/drawing/2010/main" w="9525">
+                <a14:hiddenLine xmlns:a14="http://schemas.microsoft.com/office/drawing/2010/main" xmlns="" w="9525">
                   <a:solidFill>
                     <a:srgbClr val="000000"/>
                   </a:solidFill>
@@ -3216,7 +3220,7 @@
             </a:ln>
             <a:extLst>
               <a:ext uri="{91240B29-F687-4f45-9708-019B960494DF}">
-                <a14:hiddenLine xmlns="" xmlns:a14="http://schemas.microsoft.com/office/drawing/2010/main" w="9525">
+                <a14:hiddenLine xmlns:a14="http://schemas.microsoft.com/office/drawing/2010/main" xmlns="" w="9525">
                   <a:solidFill>
                     <a:srgbClr val="000000"/>
                   </a:solidFill>
@@ -3281,7 +3285,7 @@
             </a:ln>
             <a:extLst>
               <a:ext uri="{91240B29-F687-4f45-9708-019B960494DF}">
-                <a14:hiddenLine xmlns="" xmlns:a14="http://schemas.microsoft.com/office/drawing/2010/main" w="9525">
+                <a14:hiddenLine xmlns:a14="http://schemas.microsoft.com/office/drawing/2010/main" xmlns="" w="9525">
                   <a:solidFill>
                     <a:srgbClr val="000000"/>
                   </a:solidFill>
@@ -3371,7 +3375,7 @@
             </a:ln>
             <a:extLst>
               <a:ext uri="{91240B29-F687-4f45-9708-019B960494DF}">
-                <a14:hiddenLine xmlns="" xmlns:a14="http://schemas.microsoft.com/office/drawing/2010/main" w="9525">
+                <a14:hiddenLine xmlns:a14="http://schemas.microsoft.com/office/drawing/2010/main" xmlns="" w="9525">
                   <a:solidFill>
                     <a:srgbClr val="000000"/>
                   </a:solidFill>
@@ -3433,7 +3437,7 @@
             </a:ln>
             <a:extLst>
               <a:ext uri="{91240B29-F687-4f45-9708-019B960494DF}">
-                <a14:hiddenLine xmlns="" xmlns:a14="http://schemas.microsoft.com/office/drawing/2010/main" w="9525">
+                <a14:hiddenLine xmlns:a14="http://schemas.microsoft.com/office/drawing/2010/main" xmlns="" w="9525">
                   <a:solidFill>
                     <a:srgbClr val="000000"/>
                   </a:solidFill>
@@ -3523,7 +3527,7 @@
             </a:ln>
             <a:extLst>
               <a:ext uri="{91240B29-F687-4f45-9708-019B960494DF}">
-                <a14:hiddenLine xmlns="" xmlns:a14="http://schemas.microsoft.com/office/drawing/2010/main" w="9525">
+                <a14:hiddenLine xmlns:a14="http://schemas.microsoft.com/office/drawing/2010/main" xmlns="" w="9525">
                   <a:solidFill>
                     <a:srgbClr val="000000"/>
                   </a:solidFill>
@@ -3613,7 +3617,7 @@
             </a:ln>
             <a:extLst>
               <a:ext uri="{91240B29-F687-4f45-9708-019B960494DF}">
-                <a14:hiddenLine xmlns="" xmlns:a14="http://schemas.microsoft.com/office/drawing/2010/main" w="9525">
+                <a14:hiddenLine xmlns:a14="http://schemas.microsoft.com/office/drawing/2010/main" xmlns="" w="9525">
                   <a:solidFill>
                     <a:srgbClr val="000000"/>
                   </a:solidFill>
@@ -3678,7 +3682,7 @@
             </a:ln>
             <a:extLst>
               <a:ext uri="{91240B29-F687-4f45-9708-019B960494DF}">
-                <a14:hiddenLine xmlns="" xmlns:a14="http://schemas.microsoft.com/office/drawing/2010/main" w="9525">
+                <a14:hiddenLine xmlns:a14="http://schemas.microsoft.com/office/drawing/2010/main" xmlns="" w="9525">
                   <a:solidFill>
                     <a:srgbClr val="000000"/>
                   </a:solidFill>
@@ -3740,7 +3744,7 @@
             </a:ln>
             <a:extLst>
               <a:ext uri="{91240B29-F687-4f45-9708-019B960494DF}">
-                <a14:hiddenLine xmlns="" xmlns:a14="http://schemas.microsoft.com/office/drawing/2010/main" w="9525">
+                <a14:hiddenLine xmlns:a14="http://schemas.microsoft.com/office/drawing/2010/main" xmlns="" w="9525">
                   <a:solidFill>
                     <a:srgbClr val="000000"/>
                   </a:solidFill>
@@ -3830,7 +3834,7 @@
             </a:ln>
             <a:extLst>
               <a:ext uri="{91240B29-F687-4f45-9708-019B960494DF}">
-                <a14:hiddenLine xmlns="" xmlns:a14="http://schemas.microsoft.com/office/drawing/2010/main" w="9525">
+                <a14:hiddenLine xmlns:a14="http://schemas.microsoft.com/office/drawing/2010/main" xmlns="" w="9525">
                   <a:solidFill>
                     <a:srgbClr val="000000"/>
                   </a:solidFill>
@@ -3920,7 +3924,7 @@
             </a:ln>
             <a:extLst>
               <a:ext uri="{91240B29-F687-4f45-9708-019B960494DF}">
-                <a14:hiddenLine xmlns="" xmlns:a14="http://schemas.microsoft.com/office/drawing/2010/main" w="9525">
+                <a14:hiddenLine xmlns:a14="http://schemas.microsoft.com/office/drawing/2010/main" xmlns="" w="9525">
                   <a:solidFill>
                     <a:srgbClr val="000000"/>
                   </a:solidFill>
@@ -3982,7 +3986,7 @@
             </a:ln>
             <a:extLst>
               <a:ext uri="{91240B29-F687-4f45-9708-019B960494DF}">
-                <a14:hiddenLine xmlns="" xmlns:a14="http://schemas.microsoft.com/office/drawing/2010/main" w="9525">
+                <a14:hiddenLine xmlns:a14="http://schemas.microsoft.com/office/drawing/2010/main" xmlns="" w="9525">
                   <a:solidFill>
                     <a:srgbClr val="000000"/>
                   </a:solidFill>
@@ -4102,7 +4106,7 @@
             </a:ln>
             <a:extLst>
               <a:ext uri="{91240B29-F687-4f45-9708-019B960494DF}">
-                <a14:hiddenLine xmlns="" xmlns:a14="http://schemas.microsoft.com/office/drawing/2010/main" w="9525">
+                <a14:hiddenLine xmlns:a14="http://schemas.microsoft.com/office/drawing/2010/main" xmlns="" w="9525">
                   <a:solidFill>
                     <a:srgbClr val="000000"/>
                   </a:solidFill>
@@ -4170,7 +4174,7 @@
             </a:ln>
             <a:extLst>
               <a:ext uri="{91240B29-F687-4f45-9708-019B960494DF}">
-                <a14:hiddenLine xmlns="" xmlns:a14="http://schemas.microsoft.com/office/drawing/2010/main" w="9525">
+                <a14:hiddenLine xmlns:a14="http://schemas.microsoft.com/office/drawing/2010/main" xmlns="" w="9525">
                   <a:solidFill>
                     <a:srgbClr val="000000"/>
                   </a:solidFill>
@@ -4260,7 +4264,7 @@
             </a:ln>
             <a:extLst>
               <a:ext uri="{91240B29-F687-4f45-9708-019B960494DF}">
-                <a14:hiddenLine xmlns="" xmlns:a14="http://schemas.microsoft.com/office/drawing/2010/main" w="9525">
+                <a14:hiddenLine xmlns:a14="http://schemas.microsoft.com/office/drawing/2010/main" xmlns="" w="9525">
                   <a:solidFill>
                     <a:srgbClr val="000000"/>
                   </a:solidFill>
@@ -9067,7 +9071,7 @@
           <a:noFill/>
           <a:extLst>
             <a:ext uri="{909E8E84-426E-40dd-AFC4-6F175D3DCCD1}">
-              <a14:hiddenFill xmlns="" xmlns:a14="http://schemas.microsoft.com/office/drawing/2010/main">
+              <a14:hiddenFill xmlns:a14="http://schemas.microsoft.com/office/drawing/2010/main" xmlns="">
                 <a:solidFill>
                   <a:srgbClr val="FFFFFF"/>
                 </a:solidFill>
@@ -9141,7 +9145,7 @@
               </a:ln>
               <a:extLst>
                 <a:ext uri="{91240B29-F687-4f45-9708-019B960494DF}">
-                  <a14:hiddenLine xmlns="" xmlns:a14="http://schemas.microsoft.com/office/drawing/2010/main" w="9525">
+                  <a14:hiddenLine xmlns:a14="http://schemas.microsoft.com/office/drawing/2010/main" xmlns="" w="9525">
                     <a:solidFill>
                       <a:srgbClr val="000000"/>
                     </a:solidFill>
@@ -9231,7 +9235,7 @@
               </a:ln>
               <a:extLst>
                 <a:ext uri="{91240B29-F687-4f45-9708-019B960494DF}">
-                  <a14:hiddenLine xmlns="" xmlns:a14="http://schemas.microsoft.com/office/drawing/2010/main" w="9525">
+                  <a14:hiddenLine xmlns:a14="http://schemas.microsoft.com/office/drawing/2010/main" xmlns="" w="9525">
                     <a:solidFill>
                       <a:srgbClr val="000000"/>
                     </a:solidFill>
@@ -9321,7 +9325,7 @@
               </a:ln>
               <a:extLst>
                 <a:ext uri="{91240B29-F687-4f45-9708-019B960494DF}">
-                  <a14:hiddenLine xmlns="" xmlns:a14="http://schemas.microsoft.com/office/drawing/2010/main" w="9525">
+                  <a14:hiddenLine xmlns:a14="http://schemas.microsoft.com/office/drawing/2010/main" xmlns="" w="9525">
                     <a:solidFill>
                       <a:srgbClr val="000000"/>
                     </a:solidFill>
@@ -9383,7 +9387,7 @@
               </a:ln>
               <a:extLst>
                 <a:ext uri="{91240B29-F687-4f45-9708-019B960494DF}">
-                  <a14:hiddenLine xmlns="" xmlns:a14="http://schemas.microsoft.com/office/drawing/2010/main" w="9525">
+                  <a14:hiddenLine xmlns:a14="http://schemas.microsoft.com/office/drawing/2010/main" xmlns="" w="9525">
                     <a:solidFill>
                       <a:srgbClr val="000000"/>
                     </a:solidFill>
@@ -9473,7 +9477,7 @@
               </a:ln>
               <a:extLst>
                 <a:ext uri="{91240B29-F687-4f45-9708-019B960494DF}">
-                  <a14:hiddenLine xmlns="" xmlns:a14="http://schemas.microsoft.com/office/drawing/2010/main" w="9525">
+                  <a14:hiddenLine xmlns:a14="http://schemas.microsoft.com/office/drawing/2010/main" xmlns="" w="9525">
                     <a:solidFill>
                       <a:srgbClr val="000000"/>
                     </a:solidFill>
@@ -9535,7 +9539,7 @@
               </a:ln>
               <a:extLst>
                 <a:ext uri="{91240B29-F687-4f45-9708-019B960494DF}">
-                  <a14:hiddenLine xmlns="" xmlns:a14="http://schemas.microsoft.com/office/drawing/2010/main" w="9525">
+                  <a14:hiddenLine xmlns:a14="http://schemas.microsoft.com/office/drawing/2010/main" xmlns="" w="9525">
                     <a:solidFill>
                       <a:srgbClr val="000000"/>
                     </a:solidFill>
@@ -9597,7 +9601,7 @@
               </a:ln>
               <a:extLst>
                 <a:ext uri="{91240B29-F687-4f45-9708-019B960494DF}">
-                  <a14:hiddenLine xmlns="" xmlns:a14="http://schemas.microsoft.com/office/drawing/2010/main" w="9525">
+                  <a14:hiddenLine xmlns:a14="http://schemas.microsoft.com/office/drawing/2010/main" xmlns="" w="9525">
                     <a:solidFill>
                       <a:srgbClr val="000000"/>
                     </a:solidFill>
@@ -9687,7 +9691,7 @@
               </a:ln>
               <a:extLst>
                 <a:ext uri="{91240B29-F687-4f45-9708-019B960494DF}">
-                  <a14:hiddenLine xmlns="" xmlns:a14="http://schemas.microsoft.com/office/drawing/2010/main" w="9525">
+                  <a14:hiddenLine xmlns:a14="http://schemas.microsoft.com/office/drawing/2010/main" xmlns="" w="9525">
                     <a:solidFill>
                       <a:srgbClr val="000000"/>
                     </a:solidFill>
@@ -9777,7 +9781,7 @@
               </a:ln>
               <a:extLst>
                 <a:ext uri="{91240B29-F687-4f45-9708-019B960494DF}">
-                  <a14:hiddenLine xmlns="" xmlns:a14="http://schemas.microsoft.com/office/drawing/2010/main" w="9525">
+                  <a14:hiddenLine xmlns:a14="http://schemas.microsoft.com/office/drawing/2010/main" xmlns="" w="9525">
                     <a:solidFill>
                       <a:srgbClr val="000000"/>
                     </a:solidFill>
@@ -9839,7 +9843,7 @@
               </a:ln>
               <a:extLst>
                 <a:ext uri="{91240B29-F687-4f45-9708-019B960494DF}">
-                  <a14:hiddenLine xmlns="" xmlns:a14="http://schemas.microsoft.com/office/drawing/2010/main" w="9525">
+                  <a14:hiddenLine xmlns:a14="http://schemas.microsoft.com/office/drawing/2010/main" xmlns="" w="9525">
                     <a:solidFill>
                       <a:srgbClr val="000000"/>
                     </a:solidFill>
@@ -9949,7 +9953,7 @@
               </a:ln>
               <a:extLst>
                 <a:ext uri="{91240B29-F687-4f45-9708-019B960494DF}">
-                  <a14:hiddenLine xmlns="" xmlns:a14="http://schemas.microsoft.com/office/drawing/2010/main" w="9525">
+                  <a14:hiddenLine xmlns:a14="http://schemas.microsoft.com/office/drawing/2010/main" xmlns="" w="9525">
                     <a:solidFill>
                       <a:srgbClr val="000000"/>
                     </a:solidFill>
@@ -10033,7 +10037,7 @@
               </a:ln>
               <a:extLst>
                 <a:ext uri="{91240B29-F687-4f45-9708-019B960494DF}">
-                  <a14:hiddenLine xmlns="" xmlns:a14="http://schemas.microsoft.com/office/drawing/2010/main" w="9525">
+                  <a14:hiddenLine xmlns:a14="http://schemas.microsoft.com/office/drawing/2010/main" xmlns="" w="9525">
                     <a:solidFill>
                       <a:srgbClr val="000000"/>
                     </a:solidFill>
@@ -10095,7 +10099,7 @@
               </a:ln>
               <a:extLst>
                 <a:ext uri="{91240B29-F687-4f45-9708-019B960494DF}">
-                  <a14:hiddenLine xmlns="" xmlns:a14="http://schemas.microsoft.com/office/drawing/2010/main" w="9525">
+                  <a14:hiddenLine xmlns:a14="http://schemas.microsoft.com/office/drawing/2010/main" xmlns="" w="9525">
                     <a:solidFill>
                       <a:srgbClr val="000000"/>
                     </a:solidFill>
@@ -10157,7 +10161,7 @@
               </a:ln>
               <a:extLst>
                 <a:ext uri="{91240B29-F687-4f45-9708-019B960494DF}">
-                  <a14:hiddenLine xmlns="" xmlns:a14="http://schemas.microsoft.com/office/drawing/2010/main" w="9525">
+                  <a14:hiddenLine xmlns:a14="http://schemas.microsoft.com/office/drawing/2010/main" xmlns="" w="9525">
                     <a:solidFill>
                       <a:srgbClr val="000000"/>
                     </a:solidFill>
@@ -10247,7 +10251,7 @@
               </a:ln>
               <a:extLst>
                 <a:ext uri="{91240B29-F687-4f45-9708-019B960494DF}">
-                  <a14:hiddenLine xmlns="" xmlns:a14="http://schemas.microsoft.com/office/drawing/2010/main" w="9525">
+                  <a14:hiddenLine xmlns:a14="http://schemas.microsoft.com/office/drawing/2010/main" xmlns="" w="9525">
                     <a:solidFill>
                       <a:srgbClr val="000000"/>
                     </a:solidFill>
@@ -10281,7 +10285,7 @@
               </a:ln>
               <a:extLst>
                 <a:ext uri="{91240B29-F687-4f45-9708-019B960494DF}">
-                  <a14:hiddenLine xmlns="" xmlns:a14="http://schemas.microsoft.com/office/drawing/2010/main" w="9525">
+                  <a14:hiddenLine xmlns:a14="http://schemas.microsoft.com/office/drawing/2010/main" xmlns="" w="9525">
                     <a:solidFill>
                       <a:srgbClr val="000000"/>
                     </a:solidFill>
@@ -10346,7 +10350,7 @@
               </a:ln>
               <a:extLst>
                 <a:ext uri="{91240B29-F687-4f45-9708-019B960494DF}">
-                  <a14:hiddenLine xmlns="" xmlns:a14="http://schemas.microsoft.com/office/drawing/2010/main" w="9525">
+                  <a14:hiddenLine xmlns:a14="http://schemas.microsoft.com/office/drawing/2010/main" xmlns="" w="9525">
                     <a:solidFill>
                       <a:srgbClr val="000000"/>
                     </a:solidFill>
@@ -10436,7 +10440,7 @@
               </a:ln>
               <a:extLst>
                 <a:ext uri="{91240B29-F687-4f45-9708-019B960494DF}">
-                  <a14:hiddenLine xmlns="" xmlns:a14="http://schemas.microsoft.com/office/drawing/2010/main" w="9525">
+                  <a14:hiddenLine xmlns:a14="http://schemas.microsoft.com/office/drawing/2010/main" xmlns="" w="9525">
                     <a:solidFill>
                       <a:srgbClr val="000000"/>
                     </a:solidFill>
@@ -10498,7 +10502,7 @@
               </a:ln>
               <a:extLst>
                 <a:ext uri="{91240B29-F687-4f45-9708-019B960494DF}">
-                  <a14:hiddenLine xmlns="" xmlns:a14="http://schemas.microsoft.com/office/drawing/2010/main" w="9525">
+                  <a14:hiddenLine xmlns:a14="http://schemas.microsoft.com/office/drawing/2010/main" xmlns="" w="9525">
                     <a:solidFill>
                       <a:srgbClr val="000000"/>
                     </a:solidFill>
@@ -10588,7 +10592,7 @@
               </a:ln>
               <a:extLst>
                 <a:ext uri="{91240B29-F687-4f45-9708-019B960494DF}">
-                  <a14:hiddenLine xmlns="" xmlns:a14="http://schemas.microsoft.com/office/drawing/2010/main" w="9525">
+                  <a14:hiddenLine xmlns:a14="http://schemas.microsoft.com/office/drawing/2010/main" xmlns="" w="9525">
                     <a:solidFill>
                       <a:srgbClr val="000000"/>
                     </a:solidFill>
@@ -10653,7 +10657,7 @@
               </a:ln>
               <a:extLst>
                 <a:ext uri="{91240B29-F687-4f45-9708-019B960494DF}">
-                  <a14:hiddenLine xmlns="" xmlns:a14="http://schemas.microsoft.com/office/drawing/2010/main" w="9525">
+                  <a14:hiddenLine xmlns:a14="http://schemas.microsoft.com/office/drawing/2010/main" xmlns="" w="9525">
                     <a:solidFill>
                       <a:srgbClr val="000000"/>
                     </a:solidFill>
@@ -10715,7 +10719,7 @@
               </a:ln>
               <a:extLst>
                 <a:ext uri="{91240B29-F687-4f45-9708-019B960494DF}">
-                  <a14:hiddenLine xmlns="" xmlns:a14="http://schemas.microsoft.com/office/drawing/2010/main" w="9525">
+                  <a14:hiddenLine xmlns:a14="http://schemas.microsoft.com/office/drawing/2010/main" xmlns="" w="9525">
                     <a:solidFill>
                       <a:srgbClr val="000000"/>
                     </a:solidFill>
@@ -10805,7 +10809,7 @@
               </a:ln>
               <a:extLst>
                 <a:ext uri="{91240B29-F687-4f45-9708-019B960494DF}">
-                  <a14:hiddenLine xmlns="" xmlns:a14="http://schemas.microsoft.com/office/drawing/2010/main" w="9525">
+                  <a14:hiddenLine xmlns:a14="http://schemas.microsoft.com/office/drawing/2010/main" xmlns="" w="9525">
                     <a:solidFill>
                       <a:srgbClr val="000000"/>
                     </a:solidFill>
@@ -10895,7 +10899,7 @@
               </a:ln>
               <a:extLst>
                 <a:ext uri="{91240B29-F687-4f45-9708-019B960494DF}">
-                  <a14:hiddenLine xmlns="" xmlns:a14="http://schemas.microsoft.com/office/drawing/2010/main" w="9525">
+                  <a14:hiddenLine xmlns:a14="http://schemas.microsoft.com/office/drawing/2010/main" xmlns="" w="9525">
                     <a:solidFill>
                       <a:srgbClr val="000000"/>
                     </a:solidFill>
@@ -10960,7 +10964,7 @@
               </a:ln>
               <a:extLst>
                 <a:ext uri="{91240B29-F687-4f45-9708-019B960494DF}">
-                  <a14:hiddenLine xmlns="" xmlns:a14="http://schemas.microsoft.com/office/drawing/2010/main" w="9525">
+                  <a14:hiddenLine xmlns:a14="http://schemas.microsoft.com/office/drawing/2010/main" xmlns="" w="9525">
                     <a:solidFill>
                       <a:srgbClr val="000000"/>
                     </a:solidFill>
@@ -11080,7 +11084,7 @@
               </a:ln>
               <a:extLst>
                 <a:ext uri="{91240B29-F687-4f45-9708-019B960494DF}">
-                  <a14:hiddenLine xmlns="" xmlns:a14="http://schemas.microsoft.com/office/drawing/2010/main" w="9525">
+                  <a14:hiddenLine xmlns:a14="http://schemas.microsoft.com/office/drawing/2010/main" xmlns="" w="9525">
                     <a:solidFill>
                       <a:srgbClr val="000000"/>
                     </a:solidFill>
@@ -11178,7 +11182,7 @@
               </a:ln>
               <a:extLst>
                 <a:ext uri="{91240B29-F687-4f45-9708-019B960494DF}">
-                  <a14:hiddenLine xmlns="" xmlns:a14="http://schemas.microsoft.com/office/drawing/2010/main" w="9525">
+                  <a14:hiddenLine xmlns:a14="http://schemas.microsoft.com/office/drawing/2010/main" xmlns="" w="9525">
                     <a:solidFill>
                       <a:srgbClr val="000000"/>
                     </a:solidFill>
@@ -11293,7 +11297,7 @@
               </a:ln>
               <a:extLst>
                 <a:ext uri="{91240B29-F687-4f45-9708-019B960494DF}">
-                  <a14:hiddenLine xmlns="" xmlns:a14="http://schemas.microsoft.com/office/drawing/2010/main" w="9525">
+                  <a14:hiddenLine xmlns:a14="http://schemas.microsoft.com/office/drawing/2010/main" xmlns="" w="9525">
                     <a:solidFill>
                       <a:srgbClr val="000000"/>
                     </a:solidFill>
@@ -11383,7 +11387,7 @@
               </a:ln>
               <a:extLst>
                 <a:ext uri="{91240B29-F687-4f45-9708-019B960494DF}">
-                  <a14:hiddenLine xmlns="" xmlns:a14="http://schemas.microsoft.com/office/drawing/2010/main" w="9525">
+                  <a14:hiddenLine xmlns:a14="http://schemas.microsoft.com/office/drawing/2010/main" xmlns="" w="9525">
                     <a:solidFill>
                       <a:srgbClr val="000000"/>
                     </a:solidFill>
@@ -11448,7 +11452,7 @@
               </a:ln>
               <a:extLst>
                 <a:ext uri="{91240B29-F687-4f45-9708-019B960494DF}">
-                  <a14:hiddenLine xmlns="" xmlns:a14="http://schemas.microsoft.com/office/drawing/2010/main" w="9525">
+                  <a14:hiddenLine xmlns:a14="http://schemas.microsoft.com/office/drawing/2010/main" xmlns="" w="9525">
                     <a:solidFill>
                       <a:srgbClr val="000000"/>
                     </a:solidFill>
@@ -11538,7 +11542,7 @@
               </a:ln>
               <a:extLst>
                 <a:ext uri="{91240B29-F687-4f45-9708-019B960494DF}">
-                  <a14:hiddenLine xmlns="" xmlns:a14="http://schemas.microsoft.com/office/drawing/2010/main" w="9525">
+                  <a14:hiddenLine xmlns:a14="http://schemas.microsoft.com/office/drawing/2010/main" xmlns="" w="9525">
                     <a:solidFill>
                       <a:srgbClr val="000000"/>
                     </a:solidFill>
@@ -11606,7 +11610,7 @@
               </a:ln>
               <a:extLst>
                 <a:ext uri="{91240B29-F687-4f45-9708-019B960494DF}">
-                  <a14:hiddenLine xmlns="" xmlns:a14="http://schemas.microsoft.com/office/drawing/2010/main" w="9525">
+                  <a14:hiddenLine xmlns:a14="http://schemas.microsoft.com/office/drawing/2010/main" xmlns="" w="9525">
                     <a:solidFill>
                       <a:srgbClr val="000000"/>
                     </a:solidFill>
@@ -11696,7 +11700,7 @@
               </a:ln>
               <a:extLst>
                 <a:ext uri="{91240B29-F687-4f45-9708-019B960494DF}">
-                  <a14:hiddenLine xmlns="" xmlns:a14="http://schemas.microsoft.com/office/drawing/2010/main" w="9525">
+                  <a14:hiddenLine xmlns:a14="http://schemas.microsoft.com/office/drawing/2010/main" xmlns="" w="9525">
                     <a:solidFill>
                       <a:srgbClr val="000000"/>
                     </a:solidFill>
@@ -11764,7 +11768,7 @@
               </a:ln>
               <a:extLst>
                 <a:ext uri="{91240B29-F687-4f45-9708-019B960494DF}">
-                  <a14:hiddenLine xmlns="" xmlns:a14="http://schemas.microsoft.com/office/drawing/2010/main" w="9525">
+                  <a14:hiddenLine xmlns:a14="http://schemas.microsoft.com/office/drawing/2010/main" xmlns="" w="9525">
                     <a:solidFill>
                       <a:srgbClr val="000000"/>
                     </a:solidFill>
@@ -11854,7 +11858,7 @@
               </a:ln>
               <a:extLst>
                 <a:ext uri="{91240B29-F687-4f45-9708-019B960494DF}">
-                  <a14:hiddenLine xmlns="" xmlns:a14="http://schemas.microsoft.com/office/drawing/2010/main" w="9525">
+                  <a14:hiddenLine xmlns:a14="http://schemas.microsoft.com/office/drawing/2010/main" xmlns="" w="9525">
                     <a:solidFill>
                       <a:srgbClr val="000000"/>
                     </a:solidFill>
@@ -11888,7 +11892,7 @@
               </a:ln>
               <a:extLst>
                 <a:ext uri="{91240B29-F687-4f45-9708-019B960494DF}">
-                  <a14:hiddenLine xmlns="" xmlns:a14="http://schemas.microsoft.com/office/drawing/2010/main" w="9525">
+                  <a14:hiddenLine xmlns:a14="http://schemas.microsoft.com/office/drawing/2010/main" xmlns="" w="9525">
                     <a:solidFill>
                       <a:srgbClr val="000000"/>
                     </a:solidFill>
@@ -12588,6 +12592,557 @@
           <p:cNvPr id="2" name="Title 1">
             <a:extLst>
               <a:ext uri="{FF2B5EF4-FFF2-40B4-BE49-F238E27FC236}">
+                <a16:creationId xmlns:a16="http://schemas.microsoft.com/office/drawing/2014/main" id="{940A8AC8-75DF-B1EF-EF4E-3B0B9AF067DA}"/>
+              </a:ext>
+            </a:extLst>
+          </p:cNvPr>
+          <p:cNvSpPr>
+            <a:spLocks noGrp="1"/>
+          </p:cNvSpPr>
+          <p:nvPr>
+            <p:ph type="title"/>
+          </p:nvPr>
+        </p:nvSpPr>
+        <p:spPr/>
+        <p:txBody>
+          <a:bodyPr/>
+          <a:lstStyle/>
+          <a:p>
+            <a:r>
+              <a:rPr lang="en-US" dirty="0"/>
+              <a:t>Commits in bash</a:t>
+            </a:r>
+          </a:p>
+        </p:txBody>
+      </p:sp>
+      <p:pic>
+        <p:nvPicPr>
+          <p:cNvPr id="5" name="Content Placeholder 4">
+            <a:extLst>
+              <a:ext uri="{FF2B5EF4-FFF2-40B4-BE49-F238E27FC236}">
+                <a16:creationId xmlns:a16="http://schemas.microsoft.com/office/drawing/2014/main" id="{F8560C1A-7386-18D9-9A51-B40E593F25C8}"/>
+              </a:ext>
+            </a:extLst>
+          </p:cNvPr>
+          <p:cNvPicPr>
+            <a:picLocks noGrp="1" noChangeAspect="1"/>
+          </p:cNvPicPr>
+          <p:nvPr>
+            <p:ph idx="1"/>
+          </p:nvPr>
+        </p:nvPicPr>
+        <p:blipFill>
+          <a:blip r:embed="rId2"/>
+          <a:stretch>
+            <a:fillRect/>
+          </a:stretch>
+        </p:blipFill>
+        <p:spPr>
+          <a:xfrm>
+            <a:off x="5160397" y="1948875"/>
+            <a:ext cx="6782497" cy="2761445"/>
+          </a:xfrm>
+        </p:spPr>
+      </p:pic>
+      <p:sp>
+        <p:nvSpPr>
+          <p:cNvPr id="6" name="TextBox 5">
+            <a:extLst>
+              <a:ext uri="{FF2B5EF4-FFF2-40B4-BE49-F238E27FC236}">
+                <a16:creationId xmlns:a16="http://schemas.microsoft.com/office/drawing/2014/main" id="{4B3908E8-E7C2-0A08-F649-4D1054BB9D7F}"/>
+              </a:ext>
+            </a:extLst>
+          </p:cNvPr>
+          <p:cNvSpPr txBox="1"/>
+          <p:nvPr/>
+        </p:nvSpPr>
+        <p:spPr>
+          <a:xfrm>
+            <a:off x="730370" y="2097088"/>
+            <a:ext cx="4268797" cy="3162019"/>
+          </a:xfrm>
+          <a:prstGeom prst="rect">
+            <a:avLst/>
+          </a:prstGeom>
+          <a:noFill/>
+        </p:spPr>
+        <p:txBody>
+          <a:bodyPr wrap="none" rtlCol="0">
+            <a:spAutoFit/>
+          </a:bodyPr>
+          <a:lstStyle/>
+          <a:p>
+            <a:pPr marL="0" marR="0">
+              <a:lnSpc>
+                <a:spcPct val="107000"/>
+              </a:lnSpc>
+              <a:spcBef>
+                <a:spcPts val="0"/>
+              </a:spcBef>
+              <a:spcAft>
+                <a:spcPts val="800"/>
+              </a:spcAft>
+            </a:pPr>
+            <a:r>
+              <a:rPr lang="en-US" sz="1800" i="1" kern="100" dirty="0">
+                <a:effectLst/>
+                <a:latin typeface="Aptos" panose="020B0004020202020204" pitchFamily="34" charset="0"/>
+                <a:ea typeface="Aptos" panose="020B0004020202020204" pitchFamily="34" charset="0"/>
+                <a:cs typeface="Times New Roman" panose="02020603050405020304" pitchFamily="18" charset="0"/>
+              </a:rPr>
+              <a:t>git </a:t>
+            </a:r>
+            <a:r>
+              <a:rPr lang="en-US" sz="1800" i="1" kern="100" dirty="0" err="1">
+                <a:effectLst/>
+                <a:latin typeface="Aptos" panose="020B0004020202020204" pitchFamily="34" charset="0"/>
+                <a:ea typeface="Aptos" panose="020B0004020202020204" pitchFamily="34" charset="0"/>
+                <a:cs typeface="Times New Roman" panose="02020603050405020304" pitchFamily="18" charset="0"/>
+              </a:rPr>
+              <a:t>init</a:t>
+            </a:r>
+            <a:r>
+              <a:rPr lang="en-US" sz="1800" i="1" kern="100" dirty="0">
+                <a:effectLst/>
+                <a:latin typeface="Aptos" panose="020B0004020202020204" pitchFamily="34" charset="0"/>
+                <a:ea typeface="Aptos" panose="020B0004020202020204" pitchFamily="34" charset="0"/>
+                <a:cs typeface="Times New Roman" panose="02020603050405020304" pitchFamily="18" charset="0"/>
+              </a:rPr>
+              <a:t> -b &lt;name of the local branch&gt;</a:t>
+            </a:r>
+            <a:endParaRPr lang="en-US" sz="1800" kern="100" dirty="0">
+              <a:effectLst/>
+              <a:latin typeface="Aptos" panose="020B0004020202020204" pitchFamily="34" charset="0"/>
+              <a:ea typeface="Aptos" panose="020B0004020202020204" pitchFamily="34" charset="0"/>
+              <a:cs typeface="Times New Roman" panose="02020603050405020304" pitchFamily="18" charset="0"/>
+            </a:endParaRPr>
+          </a:p>
+          <a:p>
+            <a:pPr marL="0" marR="0">
+              <a:lnSpc>
+                <a:spcPct val="107000"/>
+              </a:lnSpc>
+              <a:spcBef>
+                <a:spcPts val="0"/>
+              </a:spcBef>
+              <a:spcAft>
+                <a:spcPts val="800"/>
+              </a:spcAft>
+            </a:pPr>
+            <a:r>
+              <a:rPr lang="en-US" sz="1800" i="1" kern="100" dirty="0">
+                <a:effectLst/>
+                <a:latin typeface="Aptos" panose="020B0004020202020204" pitchFamily="34" charset="0"/>
+                <a:ea typeface="Aptos" panose="020B0004020202020204" pitchFamily="34" charset="0"/>
+                <a:cs typeface="Times New Roman" panose="02020603050405020304" pitchFamily="18" charset="0"/>
+              </a:rPr>
+              <a:t>Git checkout -b &lt;name of branch&gt;</a:t>
+            </a:r>
+            <a:endParaRPr lang="en-US" sz="1800" kern="100" dirty="0">
+              <a:effectLst/>
+              <a:latin typeface="Aptos" panose="020B0004020202020204" pitchFamily="34" charset="0"/>
+              <a:ea typeface="Aptos" panose="020B0004020202020204" pitchFamily="34" charset="0"/>
+              <a:cs typeface="Times New Roman" panose="02020603050405020304" pitchFamily="18" charset="0"/>
+            </a:endParaRPr>
+          </a:p>
+          <a:p>
+            <a:pPr marL="0" marR="0">
+              <a:lnSpc>
+                <a:spcPct val="107000"/>
+              </a:lnSpc>
+              <a:spcBef>
+                <a:spcPts val="0"/>
+              </a:spcBef>
+              <a:spcAft>
+                <a:spcPts val="800"/>
+              </a:spcAft>
+            </a:pPr>
+            <a:r>
+              <a:rPr lang="en-US" sz="1800" kern="100" dirty="0">
+                <a:effectLst/>
+                <a:latin typeface="Aptos" panose="020B0004020202020204" pitchFamily="34" charset="0"/>
+                <a:ea typeface="Aptos" panose="020B0004020202020204" pitchFamily="34" charset="0"/>
+                <a:cs typeface="Times New Roman" panose="02020603050405020304" pitchFamily="18" charset="0"/>
+              </a:rPr>
+              <a:t>Add the files to your current local Branch:</a:t>
+            </a:r>
+          </a:p>
+          <a:p>
+            <a:pPr marL="0" marR="0">
+              <a:lnSpc>
+                <a:spcPct val="107000"/>
+              </a:lnSpc>
+              <a:spcBef>
+                <a:spcPts val="0"/>
+              </a:spcBef>
+              <a:spcAft>
+                <a:spcPts val="800"/>
+              </a:spcAft>
+            </a:pPr>
+            <a:r>
+              <a:rPr lang="en-US" sz="1800" i="1" kern="100" dirty="0">
+                <a:effectLst/>
+                <a:latin typeface="Aptos" panose="020B0004020202020204" pitchFamily="34" charset="0"/>
+                <a:ea typeface="Aptos" panose="020B0004020202020204" pitchFamily="34" charset="0"/>
+                <a:cs typeface="Times New Roman" panose="02020603050405020304" pitchFamily="18" charset="0"/>
+              </a:rPr>
+              <a:t>git add .</a:t>
+            </a:r>
+            <a:endParaRPr lang="en-US" sz="1800" kern="100" dirty="0">
+              <a:effectLst/>
+              <a:latin typeface="Aptos" panose="020B0004020202020204" pitchFamily="34" charset="0"/>
+              <a:ea typeface="Aptos" panose="020B0004020202020204" pitchFamily="34" charset="0"/>
+              <a:cs typeface="Times New Roman" panose="02020603050405020304" pitchFamily="18" charset="0"/>
+            </a:endParaRPr>
+          </a:p>
+          <a:p>
+            <a:pPr marL="0" marR="0">
+              <a:lnSpc>
+                <a:spcPct val="107000"/>
+              </a:lnSpc>
+              <a:spcBef>
+                <a:spcPts val="0"/>
+              </a:spcBef>
+              <a:spcAft>
+                <a:spcPts val="800"/>
+              </a:spcAft>
+            </a:pPr>
+            <a:r>
+              <a:rPr lang="en-US" sz="1800" i="1" kern="100" dirty="0">
+                <a:effectLst/>
+                <a:latin typeface="Aptos" panose="020B0004020202020204" pitchFamily="34" charset="0"/>
+                <a:ea typeface="Aptos" panose="020B0004020202020204" pitchFamily="34" charset="0"/>
+                <a:cs typeface="Times New Roman" panose="02020603050405020304" pitchFamily="18" charset="0"/>
+              </a:rPr>
+              <a:t>git commit -m “&lt;</a:t>
+            </a:r>
+            <a:r>
+              <a:rPr lang="en-US" sz="1800" i="1" kern="100" dirty="0" err="1">
+                <a:effectLst/>
+                <a:latin typeface="Aptos" panose="020B0004020202020204" pitchFamily="34" charset="0"/>
+                <a:ea typeface="Aptos" panose="020B0004020202020204" pitchFamily="34" charset="0"/>
+                <a:cs typeface="Times New Roman" panose="02020603050405020304" pitchFamily="18" charset="0"/>
+              </a:rPr>
+              <a:t>DEV_</a:t>
+            </a:r>
+            <a:r>
+              <a:rPr lang="en-US" i="1" kern="100" dirty="0" err="1">
+                <a:latin typeface="Aptos" panose="020B0004020202020204" pitchFamily="34" charset="0"/>
+                <a:ea typeface="Aptos" panose="020B0004020202020204" pitchFamily="34" charset="0"/>
+                <a:cs typeface="Times New Roman" panose="02020603050405020304" pitchFamily="18" charset="0"/>
+              </a:rPr>
+              <a:t>note</a:t>
+            </a:r>
+            <a:r>
+              <a:rPr lang="en-US" sz="1800" i="1" kern="100" dirty="0">
+                <a:effectLst/>
+                <a:latin typeface="Aptos" panose="020B0004020202020204" pitchFamily="34" charset="0"/>
+                <a:ea typeface="Aptos" panose="020B0004020202020204" pitchFamily="34" charset="0"/>
+                <a:cs typeface="Times New Roman" panose="02020603050405020304" pitchFamily="18" charset="0"/>
+              </a:rPr>
+              <a:t>&gt;”</a:t>
+            </a:r>
+            <a:endParaRPr lang="en-US" sz="1800" kern="100" dirty="0">
+              <a:effectLst/>
+              <a:latin typeface="Aptos" panose="020B0004020202020204" pitchFamily="34" charset="0"/>
+              <a:ea typeface="Aptos" panose="020B0004020202020204" pitchFamily="34" charset="0"/>
+              <a:cs typeface="Times New Roman" panose="02020603050405020304" pitchFamily="18" charset="0"/>
+            </a:endParaRPr>
+          </a:p>
+          <a:p>
+            <a:pPr marL="0" marR="0">
+              <a:lnSpc>
+                <a:spcPct val="107000"/>
+              </a:lnSpc>
+              <a:spcBef>
+                <a:spcPts val="0"/>
+              </a:spcBef>
+              <a:spcAft>
+                <a:spcPts val="800"/>
+              </a:spcAft>
+            </a:pPr>
+            <a:r>
+              <a:rPr lang="en-US" sz="1800" i="1" kern="100" dirty="0">
+                <a:effectLst/>
+                <a:latin typeface="Aptos" panose="020B0004020202020204" pitchFamily="34" charset="0"/>
+                <a:ea typeface="Aptos" panose="020B0004020202020204" pitchFamily="34" charset="0"/>
+                <a:cs typeface="Times New Roman" panose="02020603050405020304" pitchFamily="18" charset="0"/>
+              </a:rPr>
+              <a:t>git remote add &lt;name&gt; &lt;URL fork link&gt;</a:t>
+            </a:r>
+            <a:endParaRPr lang="en-US" sz="1800" kern="100" dirty="0">
+              <a:effectLst/>
+              <a:latin typeface="Aptos" panose="020B0004020202020204" pitchFamily="34" charset="0"/>
+              <a:ea typeface="Aptos" panose="020B0004020202020204" pitchFamily="34" charset="0"/>
+              <a:cs typeface="Times New Roman" panose="02020603050405020304" pitchFamily="18" charset="0"/>
+            </a:endParaRPr>
+          </a:p>
+          <a:p>
+            <a:pPr marL="0" marR="0">
+              <a:lnSpc>
+                <a:spcPct val="107000"/>
+              </a:lnSpc>
+              <a:spcBef>
+                <a:spcPts val="0"/>
+              </a:spcBef>
+              <a:spcAft>
+                <a:spcPts val="800"/>
+              </a:spcAft>
+            </a:pPr>
+            <a:r>
+              <a:rPr lang="en-US" sz="1800" i="1" kern="100" dirty="0">
+                <a:effectLst/>
+                <a:latin typeface="Aptos" panose="020B0004020202020204" pitchFamily="34" charset="0"/>
+                <a:ea typeface="Aptos" panose="020B0004020202020204" pitchFamily="34" charset="0"/>
+                <a:cs typeface="Times New Roman" panose="02020603050405020304" pitchFamily="18" charset="0"/>
+              </a:rPr>
+              <a:t>git push &lt;remote&gt; &lt;branch&gt;</a:t>
+            </a:r>
+            <a:endParaRPr lang="en-US" sz="1800" kern="100" dirty="0">
+              <a:effectLst/>
+              <a:latin typeface="Aptos" panose="020B0004020202020204" pitchFamily="34" charset="0"/>
+              <a:ea typeface="Aptos" panose="020B0004020202020204" pitchFamily="34" charset="0"/>
+              <a:cs typeface="Times New Roman" panose="02020603050405020304" pitchFamily="18" charset="0"/>
+            </a:endParaRPr>
+          </a:p>
+          <a:p>
+            <a:endParaRPr lang="en-US" dirty="0"/>
+          </a:p>
+        </p:txBody>
+      </p:sp>
+    </p:spTree>
+    <p:extLst>
+      <p:ext uri="{BB962C8B-B14F-4D97-AF65-F5344CB8AC3E}">
+        <p14:creationId xmlns:p14="http://schemas.microsoft.com/office/powerpoint/2010/main" val="3641515971"/>
+      </p:ext>
+    </p:extLst>
+  </p:cSld>
+  <p:clrMapOvr>
+    <a:masterClrMapping/>
+  </p:clrMapOvr>
+</p:sld>
+</file>
+
+<file path=ppt/slides/slide11.xml><?xml version="1.0" encoding="utf-8"?>
+<p:sld xmlns:a="http://schemas.openxmlformats.org/drawingml/2006/main" xmlns:r="http://schemas.openxmlformats.org/officeDocument/2006/relationships" xmlns:p="http://schemas.openxmlformats.org/presentationml/2006/main">
+  <p:cSld>
+    <p:spTree>
+      <p:nvGrpSpPr>
+        <p:cNvPr id="1" name=""/>
+        <p:cNvGrpSpPr/>
+        <p:nvPr/>
+      </p:nvGrpSpPr>
+      <p:grpSpPr>
+        <a:xfrm>
+          <a:off x="0" y="0"/>
+          <a:ext cx="0" cy="0"/>
+          <a:chOff x="0" y="0"/>
+          <a:chExt cx="0" cy="0"/>
+        </a:xfrm>
+      </p:grpSpPr>
+      <p:sp>
+        <p:nvSpPr>
+          <p:cNvPr id="2" name="Title 1">
+            <a:extLst>
+              <a:ext uri="{FF2B5EF4-FFF2-40B4-BE49-F238E27FC236}">
+                <a16:creationId xmlns:a16="http://schemas.microsoft.com/office/drawing/2014/main" id="{48DFBDBF-7B87-A11F-42DD-AC8E4F665B84}"/>
+              </a:ext>
+            </a:extLst>
+          </p:cNvPr>
+          <p:cNvSpPr>
+            <a:spLocks noGrp="1"/>
+          </p:cNvSpPr>
+          <p:nvPr>
+            <p:ph type="title"/>
+          </p:nvPr>
+        </p:nvSpPr>
+        <p:spPr/>
+        <p:txBody>
+          <a:bodyPr/>
+          <a:lstStyle/>
+          <a:p>
+            <a:r>
+              <a:rPr lang="en-US" dirty="0"/>
+              <a:t>Cloning in git </a:t>
+            </a:r>
+            <a:r>
+              <a:rPr lang="en-US" dirty="0" err="1"/>
+              <a:t>gui</a:t>
+            </a:r>
+            <a:endParaRPr lang="en-US" dirty="0"/>
+          </a:p>
+        </p:txBody>
+      </p:sp>
+      <p:pic>
+        <p:nvPicPr>
+          <p:cNvPr id="5" name="Content Placeholder 4">
+            <a:extLst>
+              <a:ext uri="{FF2B5EF4-FFF2-40B4-BE49-F238E27FC236}">
+                <a16:creationId xmlns:a16="http://schemas.microsoft.com/office/drawing/2014/main" id="{FC1A7F4C-C83B-8476-2BE9-598AA5375DD2}"/>
+              </a:ext>
+            </a:extLst>
+          </p:cNvPr>
+          <p:cNvPicPr>
+            <a:picLocks noGrp="1" noChangeAspect="1"/>
+          </p:cNvPicPr>
+          <p:nvPr>
+            <p:ph idx="1"/>
+          </p:nvPr>
+        </p:nvPicPr>
+        <p:blipFill>
+          <a:blip r:embed="rId2"/>
+          <a:srcRect l="4241" t="3764" r="3469" b="5719"/>
+          <a:stretch/>
+        </p:blipFill>
+        <p:spPr>
+          <a:xfrm>
+            <a:off x="164432" y="1641987"/>
+            <a:ext cx="3903406" cy="2635045"/>
+          </a:xfrm>
+        </p:spPr>
+      </p:pic>
+      <p:pic>
+        <p:nvPicPr>
+          <p:cNvPr id="7" name="Picture 6" descr="A screenshot of a computer&#10;&#10;Description automatically generated">
+            <a:extLst>
+              <a:ext uri="{FF2B5EF4-FFF2-40B4-BE49-F238E27FC236}">
+                <a16:creationId xmlns:a16="http://schemas.microsoft.com/office/drawing/2014/main" id="{675B8239-103E-84C4-4A67-9F8418662FC4}"/>
+              </a:ext>
+            </a:extLst>
+          </p:cNvPr>
+          <p:cNvPicPr>
+            <a:picLocks noChangeAspect="1"/>
+          </p:cNvPicPr>
+          <p:nvPr/>
+        </p:nvPicPr>
+        <p:blipFill>
+          <a:blip r:embed="rId3">
+            <a:extLst>
+              <a:ext uri="{28A0092B-C50C-407E-A947-70E740481C1C}">
+                <a14:useLocalDpi xmlns:a14="http://schemas.microsoft.com/office/drawing/2010/main" val="0"/>
+              </a:ext>
+            </a:extLst>
+          </a:blip>
+          <a:stretch>
+            <a:fillRect/>
+          </a:stretch>
+        </p:blipFill>
+        <p:spPr>
+          <a:xfrm>
+            <a:off x="1" y="3535107"/>
+            <a:ext cx="6596882" cy="2684068"/>
+          </a:xfrm>
+          <a:prstGeom prst="rect">
+            <a:avLst/>
+          </a:prstGeom>
+        </p:spPr>
+      </p:pic>
+      <p:pic>
+        <p:nvPicPr>
+          <p:cNvPr id="9" name="Picture 8" descr="A screenshot of a computer&#10;&#10;Description automatically generated">
+            <a:extLst>
+              <a:ext uri="{FF2B5EF4-FFF2-40B4-BE49-F238E27FC236}">
+                <a16:creationId xmlns:a16="http://schemas.microsoft.com/office/drawing/2014/main" id="{E525984E-43DE-6331-17FB-EA6706FA3DBA}"/>
+              </a:ext>
+            </a:extLst>
+          </p:cNvPr>
+          <p:cNvPicPr>
+            <a:picLocks noChangeAspect="1"/>
+          </p:cNvPicPr>
+          <p:nvPr/>
+        </p:nvPicPr>
+        <p:blipFill>
+          <a:blip r:embed="rId4">
+            <a:extLst>
+              <a:ext uri="{28A0092B-C50C-407E-A947-70E740481C1C}">
+                <a14:useLocalDpi xmlns:a14="http://schemas.microsoft.com/office/drawing/2010/main" val="0"/>
+              </a:ext>
+            </a:extLst>
+          </a:blip>
+          <a:stretch>
+            <a:fillRect/>
+          </a:stretch>
+        </p:blipFill>
+        <p:spPr>
+          <a:xfrm>
+            <a:off x="6499121" y="112797"/>
+            <a:ext cx="5525271" cy="6106377"/>
+          </a:xfrm>
+          <a:prstGeom prst="rect">
+            <a:avLst/>
+          </a:prstGeom>
+        </p:spPr>
+      </p:pic>
+      <p:sp>
+        <p:nvSpPr>
+          <p:cNvPr id="10" name="TextBox 9">
+            <a:extLst>
+              <a:ext uri="{FF2B5EF4-FFF2-40B4-BE49-F238E27FC236}">
+                <a16:creationId xmlns:a16="http://schemas.microsoft.com/office/drawing/2014/main" id="{738D293C-EB03-1DA9-1A92-8D7203AB9B94}"/>
+              </a:ext>
+            </a:extLst>
+          </p:cNvPr>
+          <p:cNvSpPr txBox="1"/>
+          <p:nvPr/>
+        </p:nvSpPr>
+        <p:spPr>
+          <a:xfrm>
+            <a:off x="2261419" y="6489290"/>
+            <a:ext cx="5048113" cy="369332"/>
+          </a:xfrm>
+          <a:prstGeom prst="rect">
+            <a:avLst/>
+          </a:prstGeom>
+          <a:noFill/>
+        </p:spPr>
+        <p:txBody>
+          <a:bodyPr wrap="none" rtlCol="0">
+            <a:spAutoFit/>
+          </a:bodyPr>
+          <a:lstStyle/>
+          <a:p>
+            <a:r>
+              <a:rPr lang="en-US" dirty="0"/>
+              <a:t>NOTE: The last /APXSRC folder cannot exist in clone</a:t>
+            </a:r>
+          </a:p>
+        </p:txBody>
+      </p:sp>
+    </p:spTree>
+    <p:extLst>
+      <p:ext uri="{BB962C8B-B14F-4D97-AF65-F5344CB8AC3E}">
+        <p14:creationId xmlns:p14="http://schemas.microsoft.com/office/powerpoint/2010/main" val="819485861"/>
+      </p:ext>
+    </p:extLst>
+  </p:cSld>
+  <p:clrMapOvr>
+    <a:masterClrMapping/>
+  </p:clrMapOvr>
+</p:sld>
+</file>
+
+<file path=ppt/slides/slide12.xml><?xml version="1.0" encoding="utf-8"?>
+<p:sld xmlns:a="http://schemas.openxmlformats.org/drawingml/2006/main" xmlns:r="http://schemas.openxmlformats.org/officeDocument/2006/relationships" xmlns:p="http://schemas.openxmlformats.org/presentationml/2006/main">
+  <p:cSld>
+    <p:spTree>
+      <p:nvGrpSpPr>
+        <p:cNvPr id="1" name=""/>
+        <p:cNvGrpSpPr/>
+        <p:nvPr/>
+      </p:nvGrpSpPr>
+      <p:grpSpPr>
+        <a:xfrm>
+          <a:off x="0" y="0"/>
+          <a:ext cx="0" cy="0"/>
+          <a:chOff x="0" y="0"/>
+          <a:chExt cx="0" cy="0"/>
+        </a:xfrm>
+      </p:grpSpPr>
+      <p:sp>
+        <p:nvSpPr>
+          <p:cNvPr id="2" name="Title 1">
+            <a:extLst>
+              <a:ext uri="{FF2B5EF4-FFF2-40B4-BE49-F238E27FC236}">
                 <a16:creationId xmlns:a16="http://schemas.microsoft.com/office/drawing/2014/main" id="{1C75A40D-3E81-4D0C-4F9B-6C6D6AFEBA7E}"/>
               </a:ext>
             </a:extLst>
@@ -12616,28 +13171,121 @@
           </a:p>
         </p:txBody>
       </p:sp>
-      <p:sp>
-        <p:nvSpPr>
-          <p:cNvPr id="3" name="Content Placeholder 2">
+      <p:pic>
+        <p:nvPicPr>
+          <p:cNvPr id="5" name="Content Placeholder 4">
             <a:extLst>
               <a:ext uri="{FF2B5EF4-FFF2-40B4-BE49-F238E27FC236}">
-                <a16:creationId xmlns:a16="http://schemas.microsoft.com/office/drawing/2014/main" id="{E453F73B-755D-79A8-C8DB-12E7F2DB815F}"/>
+                <a16:creationId xmlns:a16="http://schemas.microsoft.com/office/drawing/2014/main" id="{DA773DB2-7866-946C-ED7E-4B5F87061D58}"/>
               </a:ext>
             </a:extLst>
           </p:cNvPr>
-          <p:cNvSpPr>
-            <a:spLocks noGrp="1"/>
-          </p:cNvSpPr>
+          <p:cNvPicPr>
+            <a:picLocks noGrp="1" noChangeAspect="1"/>
+          </p:cNvPicPr>
           <p:nvPr>
             <p:ph idx="1"/>
           </p:nvPr>
+        </p:nvPicPr>
+        <p:blipFill>
+          <a:blip r:embed="rId2"/>
+          <a:stretch>
+            <a:fillRect/>
+          </a:stretch>
+        </p:blipFill>
+        <p:spPr>
+          <a:xfrm>
+            <a:off x="6416951" y="1478570"/>
+            <a:ext cx="5117762" cy="4760912"/>
+          </a:xfrm>
+        </p:spPr>
+      </p:pic>
+      <p:pic>
+        <p:nvPicPr>
+          <p:cNvPr id="4" name="Picture 3">
+            <a:extLst>
+              <a:ext uri="{FF2B5EF4-FFF2-40B4-BE49-F238E27FC236}">
+                <a16:creationId xmlns:a16="http://schemas.microsoft.com/office/drawing/2014/main" id="{12277F98-C013-0DD4-3746-8A335F61FB3C}"/>
+              </a:ext>
+            </a:extLst>
+          </p:cNvPr>
+          <p:cNvPicPr>
+            <a:picLocks noChangeAspect="1"/>
+          </p:cNvPicPr>
+          <p:nvPr/>
+        </p:nvPicPr>
+        <p:blipFill>
+          <a:blip r:embed="rId3"/>
+          <a:stretch>
+            <a:fillRect/>
+          </a:stretch>
+        </p:blipFill>
+        <p:spPr>
+          <a:xfrm>
+            <a:off x="1011432" y="1704972"/>
+            <a:ext cx="5082980" cy="1501270"/>
+          </a:xfrm>
+          <a:prstGeom prst="rect">
+            <a:avLst/>
+          </a:prstGeom>
+        </p:spPr>
+      </p:pic>
+      <p:sp>
+        <p:nvSpPr>
+          <p:cNvPr id="6" name="TextBox 5">
+            <a:extLst>
+              <a:ext uri="{FF2B5EF4-FFF2-40B4-BE49-F238E27FC236}">
+                <a16:creationId xmlns:a16="http://schemas.microsoft.com/office/drawing/2014/main" id="{C330B994-8032-4A5F-A289-37655EB4AD2E}"/>
+              </a:ext>
+            </a:extLst>
+          </p:cNvPr>
+          <p:cNvSpPr txBox="1"/>
+          <p:nvPr/>
         </p:nvSpPr>
-        <p:spPr/>
+        <p:spPr>
+          <a:xfrm>
+            <a:off x="1141413" y="3755923"/>
+            <a:ext cx="3957943" cy="1477328"/>
+          </a:xfrm>
+          <a:prstGeom prst="rect">
+            <a:avLst/>
+          </a:prstGeom>
+          <a:noFill/>
+        </p:spPr>
         <p:txBody>
-          <a:bodyPr/>
+          <a:bodyPr wrap="none" rtlCol="0">
+            <a:spAutoFit/>
+          </a:bodyPr>
           <a:lstStyle/>
           <a:p>
-            <a:endParaRPr lang="en-US"/>
+            <a:r>
+              <a:rPr lang="en-US" dirty="0"/>
+              <a:t>Select Rescan </a:t>
+            </a:r>
+          </a:p>
+          <a:p>
+            <a:r>
+              <a:rPr lang="en-US" dirty="0"/>
+              <a:t>Select Stage Changes</a:t>
+            </a:r>
+          </a:p>
+          <a:p>
+            <a:r>
+              <a:rPr lang="en-US" dirty="0"/>
+              <a:t>Add a commit message</a:t>
+            </a:r>
+          </a:p>
+          <a:p>
+            <a:r>
+              <a:rPr lang="en-US" dirty="0"/>
+              <a:t>Commit</a:t>
+            </a:r>
+          </a:p>
+          <a:p>
+            <a:r>
+              <a:rPr lang="en-US" dirty="0"/>
+              <a:t>Push – this will submit changes to GITHUB</a:t>
+            </a:r>
           </a:p>
         </p:txBody>
       </p:sp>
@@ -12654,7 +13302,192 @@
 </p:sld>
 </file>
 
-<file path=ppt/slides/slide11.xml><?xml version="1.0" encoding="utf-8"?>
+<file path=ppt/slides/slide13.xml><?xml version="1.0" encoding="utf-8"?>
+<p:sld xmlns:a="http://schemas.openxmlformats.org/drawingml/2006/main" xmlns:r="http://schemas.openxmlformats.org/officeDocument/2006/relationships" xmlns:p="http://schemas.openxmlformats.org/presentationml/2006/main">
+  <p:cSld>
+    <p:spTree>
+      <p:nvGrpSpPr>
+        <p:cNvPr id="1" name=""/>
+        <p:cNvGrpSpPr/>
+        <p:nvPr/>
+      </p:nvGrpSpPr>
+      <p:grpSpPr>
+        <a:xfrm>
+          <a:off x="0" y="0"/>
+          <a:ext cx="0" cy="0"/>
+          <a:chOff x="0" y="0"/>
+          <a:chExt cx="0" cy="0"/>
+        </a:xfrm>
+      </p:grpSpPr>
+      <p:sp>
+        <p:nvSpPr>
+          <p:cNvPr id="2" name="Title 1">
+            <a:extLst>
+              <a:ext uri="{FF2B5EF4-FFF2-40B4-BE49-F238E27FC236}">
+                <a16:creationId xmlns:a16="http://schemas.microsoft.com/office/drawing/2014/main" id="{413557E4-A4EB-FDFA-B561-32F6AB6CAFFB}"/>
+              </a:ext>
+            </a:extLst>
+          </p:cNvPr>
+          <p:cNvSpPr>
+            <a:spLocks noGrp="1"/>
+          </p:cNvSpPr>
+          <p:nvPr>
+            <p:ph type="title"/>
+          </p:nvPr>
+        </p:nvSpPr>
+        <p:spPr/>
+        <p:txBody>
+          <a:bodyPr/>
+          <a:lstStyle/>
+          <a:p>
+            <a:r>
+              <a:rPr lang="en-US" dirty="0"/>
+              <a:t>Zip download from </a:t>
+            </a:r>
+            <a:r>
+              <a:rPr lang="en-US" dirty="0" err="1"/>
+              <a:t>github</a:t>
+            </a:r>
+            <a:endParaRPr lang="en-US" dirty="0"/>
+          </a:p>
+        </p:txBody>
+      </p:sp>
+      <p:pic>
+        <p:nvPicPr>
+          <p:cNvPr id="5" name="Content Placeholder 4">
+            <a:extLst>
+              <a:ext uri="{FF2B5EF4-FFF2-40B4-BE49-F238E27FC236}">
+                <a16:creationId xmlns:a16="http://schemas.microsoft.com/office/drawing/2014/main" id="{B84CCC23-369F-09C7-921D-DB32B24C5CD6}"/>
+              </a:ext>
+            </a:extLst>
+          </p:cNvPr>
+          <p:cNvPicPr>
+            <a:picLocks noGrp="1" noChangeAspect="1"/>
+          </p:cNvPicPr>
+          <p:nvPr>
+            <p:ph idx="1"/>
+          </p:nvPr>
+        </p:nvPicPr>
+        <p:blipFill>
+          <a:blip r:embed="rId2"/>
+          <a:stretch>
+            <a:fillRect/>
+          </a:stretch>
+        </p:blipFill>
+        <p:spPr>
+          <a:xfrm>
+            <a:off x="1141413" y="1763885"/>
+            <a:ext cx="4954540" cy="4046980"/>
+          </a:xfrm>
+        </p:spPr>
+      </p:pic>
+      <p:sp>
+        <p:nvSpPr>
+          <p:cNvPr id="6" name="TextBox 5">
+            <a:extLst>
+              <a:ext uri="{FF2B5EF4-FFF2-40B4-BE49-F238E27FC236}">
+                <a16:creationId xmlns:a16="http://schemas.microsoft.com/office/drawing/2014/main" id="{1B13A0D3-E43C-B694-6B93-07D7E2686A2E}"/>
+              </a:ext>
+            </a:extLst>
+          </p:cNvPr>
+          <p:cNvSpPr txBox="1"/>
+          <p:nvPr/>
+        </p:nvSpPr>
+        <p:spPr>
+          <a:xfrm>
+            <a:off x="6607277" y="2182761"/>
+            <a:ext cx="5218095" cy="2862322"/>
+          </a:xfrm>
+          <a:prstGeom prst="rect">
+            <a:avLst/>
+          </a:prstGeom>
+          <a:noFill/>
+        </p:spPr>
+        <p:txBody>
+          <a:bodyPr wrap="none" rtlCol="0">
+            <a:spAutoFit/>
+          </a:bodyPr>
+          <a:lstStyle/>
+          <a:p>
+            <a:r>
+              <a:rPr lang="en-US" dirty="0"/>
+              <a:t>From the &lt;&gt; Code tab the dev can obtain the git </a:t>
+            </a:r>
+            <a:r>
+              <a:rPr lang="en-US" dirty="0" err="1"/>
+              <a:t>url</a:t>
+            </a:r>
+            <a:endParaRPr lang="en-US" dirty="0"/>
+          </a:p>
+          <a:p>
+            <a:endParaRPr lang="en-US" dirty="0"/>
+          </a:p>
+          <a:p>
+            <a:r>
+              <a:rPr lang="en-US" dirty="0"/>
+              <a:t>Dev team is not currently using GitHub Desktop.</a:t>
+            </a:r>
+          </a:p>
+          <a:p>
+            <a:endParaRPr lang="en-US" dirty="0"/>
+          </a:p>
+          <a:p>
+            <a:r>
+              <a:rPr lang="en-US" dirty="0"/>
+              <a:t>Download zip is easiest to use on the one off obtaining</a:t>
+            </a:r>
+          </a:p>
+          <a:p>
+            <a:r>
+              <a:rPr lang="en-US" dirty="0"/>
+              <a:t>Files. The problem with getting the whole </a:t>
+            </a:r>
+            <a:r>
+              <a:rPr lang="en-US" dirty="0" err="1"/>
+              <a:t>codespace</a:t>
+            </a:r>
+            <a:endParaRPr lang="en-US" dirty="0"/>
+          </a:p>
+          <a:p>
+            <a:r>
+              <a:rPr lang="en-US" dirty="0"/>
+              <a:t>Causes a failure loading symbols in the IDE from a </a:t>
+            </a:r>
+          </a:p>
+          <a:p>
+            <a:r>
+              <a:rPr lang="en-US" dirty="0"/>
+              <a:t>Microsoft security issue. This can be fixed by going </a:t>
+            </a:r>
+          </a:p>
+          <a:p>
+            <a:r>
+              <a:rPr lang="en-US" dirty="0"/>
+              <a:t>In the file explorer to those files and changing the </a:t>
+            </a:r>
+          </a:p>
+          <a:p>
+            <a:r>
+              <a:rPr lang="en-US"/>
+              <a:t>Security settings.</a:t>
+            </a:r>
+          </a:p>
+        </p:txBody>
+      </p:sp>
+    </p:spTree>
+    <p:extLst>
+      <p:ext uri="{BB962C8B-B14F-4D97-AF65-F5344CB8AC3E}">
+        <p14:creationId xmlns:p14="http://schemas.microsoft.com/office/powerpoint/2010/main" val="1854116891"/>
+      </p:ext>
+    </p:extLst>
+  </p:cSld>
+  <p:clrMapOvr>
+    <a:masterClrMapping/>
+  </p:clrMapOvr>
+</p:sld>
+</file>
+
+<file path=ppt/slides/slide14.xml><?xml version="1.0" encoding="utf-8"?>
 <p:sld xmlns:a="http://schemas.openxmlformats.org/drawingml/2006/main" xmlns:r="http://schemas.openxmlformats.org/officeDocument/2006/relationships" xmlns:p="http://schemas.openxmlformats.org/presentationml/2006/main">
   <p:cSld>
     <p:spTree>
@@ -12762,7 +13595,7 @@
 </p:sld>
 </file>
 
-<file path=ppt/slides/slide12.xml><?xml version="1.0" encoding="utf-8"?>
+<file path=ppt/slides/slide15.xml><?xml version="1.0" encoding="utf-8"?>
 <p:sld xmlns:a="http://schemas.openxmlformats.org/drawingml/2006/main" xmlns:r="http://schemas.openxmlformats.org/officeDocument/2006/relationships" xmlns:p="http://schemas.openxmlformats.org/presentationml/2006/main">
   <p:cSld>
     <p:spTree>
@@ -12784,7 +13617,7 @@
           <p:cNvPr id="2" name="Title 1">
             <a:extLst>
               <a:ext uri="{FF2B5EF4-FFF2-40B4-BE49-F238E27FC236}">
-                <a16:creationId xmlns:a16="http://schemas.microsoft.com/office/drawing/2014/main" id="{8A9F7A48-AB86-2BE9-3939-F96156266CB7}"/>
+                <a16:creationId xmlns:a16="http://schemas.microsoft.com/office/drawing/2014/main" id="{330C7730-28B8-A44C-72A6-D1C15A4BCDFA}"/>
               </a:ext>
             </a:extLst>
           </p:cNvPr>
@@ -12802,7 +13635,7 @@
           <a:p>
             <a:r>
               <a:rPr lang="en-US" dirty="0"/>
-              <a:t>Bash scripts to call for every dev</a:t>
+              <a:t>Pull-request (Development)</a:t>
             </a:r>
           </a:p>
         </p:txBody>
@@ -12812,7 +13645,950 @@
           <p:cNvPr id="3" name="Content Placeholder 2">
             <a:extLst>
               <a:ext uri="{FF2B5EF4-FFF2-40B4-BE49-F238E27FC236}">
-                <a16:creationId xmlns:a16="http://schemas.microsoft.com/office/drawing/2014/main" id="{560E46F6-2C1C-38E4-F921-833EDCE9FF65}"/>
+                <a16:creationId xmlns:a16="http://schemas.microsoft.com/office/drawing/2014/main" id="{37696794-D229-53AE-EF60-3E7550EFA6C0}"/>
+              </a:ext>
+            </a:extLst>
+          </p:cNvPr>
+          <p:cNvSpPr>
+            <a:spLocks noGrp="1"/>
+          </p:cNvSpPr>
+          <p:nvPr>
+            <p:ph idx="1"/>
+          </p:nvPr>
+        </p:nvSpPr>
+        <p:spPr>
+          <a:xfrm>
+            <a:off x="1141412" y="2249486"/>
+            <a:ext cx="9905999" cy="4318461"/>
+          </a:xfrm>
+        </p:spPr>
+        <p:txBody>
+          <a:bodyPr>
+            <a:normAutofit fontScale="92500" lnSpcReduction="10000"/>
+          </a:bodyPr>
+          <a:lstStyle/>
+          <a:p>
+            <a:r>
+              <a:rPr lang="en-US" dirty="0"/>
+              <a:t>Shall be from personal fork to DEV_ branch</a:t>
+            </a:r>
+          </a:p>
+          <a:p>
+            <a:r>
+              <a:rPr lang="en-US" dirty="0"/>
+              <a:t>Shall never be into </a:t>
+            </a:r>
+            <a:r>
+              <a:rPr lang="en-US" dirty="0" err="1"/>
+              <a:t>BuildInit</a:t>
+            </a:r>
+            <a:r>
+              <a:rPr lang="en-US" dirty="0"/>
+              <a:t> (should be able to change in edit)</a:t>
+            </a:r>
+          </a:p>
+          <a:p>
+            <a:r>
+              <a:rPr lang="en-US" dirty="0"/>
+              <a:t>Shall be linked under development in the issue</a:t>
+            </a:r>
+          </a:p>
+          <a:p>
+            <a:r>
+              <a:rPr lang="en-US" dirty="0"/>
+              <a:t>Can be preformed in git bash, yet shall be within GITHUB</a:t>
+            </a:r>
+          </a:p>
+          <a:p>
+            <a:r>
+              <a:rPr lang="en-US" dirty="0"/>
+              <a:t>Shall be reviewed by another developer</a:t>
+            </a:r>
+          </a:p>
+          <a:p>
+            <a:r>
+              <a:rPr lang="en-US" dirty="0"/>
+              <a:t>Reviewer shall merge</a:t>
+            </a:r>
+          </a:p>
+          <a:p>
+            <a:r>
+              <a:rPr lang="en-US" dirty="0"/>
+              <a:t>If force merge, requires two verifications prior to merge</a:t>
+            </a:r>
+          </a:p>
+          <a:p>
+            <a:r>
+              <a:rPr lang="en-US" dirty="0"/>
+              <a:t>All requested alterations, commented on code, shall be preformed by author developer, not reviewer (even if simple)</a:t>
+            </a:r>
+          </a:p>
+        </p:txBody>
+      </p:sp>
+    </p:spTree>
+    <p:extLst>
+      <p:ext uri="{BB962C8B-B14F-4D97-AF65-F5344CB8AC3E}">
+        <p14:creationId xmlns:p14="http://schemas.microsoft.com/office/powerpoint/2010/main" val="1874483503"/>
+      </p:ext>
+    </p:extLst>
+  </p:cSld>
+  <p:clrMapOvr>
+    <a:masterClrMapping/>
+  </p:clrMapOvr>
+</p:sld>
+</file>
+
+<file path=ppt/slides/slide16.xml><?xml version="1.0" encoding="utf-8"?>
+<p:sld xmlns:a="http://schemas.openxmlformats.org/drawingml/2006/main" xmlns:r="http://schemas.openxmlformats.org/officeDocument/2006/relationships" xmlns:p="http://schemas.openxmlformats.org/presentationml/2006/main">
+  <p:cSld>
+    <p:spTree>
+      <p:nvGrpSpPr>
+        <p:cNvPr id="1" name=""/>
+        <p:cNvGrpSpPr/>
+        <p:nvPr/>
+      </p:nvGrpSpPr>
+      <p:grpSpPr>
+        <a:xfrm>
+          <a:off x="0" y="0"/>
+          <a:ext cx="0" cy="0"/>
+          <a:chOff x="0" y="0"/>
+          <a:chExt cx="0" cy="0"/>
+        </a:xfrm>
+      </p:grpSpPr>
+      <p:sp>
+        <p:nvSpPr>
+          <p:cNvPr id="2" name="Title 1">
+            <a:extLst>
+              <a:ext uri="{FF2B5EF4-FFF2-40B4-BE49-F238E27FC236}">
+                <a16:creationId xmlns:a16="http://schemas.microsoft.com/office/drawing/2014/main" id="{9BE933B0-0462-6DEB-E71D-568A761372DF}"/>
+              </a:ext>
+            </a:extLst>
+          </p:cNvPr>
+          <p:cNvSpPr>
+            <a:spLocks noGrp="1"/>
+          </p:cNvSpPr>
+          <p:nvPr>
+            <p:ph type="title"/>
+          </p:nvPr>
+        </p:nvSpPr>
+        <p:spPr/>
+        <p:txBody>
+          <a:bodyPr/>
+          <a:lstStyle/>
+          <a:p>
+            <a:r>
+              <a:rPr lang="en-US" dirty="0"/>
+              <a:t>Pull-Request in GITHUB</a:t>
+            </a:r>
+          </a:p>
+        </p:txBody>
+      </p:sp>
+      <p:pic>
+        <p:nvPicPr>
+          <p:cNvPr id="5" name="Content Placeholder 4">
+            <a:extLst>
+              <a:ext uri="{FF2B5EF4-FFF2-40B4-BE49-F238E27FC236}">
+                <a16:creationId xmlns:a16="http://schemas.microsoft.com/office/drawing/2014/main" id="{6EF8BFD5-0FF3-F2BC-D0A3-ABC420929CDD}"/>
+              </a:ext>
+            </a:extLst>
+          </p:cNvPr>
+          <p:cNvPicPr>
+            <a:picLocks noGrp="1" noChangeAspect="1"/>
+          </p:cNvPicPr>
+          <p:nvPr>
+            <p:ph idx="1"/>
+          </p:nvPr>
+        </p:nvPicPr>
+        <p:blipFill>
+          <a:blip r:embed="rId2"/>
+          <a:stretch>
+            <a:fillRect/>
+          </a:stretch>
+        </p:blipFill>
+        <p:spPr>
+          <a:xfrm>
+            <a:off x="1554368" y="4783290"/>
+            <a:ext cx="6744284" cy="853514"/>
+          </a:xfrm>
+        </p:spPr>
+      </p:pic>
+      <p:pic>
+        <p:nvPicPr>
+          <p:cNvPr id="6" name="Picture 5" descr="A screenshot of a computer&#10;&#10;Description automatically generated">
+            <a:extLst>
+              <a:ext uri="{FF2B5EF4-FFF2-40B4-BE49-F238E27FC236}">
+                <a16:creationId xmlns:a16="http://schemas.microsoft.com/office/drawing/2014/main" id="{D8042A7C-FE07-2AC9-FA86-E0195CA2E7AC}"/>
+              </a:ext>
+            </a:extLst>
+          </p:cNvPr>
+          <p:cNvPicPr>
+            <a:picLocks noChangeAspect="1"/>
+          </p:cNvPicPr>
+          <p:nvPr/>
+        </p:nvPicPr>
+        <p:blipFill>
+          <a:blip r:embed="rId3">
+            <a:extLst>
+              <a:ext uri="{28A0092B-C50C-407E-A947-70E740481C1C}">
+                <a14:useLocalDpi xmlns:a14="http://schemas.microsoft.com/office/drawing/2010/main" val="0"/>
+              </a:ext>
+            </a:extLst>
+          </a:blip>
+          <a:stretch>
+            <a:fillRect/>
+          </a:stretch>
+        </p:blipFill>
+        <p:spPr>
+          <a:xfrm>
+            <a:off x="8188059" y="454496"/>
+            <a:ext cx="3642360" cy="2606040"/>
+          </a:xfrm>
+          <a:prstGeom prst="rect">
+            <a:avLst/>
+          </a:prstGeom>
+        </p:spPr>
+      </p:pic>
+      <p:pic>
+        <p:nvPicPr>
+          <p:cNvPr id="7" name="Picture 6">
+            <a:extLst>
+              <a:ext uri="{FF2B5EF4-FFF2-40B4-BE49-F238E27FC236}">
+                <a16:creationId xmlns:a16="http://schemas.microsoft.com/office/drawing/2014/main" id="{4EE8D71C-B23B-FE5B-A155-98236E405FB4}"/>
+              </a:ext>
+            </a:extLst>
+          </p:cNvPr>
+          <p:cNvPicPr>
+            <a:picLocks noChangeAspect="1"/>
+          </p:cNvPicPr>
+          <p:nvPr/>
+        </p:nvPicPr>
+        <p:blipFill>
+          <a:blip r:embed="rId4"/>
+          <a:stretch>
+            <a:fillRect/>
+          </a:stretch>
+        </p:blipFill>
+        <p:spPr>
+          <a:xfrm>
+            <a:off x="594266" y="3183322"/>
+            <a:ext cx="10406174" cy="758228"/>
+          </a:xfrm>
+          <a:prstGeom prst="rect">
+            <a:avLst/>
+          </a:prstGeom>
+        </p:spPr>
+      </p:pic>
+      <p:sp>
+        <p:nvSpPr>
+          <p:cNvPr id="9" name="TextBox 8">
+            <a:extLst>
+              <a:ext uri="{FF2B5EF4-FFF2-40B4-BE49-F238E27FC236}">
+                <a16:creationId xmlns:a16="http://schemas.microsoft.com/office/drawing/2014/main" id="{A8DE5F84-CFBD-E389-D3DB-20DD766E0BFC}"/>
+              </a:ext>
+            </a:extLst>
+          </p:cNvPr>
+          <p:cNvSpPr txBox="1"/>
+          <p:nvPr/>
+        </p:nvSpPr>
+        <p:spPr>
+          <a:xfrm>
+            <a:off x="1268361" y="2005781"/>
+            <a:ext cx="5745484" cy="923330"/>
+          </a:xfrm>
+          <a:prstGeom prst="rect">
+            <a:avLst/>
+          </a:prstGeom>
+          <a:noFill/>
+        </p:spPr>
+        <p:txBody>
+          <a:bodyPr wrap="none" rtlCol="0">
+            <a:spAutoFit/>
+          </a:bodyPr>
+          <a:lstStyle/>
+          <a:p>
+            <a:r>
+              <a:rPr lang="en-US" dirty="0"/>
+              <a:t>Select Contribute: Open the Pull Request</a:t>
+            </a:r>
+          </a:p>
+          <a:p>
+            <a:r>
+              <a:rPr lang="en-US" dirty="0"/>
+              <a:t>The display should show if the code can merge.</a:t>
+            </a:r>
+          </a:p>
+          <a:p>
+            <a:r>
+              <a:rPr lang="en-US" dirty="0"/>
+              <a:t>Input information about what is completed in the pull-request</a:t>
+            </a:r>
+          </a:p>
+        </p:txBody>
+      </p:sp>
+      <p:sp>
+        <p:nvSpPr>
+          <p:cNvPr id="10" name="TextBox 9">
+            <a:extLst>
+              <a:ext uri="{FF2B5EF4-FFF2-40B4-BE49-F238E27FC236}">
+                <a16:creationId xmlns:a16="http://schemas.microsoft.com/office/drawing/2014/main" id="{4CBF0E81-7C04-B015-795F-52D347D4D8C0}"/>
+              </a:ext>
+            </a:extLst>
+          </p:cNvPr>
+          <p:cNvSpPr txBox="1"/>
+          <p:nvPr/>
+        </p:nvSpPr>
+        <p:spPr>
+          <a:xfrm>
+            <a:off x="1651819" y="4064336"/>
+            <a:ext cx="9009326" cy="369332"/>
+          </a:xfrm>
+          <a:prstGeom prst="rect">
+            <a:avLst/>
+          </a:prstGeom>
+          <a:noFill/>
+        </p:spPr>
+        <p:txBody>
+          <a:bodyPr wrap="none" rtlCol="0">
+            <a:spAutoFit/>
+          </a:bodyPr>
+          <a:lstStyle/>
+          <a:p>
+            <a:r>
+              <a:rPr lang="en-US" dirty="0"/>
+              <a:t>If the pull-request requires alteration to a different branch, select edit and select the drop-down</a:t>
+            </a:r>
+          </a:p>
+        </p:txBody>
+      </p:sp>
+    </p:spTree>
+    <p:extLst>
+      <p:ext uri="{BB962C8B-B14F-4D97-AF65-F5344CB8AC3E}">
+        <p14:creationId xmlns:p14="http://schemas.microsoft.com/office/powerpoint/2010/main" val="4124621219"/>
+      </p:ext>
+    </p:extLst>
+  </p:cSld>
+  <p:clrMapOvr>
+    <a:masterClrMapping/>
+  </p:clrMapOvr>
+</p:sld>
+</file>
+
+<file path=ppt/slides/slide17.xml><?xml version="1.0" encoding="utf-8"?>
+<p:sld xmlns:a="http://schemas.openxmlformats.org/drawingml/2006/main" xmlns:r="http://schemas.openxmlformats.org/officeDocument/2006/relationships" xmlns:p="http://schemas.openxmlformats.org/presentationml/2006/main">
+  <p:cSld>
+    <p:spTree>
+      <p:nvGrpSpPr>
+        <p:cNvPr id="1" name=""/>
+        <p:cNvGrpSpPr/>
+        <p:nvPr/>
+      </p:nvGrpSpPr>
+      <p:grpSpPr>
+        <a:xfrm>
+          <a:off x="0" y="0"/>
+          <a:ext cx="0" cy="0"/>
+          <a:chOff x="0" y="0"/>
+          <a:chExt cx="0" cy="0"/>
+        </a:xfrm>
+      </p:grpSpPr>
+      <p:sp>
+        <p:nvSpPr>
+          <p:cNvPr id="2" name="Title 1">
+            <a:extLst>
+              <a:ext uri="{FF2B5EF4-FFF2-40B4-BE49-F238E27FC236}">
+                <a16:creationId xmlns:a16="http://schemas.microsoft.com/office/drawing/2014/main" id="{EE268DD1-64BA-BAFB-5718-36A63AF8232E}"/>
+              </a:ext>
+            </a:extLst>
+          </p:cNvPr>
+          <p:cNvSpPr>
+            <a:spLocks noGrp="1"/>
+          </p:cNvSpPr>
+          <p:nvPr>
+            <p:ph type="title"/>
+          </p:nvPr>
+        </p:nvSpPr>
+        <p:spPr/>
+        <p:txBody>
+          <a:bodyPr/>
+          <a:lstStyle/>
+          <a:p>
+            <a:r>
+              <a:rPr lang="en-US" dirty="0"/>
+              <a:t>File change in pull-request</a:t>
+            </a:r>
+          </a:p>
+        </p:txBody>
+      </p:sp>
+      <p:pic>
+        <p:nvPicPr>
+          <p:cNvPr id="4" name="Content Placeholder 3" descr="A screenshot of a computer&#10;&#10;Description automatically generated">
+            <a:extLst>
+              <a:ext uri="{FF2B5EF4-FFF2-40B4-BE49-F238E27FC236}">
+                <a16:creationId xmlns:a16="http://schemas.microsoft.com/office/drawing/2014/main" id="{BDC1E027-215E-EC68-0156-23562E81B396}"/>
+              </a:ext>
+            </a:extLst>
+          </p:cNvPr>
+          <p:cNvPicPr>
+            <a:picLocks noGrp="1" noChangeAspect="1"/>
+          </p:cNvPicPr>
+          <p:nvPr>
+            <p:ph idx="1"/>
+          </p:nvPr>
+        </p:nvPicPr>
+        <p:blipFill>
+          <a:blip r:embed="rId2"/>
+          <a:stretch>
+            <a:fillRect/>
+          </a:stretch>
+        </p:blipFill>
+        <p:spPr>
+          <a:xfrm>
+            <a:off x="1141411" y="1800242"/>
+            <a:ext cx="9906000" cy="2867042"/>
+          </a:xfrm>
+          <a:prstGeom prst="rect">
+            <a:avLst/>
+          </a:prstGeom>
+        </p:spPr>
+      </p:pic>
+      <p:sp>
+        <p:nvSpPr>
+          <p:cNvPr id="5" name="TextBox 4">
+            <a:extLst>
+              <a:ext uri="{FF2B5EF4-FFF2-40B4-BE49-F238E27FC236}">
+                <a16:creationId xmlns:a16="http://schemas.microsoft.com/office/drawing/2014/main" id="{06F65E1C-1B19-EC6D-ADFD-54ED3C4A3AC4}"/>
+              </a:ext>
+            </a:extLst>
+          </p:cNvPr>
+          <p:cNvSpPr txBox="1"/>
+          <p:nvPr/>
+        </p:nvSpPr>
+        <p:spPr>
+          <a:xfrm>
+            <a:off x="1278193" y="5053781"/>
+            <a:ext cx="10782311" cy="1200329"/>
+          </a:xfrm>
+          <a:prstGeom prst="rect">
+            <a:avLst/>
+          </a:prstGeom>
+          <a:noFill/>
+        </p:spPr>
+        <p:txBody>
+          <a:bodyPr wrap="none" rtlCol="0">
+            <a:spAutoFit/>
+          </a:bodyPr>
+          <a:lstStyle/>
+          <a:p>
+            <a:r>
+              <a:rPr lang="en-US" dirty="0"/>
+              <a:t>Each change made in the codebase is shown under the files changed tab.</a:t>
+            </a:r>
+          </a:p>
+          <a:p>
+            <a:r>
+              <a:rPr lang="en-US" dirty="0"/>
+              <a:t>Reviewers can add comments in the code locations</a:t>
+            </a:r>
+          </a:p>
+          <a:p>
+            <a:r>
+              <a:rPr lang="en-US" dirty="0"/>
+              <a:t>Developer can alter the codebase while the pull-request is still active and the changes will update the files changed</a:t>
+            </a:r>
+          </a:p>
+          <a:p>
+            <a:endParaRPr lang="en-US" dirty="0"/>
+          </a:p>
+        </p:txBody>
+      </p:sp>
+    </p:spTree>
+    <p:extLst>
+      <p:ext uri="{BB962C8B-B14F-4D97-AF65-F5344CB8AC3E}">
+        <p14:creationId xmlns:p14="http://schemas.microsoft.com/office/powerpoint/2010/main" val="3353178044"/>
+      </p:ext>
+    </p:extLst>
+  </p:cSld>
+  <p:clrMapOvr>
+    <a:masterClrMapping/>
+  </p:clrMapOvr>
+</p:sld>
+</file>
+
+<file path=ppt/slides/slide2.xml><?xml version="1.0" encoding="utf-8"?>
+<p:sld xmlns:a="http://schemas.openxmlformats.org/drawingml/2006/main" xmlns:r="http://schemas.openxmlformats.org/officeDocument/2006/relationships" xmlns:p="http://schemas.openxmlformats.org/presentationml/2006/main">
+  <p:cSld>
+    <p:spTree>
+      <p:nvGrpSpPr>
+        <p:cNvPr id="1" name=""/>
+        <p:cNvGrpSpPr/>
+        <p:nvPr/>
+      </p:nvGrpSpPr>
+      <p:grpSpPr>
+        <a:xfrm>
+          <a:off x="0" y="0"/>
+          <a:ext cx="0" cy="0"/>
+          <a:chOff x="0" y="0"/>
+          <a:chExt cx="0" cy="0"/>
+        </a:xfrm>
+      </p:grpSpPr>
+      <p:sp>
+        <p:nvSpPr>
+          <p:cNvPr id="2" name="Title 1">
+            <a:extLst>
+              <a:ext uri="{FF2B5EF4-FFF2-40B4-BE49-F238E27FC236}">
+                <a16:creationId xmlns:a16="http://schemas.microsoft.com/office/drawing/2014/main" id="{B68E33C1-B991-97CB-A66A-3AE78583F4C2}"/>
+              </a:ext>
+            </a:extLst>
+          </p:cNvPr>
+          <p:cNvSpPr>
+            <a:spLocks noGrp="1"/>
+          </p:cNvSpPr>
+          <p:nvPr>
+            <p:ph type="title"/>
+          </p:nvPr>
+        </p:nvSpPr>
+        <p:spPr>
+          <a:xfrm>
+            <a:off x="981332" y="77694"/>
+            <a:ext cx="9905998" cy="1478570"/>
+          </a:xfrm>
+        </p:spPr>
+        <p:txBody>
+          <a:bodyPr/>
+          <a:lstStyle/>
+          <a:p>
+            <a:r>
+              <a:rPr lang="en-US" dirty="0" err="1"/>
+              <a:t>Github</a:t>
+            </a:r>
+            <a:r>
+              <a:rPr lang="en-US" dirty="0"/>
+              <a:t> navigation</a:t>
+            </a:r>
+          </a:p>
+        </p:txBody>
+      </p:sp>
+      <p:pic>
+        <p:nvPicPr>
+          <p:cNvPr id="4" name="Content Placeholder 3">
+            <a:extLst>
+              <a:ext uri="{FF2B5EF4-FFF2-40B4-BE49-F238E27FC236}">
+                <a16:creationId xmlns:a16="http://schemas.microsoft.com/office/drawing/2014/main" id="{9191007C-E76D-6777-BE9E-06616EAB48D0}"/>
+              </a:ext>
+            </a:extLst>
+          </p:cNvPr>
+          <p:cNvPicPr>
+            <a:picLocks noGrp="1" noChangeAspect="1"/>
+          </p:cNvPicPr>
+          <p:nvPr>
+            <p:ph idx="1"/>
+          </p:nvPr>
+        </p:nvPicPr>
+        <p:blipFill>
+          <a:blip r:embed="rId2"/>
+          <a:stretch>
+            <a:fillRect/>
+          </a:stretch>
+        </p:blipFill>
+        <p:spPr>
+          <a:xfrm>
+            <a:off x="197194" y="1113237"/>
+            <a:ext cx="11277630" cy="662154"/>
+          </a:xfrm>
+          <a:prstGeom prst="rect">
+            <a:avLst/>
+          </a:prstGeom>
+        </p:spPr>
+      </p:pic>
+      <p:pic>
+        <p:nvPicPr>
+          <p:cNvPr id="5" name="Picture 4">
+            <a:extLst>
+              <a:ext uri="{FF2B5EF4-FFF2-40B4-BE49-F238E27FC236}">
+                <a16:creationId xmlns:a16="http://schemas.microsoft.com/office/drawing/2014/main" id="{DC6A8B83-75B3-8885-9ADE-2606EFCF63D5}"/>
+              </a:ext>
+            </a:extLst>
+          </p:cNvPr>
+          <p:cNvPicPr>
+            <a:picLocks noChangeAspect="1"/>
+          </p:cNvPicPr>
+          <p:nvPr/>
+        </p:nvPicPr>
+        <p:blipFill>
+          <a:blip r:embed="rId3"/>
+          <a:stretch>
+            <a:fillRect/>
+          </a:stretch>
+        </p:blipFill>
+        <p:spPr>
+          <a:xfrm>
+            <a:off x="295516" y="3213764"/>
+            <a:ext cx="11277630" cy="718105"/>
+          </a:xfrm>
+          <a:prstGeom prst="rect">
+            <a:avLst/>
+          </a:prstGeom>
+        </p:spPr>
+      </p:pic>
+      <p:sp>
+        <p:nvSpPr>
+          <p:cNvPr id="6" name="TextBox 5">
+            <a:extLst>
+              <a:ext uri="{FF2B5EF4-FFF2-40B4-BE49-F238E27FC236}">
+                <a16:creationId xmlns:a16="http://schemas.microsoft.com/office/drawing/2014/main" id="{4AC07A09-2245-E7B0-8B3C-DDC9265CB9E6}"/>
+              </a:ext>
+            </a:extLst>
+          </p:cNvPr>
+          <p:cNvSpPr txBox="1"/>
+          <p:nvPr/>
+        </p:nvSpPr>
+        <p:spPr>
+          <a:xfrm>
+            <a:off x="295516" y="1914430"/>
+            <a:ext cx="11277630" cy="1200329"/>
+          </a:xfrm>
+          <a:prstGeom prst="rect">
+            <a:avLst/>
+          </a:prstGeom>
+          <a:noFill/>
+        </p:spPr>
+        <p:txBody>
+          <a:bodyPr wrap="square" rtlCol="0">
+            <a:spAutoFit/>
+          </a:bodyPr>
+          <a:lstStyle/>
+          <a:p>
+            <a:r>
+              <a:rPr lang="en-US" dirty="0"/>
+              <a:t>Briefly before we navigated through GITHUB. This serves as a refresher.</a:t>
+            </a:r>
+          </a:p>
+          <a:p>
+            <a:r>
+              <a:rPr lang="en-US" dirty="0"/>
+              <a:t>Repository: broken out into manageable sized container of code</a:t>
+            </a:r>
+          </a:p>
+          <a:p>
+            <a:r>
+              <a:rPr lang="en-US" dirty="0"/>
+              <a:t>Project: tracks current and future development </a:t>
+            </a:r>
+          </a:p>
+          <a:p>
+            <a:r>
+              <a:rPr lang="en-US" dirty="0"/>
+              <a:t>Teams: contains their own projects and links to repos </a:t>
+            </a:r>
+          </a:p>
+        </p:txBody>
+      </p:sp>
+      <p:sp>
+        <p:nvSpPr>
+          <p:cNvPr id="3" name="TextBox 2">
+            <a:extLst>
+              <a:ext uri="{FF2B5EF4-FFF2-40B4-BE49-F238E27FC236}">
+                <a16:creationId xmlns:a16="http://schemas.microsoft.com/office/drawing/2014/main" id="{3ABC46A0-BC85-2996-31F6-8F59B3F0499D}"/>
+              </a:ext>
+            </a:extLst>
+          </p:cNvPr>
+          <p:cNvSpPr txBox="1"/>
+          <p:nvPr/>
+        </p:nvSpPr>
+        <p:spPr>
+          <a:xfrm>
+            <a:off x="1310551" y="4030874"/>
+            <a:ext cx="9778501" cy="2585323"/>
+          </a:xfrm>
+          <a:prstGeom prst="rect">
+            <a:avLst/>
+          </a:prstGeom>
+          <a:noFill/>
+        </p:spPr>
+        <p:txBody>
+          <a:bodyPr wrap="square" rtlCol="0">
+            <a:spAutoFit/>
+          </a:bodyPr>
+          <a:lstStyle/>
+          <a:p>
+            <a:r>
+              <a:rPr lang="en-US" dirty="0"/>
+              <a:t>Inside Repos the menu changes to the one above</a:t>
+            </a:r>
+          </a:p>
+          <a:p>
+            <a:r>
+              <a:rPr lang="en-US" dirty="0"/>
+              <a:t>Code is the collection of code in each branch of the repo</a:t>
+            </a:r>
+          </a:p>
+          <a:p>
+            <a:r>
+              <a:rPr lang="en-US" dirty="0"/>
+              <a:t>Issue are associated tasks for the development team to work on (should only be in DEV_ repo)</a:t>
+            </a:r>
+          </a:p>
+          <a:p>
+            <a:r>
+              <a:rPr lang="en-US" dirty="0"/>
+              <a:t>Pull request are changes to the </a:t>
+            </a:r>
+            <a:r>
+              <a:rPr lang="en-US" dirty="0" err="1"/>
+              <a:t>codespace</a:t>
+            </a:r>
+            <a:r>
+              <a:rPr lang="en-US" dirty="0"/>
+              <a:t> from a fork of a development branch</a:t>
+            </a:r>
+          </a:p>
+          <a:p>
+            <a:r>
+              <a:rPr lang="en-US" dirty="0"/>
+              <a:t>Actions: are workflows set on users to preform a task. Not currently being used</a:t>
+            </a:r>
+          </a:p>
+          <a:p>
+            <a:r>
+              <a:rPr lang="en-US" dirty="0"/>
+              <a:t>Projects: can be repo specific, yet as an organization we are using org projects for better tracking</a:t>
+            </a:r>
+          </a:p>
+          <a:p>
+            <a:r>
+              <a:rPr lang="en-US" dirty="0"/>
+              <a:t>Wiki: Is documentation and roadmap for the software in the space. Not currently being used</a:t>
+            </a:r>
+          </a:p>
+          <a:p>
+            <a:r>
+              <a:rPr lang="en-US" dirty="0"/>
+              <a:t>Insights: Are statistics  linked to the repo which shows all the changes made</a:t>
+            </a:r>
+          </a:p>
+          <a:p>
+            <a:r>
+              <a:rPr lang="en-US" dirty="0"/>
+              <a:t>Settings: Shall only be used by admin. This sets rules for the repo.</a:t>
+            </a:r>
+          </a:p>
+        </p:txBody>
+      </p:sp>
+    </p:spTree>
+    <p:extLst>
+      <p:ext uri="{BB962C8B-B14F-4D97-AF65-F5344CB8AC3E}">
+        <p14:creationId xmlns:p14="http://schemas.microsoft.com/office/powerpoint/2010/main" val="230952666"/>
+      </p:ext>
+    </p:extLst>
+  </p:cSld>
+  <p:clrMapOvr>
+    <a:masterClrMapping/>
+  </p:clrMapOvr>
+</p:sld>
+</file>
+
+<file path=ppt/slides/slide3.xml><?xml version="1.0" encoding="utf-8"?>
+<p:sld xmlns:a="http://schemas.openxmlformats.org/drawingml/2006/main" xmlns:r="http://schemas.openxmlformats.org/officeDocument/2006/relationships" xmlns:p="http://schemas.openxmlformats.org/presentationml/2006/main">
+  <p:cSld>
+    <p:spTree>
+      <p:nvGrpSpPr>
+        <p:cNvPr id="1" name=""/>
+        <p:cNvGrpSpPr/>
+        <p:nvPr/>
+      </p:nvGrpSpPr>
+      <p:grpSpPr>
+        <a:xfrm>
+          <a:off x="0" y="0"/>
+          <a:ext cx="0" cy="0"/>
+          <a:chOff x="0" y="0"/>
+          <a:chExt cx="0" cy="0"/>
+        </a:xfrm>
+      </p:grpSpPr>
+      <p:sp>
+        <p:nvSpPr>
+          <p:cNvPr id="2" name="Title 1">
+            <a:extLst>
+              <a:ext uri="{FF2B5EF4-FFF2-40B4-BE49-F238E27FC236}">
+                <a16:creationId xmlns:a16="http://schemas.microsoft.com/office/drawing/2014/main" id="{4263945F-3198-5C74-D6ED-F5EEB7A3D8E7}"/>
+              </a:ext>
+            </a:extLst>
+          </p:cNvPr>
+          <p:cNvSpPr>
+            <a:spLocks noGrp="1"/>
+          </p:cNvSpPr>
+          <p:nvPr>
+            <p:ph type="title"/>
+          </p:nvPr>
+        </p:nvSpPr>
+        <p:spPr/>
+        <p:txBody>
+          <a:bodyPr/>
+          <a:lstStyle/>
+          <a:p>
+            <a:r>
+              <a:rPr lang="en-US" dirty="0"/>
+              <a:t>Projects</a:t>
+            </a:r>
+          </a:p>
+        </p:txBody>
+      </p:sp>
+      <p:pic>
+        <p:nvPicPr>
+          <p:cNvPr id="5" name="Content Placeholder 4">
+            <a:extLst>
+              <a:ext uri="{FF2B5EF4-FFF2-40B4-BE49-F238E27FC236}">
+                <a16:creationId xmlns:a16="http://schemas.microsoft.com/office/drawing/2014/main" id="{88CE9286-4AF0-1D39-2B9C-EF76A29453A8}"/>
+              </a:ext>
+            </a:extLst>
+          </p:cNvPr>
+          <p:cNvPicPr>
+            <a:picLocks noGrp="1" noChangeAspect="1"/>
+          </p:cNvPicPr>
+          <p:nvPr>
+            <p:ph idx="1"/>
+          </p:nvPr>
+        </p:nvPicPr>
+        <p:blipFill>
+          <a:blip r:embed="rId2"/>
+          <a:stretch>
+            <a:fillRect/>
+          </a:stretch>
+        </p:blipFill>
+        <p:spPr>
+          <a:xfrm>
+            <a:off x="1141413" y="2231723"/>
+            <a:ext cx="3831640" cy="3945555"/>
+          </a:xfrm>
+        </p:spPr>
+      </p:pic>
+      <p:pic>
+        <p:nvPicPr>
+          <p:cNvPr id="7" name="Picture 6">
+            <a:extLst>
+              <a:ext uri="{FF2B5EF4-FFF2-40B4-BE49-F238E27FC236}">
+                <a16:creationId xmlns:a16="http://schemas.microsoft.com/office/drawing/2014/main" id="{56764281-CEB5-3326-4B8D-CB597015DFBA}"/>
+              </a:ext>
+            </a:extLst>
+          </p:cNvPr>
+          <p:cNvPicPr>
+            <a:picLocks noChangeAspect="1"/>
+          </p:cNvPicPr>
+          <p:nvPr/>
+        </p:nvPicPr>
+        <p:blipFill>
+          <a:blip r:embed="rId3"/>
+          <a:stretch>
+            <a:fillRect/>
+          </a:stretch>
+        </p:blipFill>
+        <p:spPr>
+          <a:xfrm>
+            <a:off x="4973052" y="2231723"/>
+            <a:ext cx="4084343" cy="3945555"/>
+          </a:xfrm>
+          <a:prstGeom prst="rect">
+            <a:avLst/>
+          </a:prstGeom>
+        </p:spPr>
+      </p:pic>
+      <p:sp>
+        <p:nvSpPr>
+          <p:cNvPr id="3" name="TextBox 2">
+            <a:extLst>
+              <a:ext uri="{FF2B5EF4-FFF2-40B4-BE49-F238E27FC236}">
+                <a16:creationId xmlns:a16="http://schemas.microsoft.com/office/drawing/2014/main" id="{59AF13F9-C246-FA34-DD3F-CE01B31B10BA}"/>
+              </a:ext>
+            </a:extLst>
+          </p:cNvPr>
+          <p:cNvSpPr txBox="1"/>
+          <p:nvPr/>
+        </p:nvSpPr>
+        <p:spPr>
+          <a:xfrm>
+            <a:off x="1258529" y="1769806"/>
+            <a:ext cx="7931787" cy="369332"/>
+          </a:xfrm>
+          <a:prstGeom prst="rect">
+            <a:avLst/>
+          </a:prstGeom>
+          <a:noFill/>
+        </p:spPr>
+        <p:txBody>
+          <a:bodyPr wrap="none" rtlCol="0">
+            <a:spAutoFit/>
+          </a:bodyPr>
+          <a:lstStyle/>
+          <a:p>
+            <a:r>
+              <a:rPr lang="en-US" dirty="0"/>
+              <a:t>Tracks development efforts. All Issues and Pull Requests shall be assigned to a Project</a:t>
+            </a:r>
+          </a:p>
+        </p:txBody>
+      </p:sp>
+    </p:spTree>
+    <p:extLst>
+      <p:ext uri="{BB962C8B-B14F-4D97-AF65-F5344CB8AC3E}">
+        <p14:creationId xmlns:p14="http://schemas.microsoft.com/office/powerpoint/2010/main" val="396251604"/>
+      </p:ext>
+    </p:extLst>
+  </p:cSld>
+  <p:clrMapOvr>
+    <a:masterClrMapping/>
+  </p:clrMapOvr>
+</p:sld>
+</file>
+
+<file path=ppt/slides/slide4.xml><?xml version="1.0" encoding="utf-8"?>
+<p:sld xmlns:a="http://schemas.openxmlformats.org/drawingml/2006/main" xmlns:r="http://schemas.openxmlformats.org/officeDocument/2006/relationships" xmlns:p="http://schemas.openxmlformats.org/presentationml/2006/main">
+  <p:cSld>
+    <p:spTree>
+      <p:nvGrpSpPr>
+        <p:cNvPr id="1" name=""/>
+        <p:cNvGrpSpPr/>
+        <p:nvPr/>
+      </p:nvGrpSpPr>
+      <p:grpSpPr>
+        <a:xfrm>
+          <a:off x="0" y="0"/>
+          <a:ext cx="0" cy="0"/>
+          <a:chOff x="0" y="0"/>
+          <a:chExt cx="0" cy="0"/>
+        </a:xfrm>
+      </p:grpSpPr>
+      <p:sp>
+        <p:nvSpPr>
+          <p:cNvPr id="2" name="Title 1">
+            <a:extLst>
+              <a:ext uri="{FF2B5EF4-FFF2-40B4-BE49-F238E27FC236}">
+                <a16:creationId xmlns:a16="http://schemas.microsoft.com/office/drawing/2014/main" id="{11B1F766-2509-E54E-274A-981E50E2BADF}"/>
+              </a:ext>
+            </a:extLst>
+          </p:cNvPr>
+          <p:cNvSpPr>
+            <a:spLocks noGrp="1"/>
+          </p:cNvSpPr>
+          <p:nvPr>
+            <p:ph type="title"/>
+          </p:nvPr>
+        </p:nvSpPr>
+        <p:spPr/>
+        <p:txBody>
+          <a:bodyPr/>
+          <a:lstStyle/>
+          <a:p>
+            <a:r>
+              <a:rPr lang="en-US" dirty="0"/>
+              <a:t>Repository</a:t>
+            </a:r>
+          </a:p>
+        </p:txBody>
+      </p:sp>
+      <p:sp>
+        <p:nvSpPr>
+          <p:cNvPr id="3" name="Content Placeholder 2">
+            <a:extLst>
+              <a:ext uri="{FF2B5EF4-FFF2-40B4-BE49-F238E27FC236}">
+                <a16:creationId xmlns:a16="http://schemas.microsoft.com/office/drawing/2014/main" id="{5D2AA86D-35B9-3C64-6AA8-2F0836C7DCE7}"/>
               </a:ext>
             </a:extLst>
           </p:cNvPr>
@@ -12830,79 +14606,52 @@
           <a:p>
             <a:r>
               <a:rPr lang="en-US" dirty="0"/>
-              <a:t>Delete the files within and keep the  main folders</a:t>
+              <a:t>Only the  DEV_ repo’s shall have Issues associated. </a:t>
             </a:r>
           </a:p>
           <a:p>
             <a:r>
               <a:rPr lang="en-US" dirty="0"/>
-              <a:t>From VS7ZARBC call a git bash here</a:t>
-            </a:r>
+              <a:t>No development shall be done directly on the </a:t>
+            </a:r>
+            <a:r>
+              <a:rPr lang="en-US" dirty="0" err="1"/>
+              <a:t>BreaultSWD</a:t>
+            </a:r>
+            <a:r>
+              <a:rPr lang="en-US" dirty="0"/>
+              <a:t> repo’s</a:t>
+            </a:r>
+          </a:p>
+          <a:p>
+            <a:r>
+              <a:rPr lang="en-US" dirty="0"/>
+              <a:t>All development shall be on forks</a:t>
+            </a:r>
+          </a:p>
+          <a:p>
+            <a:r>
+              <a:rPr lang="en-US" dirty="0"/>
+              <a:t>All test cases shall be in associated </a:t>
+            </a:r>
+            <a:r>
+              <a:rPr lang="en-US" dirty="0" err="1"/>
+              <a:t>Test_Repo</a:t>
+            </a:r>
+            <a:endParaRPr lang="en-US" dirty="0"/>
+          </a:p>
+          <a:p>
+            <a:pPr marL="0" indent="0">
+              <a:buNone/>
+            </a:pPr>
+            <a:endParaRPr lang="en-US" dirty="0"/>
           </a:p>
         </p:txBody>
       </p:sp>
-      <p:pic>
-        <p:nvPicPr>
-          <p:cNvPr id="5" name="Picture 4">
-            <a:extLst>
-              <a:ext uri="{FF2B5EF4-FFF2-40B4-BE49-F238E27FC236}">
-                <a16:creationId xmlns:a16="http://schemas.microsoft.com/office/drawing/2014/main" id="{C175FC0D-A2F9-9DE7-8436-033C31F01F93}"/>
-              </a:ext>
-            </a:extLst>
-          </p:cNvPr>
-          <p:cNvPicPr>
-            <a:picLocks noChangeAspect="1"/>
-          </p:cNvPicPr>
-          <p:nvPr/>
-        </p:nvPicPr>
-        <p:blipFill>
-          <a:blip r:embed="rId2"/>
-          <a:srcRect l="6692"/>
-          <a:stretch/>
-        </p:blipFill>
-        <p:spPr>
-          <a:xfrm>
-            <a:off x="7555832" y="2097088"/>
-            <a:ext cx="4636168" cy="1996613"/>
-          </a:xfrm>
-          <a:prstGeom prst="rect">
-            <a:avLst/>
-          </a:prstGeom>
-        </p:spPr>
-      </p:pic>
-      <p:pic>
-        <p:nvPicPr>
-          <p:cNvPr id="7" name="Picture 6">
-            <a:extLst>
-              <a:ext uri="{FF2B5EF4-FFF2-40B4-BE49-F238E27FC236}">
-                <a16:creationId xmlns:a16="http://schemas.microsoft.com/office/drawing/2014/main" id="{78D65101-9341-7C7A-31D7-C3B092D33495}"/>
-              </a:ext>
-            </a:extLst>
-          </p:cNvPr>
-          <p:cNvPicPr>
-            <a:picLocks noChangeAspect="1"/>
-          </p:cNvPicPr>
-          <p:nvPr/>
-        </p:nvPicPr>
-        <p:blipFill>
-          <a:blip r:embed="rId3"/>
-          <a:srcRect b="36573"/>
-          <a:stretch/>
-        </p:blipFill>
-        <p:spPr>
-          <a:xfrm>
-            <a:off x="718014" y="3344955"/>
-            <a:ext cx="6264183" cy="3296477"/>
-          </a:xfrm>
-          <a:prstGeom prst="rect">
-            <a:avLst/>
-          </a:prstGeom>
-        </p:spPr>
-      </p:pic>
     </p:spTree>
     <p:extLst>
       <p:ext uri="{BB962C8B-B14F-4D97-AF65-F5344CB8AC3E}">
-        <p14:creationId xmlns:p14="http://schemas.microsoft.com/office/powerpoint/2010/main" val="2374872806"/>
+        <p14:creationId xmlns:p14="http://schemas.microsoft.com/office/powerpoint/2010/main" val="1863103280"/>
       </p:ext>
     </p:extLst>
   </p:cSld>
@@ -12912,7 +14661,519 @@
 </p:sld>
 </file>
 
-<file path=ppt/slides/slide13.xml><?xml version="1.0" encoding="utf-8"?>
+<file path=ppt/slides/slide5.xml><?xml version="1.0" encoding="utf-8"?>
+<p:sld xmlns:a="http://schemas.openxmlformats.org/drawingml/2006/main" xmlns:r="http://schemas.openxmlformats.org/officeDocument/2006/relationships" xmlns:p="http://schemas.openxmlformats.org/presentationml/2006/main">
+  <p:cSld>
+    <p:spTree>
+      <p:nvGrpSpPr>
+        <p:cNvPr id="1" name=""/>
+        <p:cNvGrpSpPr/>
+        <p:nvPr/>
+      </p:nvGrpSpPr>
+      <p:grpSpPr>
+        <a:xfrm>
+          <a:off x="0" y="0"/>
+          <a:ext cx="0" cy="0"/>
+          <a:chOff x="0" y="0"/>
+          <a:chExt cx="0" cy="0"/>
+        </a:xfrm>
+      </p:grpSpPr>
+      <p:sp>
+        <p:nvSpPr>
+          <p:cNvPr id="2" name="Title 1">
+            <a:extLst>
+              <a:ext uri="{FF2B5EF4-FFF2-40B4-BE49-F238E27FC236}">
+                <a16:creationId xmlns:a16="http://schemas.microsoft.com/office/drawing/2014/main" id="{3214BDEF-35E5-7F7B-D581-5A2A96C5A6C4}"/>
+              </a:ext>
+            </a:extLst>
+          </p:cNvPr>
+          <p:cNvSpPr>
+            <a:spLocks noGrp="1"/>
+          </p:cNvSpPr>
+          <p:nvPr>
+            <p:ph type="title"/>
+          </p:nvPr>
+        </p:nvSpPr>
+        <p:spPr/>
+        <p:txBody>
+          <a:bodyPr/>
+          <a:lstStyle/>
+          <a:p>
+            <a:r>
+              <a:rPr lang="en-US" dirty="0"/>
+              <a:t>Creating a new fork</a:t>
+            </a:r>
+          </a:p>
+        </p:txBody>
+      </p:sp>
+      <p:pic>
+        <p:nvPicPr>
+          <p:cNvPr id="4" name="Content Placeholder 3" descr="A screenshot of a computer&#10;&#10;Description automatically generated">
+            <a:extLst>
+              <a:ext uri="{FF2B5EF4-FFF2-40B4-BE49-F238E27FC236}">
+                <a16:creationId xmlns:a16="http://schemas.microsoft.com/office/drawing/2014/main" id="{95B761B1-FE14-82FA-1C4D-C5C9AAB85C93}"/>
+              </a:ext>
+            </a:extLst>
+          </p:cNvPr>
+          <p:cNvPicPr>
+            <a:picLocks noGrp="1" noChangeAspect="1"/>
+          </p:cNvPicPr>
+          <p:nvPr>
+            <p:ph idx="1"/>
+          </p:nvPr>
+        </p:nvPicPr>
+        <p:blipFill rotWithShape="1">
+          <a:blip r:embed="rId2">
+            <a:extLst>
+              <a:ext uri="{28A0092B-C50C-407E-A947-70E740481C1C}">
+                <a14:useLocalDpi xmlns:a14="http://schemas.microsoft.com/office/drawing/2010/main" val="0"/>
+              </a:ext>
+            </a:extLst>
+          </a:blip>
+          <a:srcRect t="3973" r="7436" b="3311"/>
+          <a:stretch/>
+        </p:blipFill>
+        <p:spPr bwMode="auto">
+          <a:xfrm>
+            <a:off x="608961" y="1701416"/>
+            <a:ext cx="7407314" cy="5027444"/>
+          </a:xfrm>
+          <a:prstGeom prst="rect">
+            <a:avLst/>
+          </a:prstGeom>
+          <a:ln>
+            <a:noFill/>
+          </a:ln>
+          <a:extLst>
+            <a:ext uri="{53640926-AAD7-44D8-BBD7-CCE9431645EC}">
+              <a14:shadowObscured xmlns:a14="http://schemas.microsoft.com/office/drawing/2010/main"/>
+            </a:ext>
+          </a:extLst>
+        </p:spPr>
+      </p:pic>
+      <p:pic>
+        <p:nvPicPr>
+          <p:cNvPr id="5" name="Picture 4" descr="A screenshot of a computer&#10;&#10;Description automatically generated">
+            <a:extLst>
+              <a:ext uri="{FF2B5EF4-FFF2-40B4-BE49-F238E27FC236}">
+                <a16:creationId xmlns:a16="http://schemas.microsoft.com/office/drawing/2014/main" id="{92DB6C5C-3533-FD89-C508-2AB84CAD1B8F}"/>
+              </a:ext>
+            </a:extLst>
+          </p:cNvPr>
+          <p:cNvPicPr>
+            <a:picLocks noChangeAspect="1"/>
+          </p:cNvPicPr>
+          <p:nvPr/>
+        </p:nvPicPr>
+        <p:blipFill rotWithShape="1">
+          <a:blip r:embed="rId3">
+            <a:extLst>
+              <a:ext uri="{28A0092B-C50C-407E-A947-70E740481C1C}">
+                <a14:useLocalDpi xmlns:a14="http://schemas.microsoft.com/office/drawing/2010/main" val="0"/>
+              </a:ext>
+            </a:extLst>
+          </a:blip>
+          <a:srcRect t="17984"/>
+          <a:stretch/>
+        </p:blipFill>
+        <p:spPr bwMode="auto">
+          <a:xfrm>
+            <a:off x="6347894" y="861946"/>
+            <a:ext cx="4212590" cy="839470"/>
+          </a:xfrm>
+          <a:prstGeom prst="rect">
+            <a:avLst/>
+          </a:prstGeom>
+          <a:ln>
+            <a:noFill/>
+          </a:ln>
+          <a:extLst>
+            <a:ext uri="{53640926-AAD7-44D8-BBD7-CCE9431645EC}">
+              <a14:shadowObscured xmlns:a14="http://schemas.microsoft.com/office/drawing/2010/main"/>
+            </a:ext>
+          </a:extLst>
+        </p:spPr>
+      </p:pic>
+      <p:sp>
+        <p:nvSpPr>
+          <p:cNvPr id="3" name="TextBox 2">
+            <a:extLst>
+              <a:ext uri="{FF2B5EF4-FFF2-40B4-BE49-F238E27FC236}">
+                <a16:creationId xmlns:a16="http://schemas.microsoft.com/office/drawing/2014/main" id="{2E9DCE94-8F49-DA24-B3AC-F2407DAE9F30}"/>
+              </a:ext>
+            </a:extLst>
+          </p:cNvPr>
+          <p:cNvSpPr txBox="1"/>
+          <p:nvPr/>
+        </p:nvSpPr>
+        <p:spPr>
+          <a:xfrm>
+            <a:off x="8327923" y="2330245"/>
+            <a:ext cx="3825021" cy="3693319"/>
+          </a:xfrm>
+          <a:prstGeom prst="rect">
+            <a:avLst/>
+          </a:prstGeom>
+          <a:noFill/>
+        </p:spPr>
+        <p:txBody>
+          <a:bodyPr wrap="none" rtlCol="0">
+            <a:spAutoFit/>
+          </a:bodyPr>
+          <a:lstStyle/>
+          <a:p>
+            <a:r>
+              <a:rPr lang="en-US" dirty="0"/>
+              <a:t>Select fork in the given repo</a:t>
+            </a:r>
+          </a:p>
+          <a:p>
+            <a:endParaRPr lang="en-US" dirty="0"/>
+          </a:p>
+          <a:p>
+            <a:r>
+              <a:rPr lang="en-US" dirty="0"/>
+              <a:t>De-select Copy the branch only</a:t>
+            </a:r>
+          </a:p>
+          <a:p>
+            <a:endParaRPr lang="en-US" dirty="0"/>
+          </a:p>
+          <a:p>
+            <a:r>
+              <a:rPr lang="en-US" dirty="0"/>
+              <a:t>Create fork</a:t>
+            </a:r>
+          </a:p>
+          <a:p>
+            <a:endParaRPr lang="en-US" dirty="0"/>
+          </a:p>
+          <a:p>
+            <a:r>
+              <a:rPr lang="en-US" dirty="0"/>
+              <a:t>NOTE: if the fork or the repo does not</a:t>
+            </a:r>
+          </a:p>
+          <a:p>
+            <a:r>
+              <a:rPr lang="en-US" dirty="0"/>
+              <a:t>Have a DEV_ branch before the branch</a:t>
+            </a:r>
+          </a:p>
+          <a:p>
+            <a:r>
+              <a:rPr lang="en-US" dirty="0"/>
+              <a:t>Is created. This can be done after</a:t>
+            </a:r>
+          </a:p>
+          <a:p>
+            <a:endParaRPr lang="en-US" dirty="0"/>
+          </a:p>
+          <a:p>
+            <a:r>
+              <a:rPr lang="en-US" dirty="0"/>
+              <a:t>If the developer has an existing fork</a:t>
+            </a:r>
+          </a:p>
+          <a:p>
+            <a:r>
+              <a:rPr lang="en-US" dirty="0"/>
+              <a:t>Creating a branch and syncing can be</a:t>
+            </a:r>
+          </a:p>
+          <a:p>
+            <a:r>
+              <a:rPr lang="en-US" dirty="0"/>
+              <a:t>Done.</a:t>
+            </a:r>
+          </a:p>
+        </p:txBody>
+      </p:sp>
+    </p:spTree>
+    <p:extLst>
+      <p:ext uri="{BB962C8B-B14F-4D97-AF65-F5344CB8AC3E}">
+        <p14:creationId xmlns:p14="http://schemas.microsoft.com/office/powerpoint/2010/main" val="1090958267"/>
+      </p:ext>
+    </p:extLst>
+  </p:cSld>
+  <p:clrMapOvr>
+    <a:masterClrMapping/>
+  </p:clrMapOvr>
+</p:sld>
+</file>
+
+<file path=ppt/slides/slide6.xml><?xml version="1.0" encoding="utf-8"?>
+<p:sld xmlns:a="http://schemas.openxmlformats.org/drawingml/2006/main" xmlns:r="http://schemas.openxmlformats.org/officeDocument/2006/relationships" xmlns:p="http://schemas.openxmlformats.org/presentationml/2006/main">
+  <p:cSld>
+    <p:spTree>
+      <p:nvGrpSpPr>
+        <p:cNvPr id="1" name=""/>
+        <p:cNvGrpSpPr/>
+        <p:nvPr/>
+      </p:nvGrpSpPr>
+      <p:grpSpPr>
+        <a:xfrm>
+          <a:off x="0" y="0"/>
+          <a:ext cx="0" cy="0"/>
+          <a:chOff x="0" y="0"/>
+          <a:chExt cx="0" cy="0"/>
+        </a:xfrm>
+      </p:grpSpPr>
+      <p:sp>
+        <p:nvSpPr>
+          <p:cNvPr id="2" name="Title 1">
+            <a:extLst>
+              <a:ext uri="{FF2B5EF4-FFF2-40B4-BE49-F238E27FC236}">
+                <a16:creationId xmlns:a16="http://schemas.microsoft.com/office/drawing/2014/main" id="{92C58C41-C61A-7763-BB10-006C092DFCC3}"/>
+              </a:ext>
+            </a:extLst>
+          </p:cNvPr>
+          <p:cNvSpPr>
+            <a:spLocks noGrp="1"/>
+          </p:cNvSpPr>
+          <p:nvPr>
+            <p:ph type="title"/>
+          </p:nvPr>
+        </p:nvSpPr>
+        <p:spPr/>
+        <p:txBody>
+          <a:bodyPr/>
+          <a:lstStyle/>
+          <a:p>
+            <a:r>
+              <a:rPr lang="en-US" dirty="0"/>
+              <a:t>Issues</a:t>
+            </a:r>
+          </a:p>
+        </p:txBody>
+      </p:sp>
+      <p:sp>
+        <p:nvSpPr>
+          <p:cNvPr id="3" name="Content Placeholder 2">
+            <a:extLst>
+              <a:ext uri="{FF2B5EF4-FFF2-40B4-BE49-F238E27FC236}">
+                <a16:creationId xmlns:a16="http://schemas.microsoft.com/office/drawing/2014/main" id="{4D901822-48EA-73DB-BCCA-0C20DB06CC14}"/>
+              </a:ext>
+            </a:extLst>
+          </p:cNvPr>
+          <p:cNvSpPr>
+            <a:spLocks noGrp="1"/>
+          </p:cNvSpPr>
+          <p:nvPr>
+            <p:ph idx="1"/>
+          </p:nvPr>
+        </p:nvSpPr>
+        <p:spPr/>
+        <p:txBody>
+          <a:bodyPr/>
+          <a:lstStyle/>
+          <a:p>
+            <a:r>
+              <a:rPr lang="en-US" dirty="0"/>
+              <a:t>Shall be from the back-log &gt; moved to Current Development</a:t>
+            </a:r>
+          </a:p>
+          <a:p>
+            <a:r>
+              <a:rPr lang="en-US" dirty="0"/>
+              <a:t>Shall be associated to a DEV_ project</a:t>
+            </a:r>
+          </a:p>
+          <a:p>
+            <a:r>
+              <a:rPr lang="en-US" dirty="0"/>
+              <a:t>Shall be created on a DEV_ branch</a:t>
+            </a:r>
+          </a:p>
+          <a:p>
+            <a:r>
+              <a:rPr lang="en-US" dirty="0"/>
+              <a:t>Developer shall not close out issue without review</a:t>
+            </a:r>
+          </a:p>
+          <a:p>
+            <a:r>
+              <a:rPr lang="en-US" dirty="0"/>
+              <a:t>The reviewer shall close out the issue</a:t>
+            </a:r>
+          </a:p>
+          <a:p>
+            <a:r>
+              <a:rPr lang="en-US" dirty="0"/>
+              <a:t>Development shall be linked with a pull-request</a:t>
+            </a:r>
+          </a:p>
+        </p:txBody>
+      </p:sp>
+    </p:spTree>
+    <p:extLst>
+      <p:ext uri="{BB962C8B-B14F-4D97-AF65-F5344CB8AC3E}">
+        <p14:creationId xmlns:p14="http://schemas.microsoft.com/office/powerpoint/2010/main" val="882162805"/>
+      </p:ext>
+    </p:extLst>
+  </p:cSld>
+  <p:clrMapOvr>
+    <a:masterClrMapping/>
+  </p:clrMapOvr>
+</p:sld>
+</file>
+
+<file path=ppt/slides/slide7.xml><?xml version="1.0" encoding="utf-8"?>
+<p:sld xmlns:a="http://schemas.openxmlformats.org/drawingml/2006/main" xmlns:r="http://schemas.openxmlformats.org/officeDocument/2006/relationships" xmlns:p="http://schemas.openxmlformats.org/presentationml/2006/main">
+  <p:cSld>
+    <p:spTree>
+      <p:nvGrpSpPr>
+        <p:cNvPr id="1" name=""/>
+        <p:cNvGrpSpPr/>
+        <p:nvPr/>
+      </p:nvGrpSpPr>
+      <p:grpSpPr>
+        <a:xfrm>
+          <a:off x="0" y="0"/>
+          <a:ext cx="0" cy="0"/>
+          <a:chOff x="0" y="0"/>
+          <a:chExt cx="0" cy="0"/>
+        </a:xfrm>
+      </p:grpSpPr>
+      <p:sp>
+        <p:nvSpPr>
+          <p:cNvPr id="2" name="Title 1">
+            <a:extLst>
+              <a:ext uri="{FF2B5EF4-FFF2-40B4-BE49-F238E27FC236}">
+                <a16:creationId xmlns:a16="http://schemas.microsoft.com/office/drawing/2014/main" id="{92717FEA-3CDA-872C-1F54-E792FE648AB0}"/>
+              </a:ext>
+            </a:extLst>
+          </p:cNvPr>
+          <p:cNvSpPr>
+            <a:spLocks noGrp="1"/>
+          </p:cNvSpPr>
+          <p:nvPr>
+            <p:ph type="title"/>
+          </p:nvPr>
+        </p:nvSpPr>
+        <p:spPr>
+          <a:xfrm>
+            <a:off x="1259987" y="110767"/>
+            <a:ext cx="9905998" cy="1015502"/>
+          </a:xfrm>
+        </p:spPr>
+        <p:txBody>
+          <a:bodyPr/>
+          <a:lstStyle/>
+          <a:p>
+            <a:r>
+              <a:rPr lang="en-US" dirty="0"/>
+              <a:t>Issues</a:t>
+            </a:r>
+          </a:p>
+        </p:txBody>
+      </p:sp>
+      <p:pic>
+        <p:nvPicPr>
+          <p:cNvPr id="4" name="Content Placeholder 3" descr="A screenshot of a computer&#10;&#10;Description automatically generated">
+            <a:extLst>
+              <a:ext uri="{FF2B5EF4-FFF2-40B4-BE49-F238E27FC236}">
+                <a16:creationId xmlns:a16="http://schemas.microsoft.com/office/drawing/2014/main" id="{97209A42-D360-EF95-B3DC-FE9A1B9D0077}"/>
+              </a:ext>
+            </a:extLst>
+          </p:cNvPr>
+          <p:cNvPicPr>
+            <a:picLocks noGrp="1" noChangeAspect="1"/>
+          </p:cNvPicPr>
+          <p:nvPr>
+            <p:ph idx="1"/>
+          </p:nvPr>
+        </p:nvPicPr>
+        <p:blipFill rotWithShape="1">
+          <a:blip r:embed="rId2" cstate="print">
+            <a:extLst>
+              <a:ext uri="{28A0092B-C50C-407E-A947-70E740481C1C}">
+                <a14:useLocalDpi xmlns:a14="http://schemas.microsoft.com/office/drawing/2010/main" val="0"/>
+              </a:ext>
+            </a:extLst>
+          </a:blip>
+          <a:srcRect l="2563" t="-274" r="128" b="274"/>
+          <a:stretch/>
+        </p:blipFill>
+        <p:spPr bwMode="auto">
+          <a:xfrm>
+            <a:off x="1259987" y="901060"/>
+            <a:ext cx="9518870" cy="4581338"/>
+          </a:xfrm>
+          <a:prstGeom prst="rect">
+            <a:avLst/>
+          </a:prstGeom>
+          <a:ln>
+            <a:noFill/>
+          </a:ln>
+          <a:extLst>
+            <a:ext uri="{53640926-AAD7-44D8-BBD7-CCE9431645EC}">
+              <a14:shadowObscured xmlns:a14="http://schemas.microsoft.com/office/drawing/2010/main"/>
+            </a:ext>
+          </a:extLst>
+        </p:spPr>
+      </p:pic>
+      <p:sp>
+        <p:nvSpPr>
+          <p:cNvPr id="3" name="TextBox 2">
+            <a:extLst>
+              <a:ext uri="{FF2B5EF4-FFF2-40B4-BE49-F238E27FC236}">
+                <a16:creationId xmlns:a16="http://schemas.microsoft.com/office/drawing/2014/main" id="{32F3B414-99DC-2EDD-1DEE-B9FFF5C86248}"/>
+              </a:ext>
+            </a:extLst>
+          </p:cNvPr>
+          <p:cNvSpPr txBox="1"/>
+          <p:nvPr/>
+        </p:nvSpPr>
+        <p:spPr>
+          <a:xfrm>
+            <a:off x="1259987" y="5722374"/>
+            <a:ext cx="10362132" cy="923330"/>
+          </a:xfrm>
+          <a:prstGeom prst="rect">
+            <a:avLst/>
+          </a:prstGeom>
+          <a:noFill/>
+        </p:spPr>
+        <p:txBody>
+          <a:bodyPr wrap="none" rtlCol="0">
+            <a:spAutoFit/>
+          </a:bodyPr>
+          <a:lstStyle/>
+          <a:p>
+            <a:r>
+              <a:rPr lang="en-US" dirty="0"/>
+              <a:t>Most Issues are created as a draft in the Back-log. If the Issue is assigned to a DEV_ repo then it gets assigned.</a:t>
+            </a:r>
+          </a:p>
+          <a:p>
+            <a:r>
+              <a:rPr lang="en-US" dirty="0"/>
+              <a:t>A Label is not required. Project is required to be assigned. Should have Back-log if from a draft.</a:t>
+            </a:r>
+          </a:p>
+          <a:p>
+            <a:r>
+              <a:rPr lang="en-US" dirty="0"/>
+              <a:t>Description has all required information before the Issue has been researched.</a:t>
+            </a:r>
+          </a:p>
+        </p:txBody>
+      </p:sp>
+    </p:spTree>
+    <p:extLst>
+      <p:ext uri="{BB962C8B-B14F-4D97-AF65-F5344CB8AC3E}">
+        <p14:creationId xmlns:p14="http://schemas.microsoft.com/office/powerpoint/2010/main" val="944698361"/>
+      </p:ext>
+    </p:extLst>
+  </p:cSld>
+  <p:clrMapOvr>
+    <a:masterClrMapping/>
+  </p:clrMapOvr>
+</p:sld>
+</file>
+
+<file path=ppt/slides/slide8.xml><?xml version="1.0" encoding="utf-8"?>
 <p:sld xmlns:a="http://schemas.openxmlformats.org/drawingml/2006/main" xmlns:r="http://schemas.openxmlformats.org/officeDocument/2006/relationships" xmlns:p="http://schemas.openxmlformats.org/presentationml/2006/main">
   <p:cSld>
     <p:spTree>
@@ -12952,7 +15213,7 @@
           <a:p>
             <a:r>
               <a:rPr lang="en-US" dirty="0"/>
-              <a:t>Bash scripts to call for every dev</a:t>
+              <a:t>Obtaining the codebase bash files</a:t>
             </a:r>
           </a:p>
         </p:txBody>
@@ -13091,7 +15352,7 @@
         <p:spPr>
           <a:xfrm>
             <a:off x="1572126" y="4780547"/>
-            <a:ext cx="3350148" cy="646331"/>
+            <a:ext cx="7727180" cy="1200329"/>
           </a:xfrm>
           <a:prstGeom prst="rect">
             <a:avLst/>
@@ -13131,853 +15392,29 @@
               <a:t> &lt;DEV_ branch&gt;</a:t>
             </a:r>
           </a:p>
+          <a:p>
+            <a:endParaRPr lang="en-US" dirty="0"/>
+          </a:p>
+          <a:p>
+            <a:r>
+              <a:rPr lang="en-US" dirty="0"/>
+              <a:t>NOTE: this pulls from </a:t>
+            </a:r>
+            <a:r>
+              <a:rPr lang="en-US" dirty="0" err="1"/>
+              <a:t>BreaultSWD</a:t>
+            </a:r>
+            <a:r>
+              <a:rPr lang="en-US" dirty="0"/>
+              <a:t> and does not create a link to upload to GITHUB.</a:t>
+            </a:r>
+          </a:p>
         </p:txBody>
       </p:sp>
     </p:spTree>
     <p:extLst>
       <p:ext uri="{BB962C8B-B14F-4D97-AF65-F5344CB8AC3E}">
         <p14:creationId xmlns:p14="http://schemas.microsoft.com/office/powerpoint/2010/main" val="3808483206"/>
-      </p:ext>
-    </p:extLst>
-  </p:cSld>
-  <p:clrMapOvr>
-    <a:masterClrMapping/>
-  </p:clrMapOvr>
-</p:sld>
-</file>
-
-<file path=ppt/slides/slide2.xml><?xml version="1.0" encoding="utf-8"?>
-<p:sld xmlns:a="http://schemas.openxmlformats.org/drawingml/2006/main" xmlns:r="http://schemas.openxmlformats.org/officeDocument/2006/relationships" xmlns:p="http://schemas.openxmlformats.org/presentationml/2006/main">
-  <p:cSld>
-    <p:spTree>
-      <p:nvGrpSpPr>
-        <p:cNvPr id="1" name=""/>
-        <p:cNvGrpSpPr/>
-        <p:nvPr/>
-      </p:nvGrpSpPr>
-      <p:grpSpPr>
-        <a:xfrm>
-          <a:off x="0" y="0"/>
-          <a:ext cx="0" cy="0"/>
-          <a:chOff x="0" y="0"/>
-          <a:chExt cx="0" cy="0"/>
-        </a:xfrm>
-      </p:grpSpPr>
-      <p:sp>
-        <p:nvSpPr>
-          <p:cNvPr id="2" name="Title 1">
-            <a:extLst>
-              <a:ext uri="{FF2B5EF4-FFF2-40B4-BE49-F238E27FC236}">
-                <a16:creationId xmlns:a16="http://schemas.microsoft.com/office/drawing/2014/main" id="{B68E33C1-B991-97CB-A66A-3AE78583F4C2}"/>
-              </a:ext>
-            </a:extLst>
-          </p:cNvPr>
-          <p:cNvSpPr>
-            <a:spLocks noGrp="1"/>
-          </p:cNvSpPr>
-          <p:nvPr>
-            <p:ph type="title"/>
-          </p:nvPr>
-        </p:nvSpPr>
-        <p:spPr/>
-        <p:txBody>
-          <a:bodyPr/>
-          <a:lstStyle/>
-          <a:p>
-            <a:r>
-              <a:rPr lang="en-US" dirty="0" err="1"/>
-              <a:t>Github</a:t>
-            </a:r>
-            <a:r>
-              <a:rPr lang="en-US" dirty="0"/>
-              <a:t> navigation</a:t>
-            </a:r>
-          </a:p>
-        </p:txBody>
-      </p:sp>
-      <p:pic>
-        <p:nvPicPr>
-          <p:cNvPr id="4" name="Content Placeholder 3">
-            <a:extLst>
-              <a:ext uri="{FF2B5EF4-FFF2-40B4-BE49-F238E27FC236}">
-                <a16:creationId xmlns:a16="http://schemas.microsoft.com/office/drawing/2014/main" id="{9191007C-E76D-6777-BE9E-06616EAB48D0}"/>
-              </a:ext>
-            </a:extLst>
-          </p:cNvPr>
-          <p:cNvPicPr>
-            <a:picLocks noGrp="1" noChangeAspect="1"/>
-          </p:cNvPicPr>
-          <p:nvPr>
-            <p:ph idx="1"/>
-          </p:nvPr>
-        </p:nvPicPr>
-        <p:blipFill>
-          <a:blip r:embed="rId2"/>
-          <a:stretch>
-            <a:fillRect/>
-          </a:stretch>
-        </p:blipFill>
-        <p:spPr>
-          <a:xfrm>
-            <a:off x="295517" y="2097088"/>
-            <a:ext cx="11277630" cy="662154"/>
-          </a:xfrm>
-          <a:prstGeom prst="rect">
-            <a:avLst/>
-          </a:prstGeom>
-        </p:spPr>
-      </p:pic>
-      <p:pic>
-        <p:nvPicPr>
-          <p:cNvPr id="5" name="Picture 4">
-            <a:extLst>
-              <a:ext uri="{FF2B5EF4-FFF2-40B4-BE49-F238E27FC236}">
-                <a16:creationId xmlns:a16="http://schemas.microsoft.com/office/drawing/2014/main" id="{DC6A8B83-75B3-8885-9ADE-2606EFCF63D5}"/>
-              </a:ext>
-            </a:extLst>
-          </p:cNvPr>
-          <p:cNvPicPr>
-            <a:picLocks noChangeAspect="1"/>
-          </p:cNvPicPr>
-          <p:nvPr/>
-        </p:nvPicPr>
-        <p:blipFill>
-          <a:blip r:embed="rId3"/>
-          <a:stretch>
-            <a:fillRect/>
-          </a:stretch>
-        </p:blipFill>
-        <p:spPr>
-          <a:xfrm>
-            <a:off x="295516" y="4237811"/>
-            <a:ext cx="11277630" cy="718105"/>
-          </a:xfrm>
-          <a:prstGeom prst="rect">
-            <a:avLst/>
-          </a:prstGeom>
-        </p:spPr>
-      </p:pic>
-      <p:sp>
-        <p:nvSpPr>
-          <p:cNvPr id="6" name="TextBox 5">
-            <a:extLst>
-              <a:ext uri="{FF2B5EF4-FFF2-40B4-BE49-F238E27FC236}">
-                <a16:creationId xmlns:a16="http://schemas.microsoft.com/office/drawing/2014/main" id="{4AC07A09-2245-E7B0-8B3C-DDC9265CB9E6}"/>
-              </a:ext>
-            </a:extLst>
-          </p:cNvPr>
-          <p:cNvSpPr txBox="1"/>
-          <p:nvPr/>
-        </p:nvSpPr>
-        <p:spPr>
-          <a:xfrm>
-            <a:off x="295516" y="2759242"/>
-            <a:ext cx="11277630" cy="369332"/>
-          </a:xfrm>
-          <a:prstGeom prst="rect">
-            <a:avLst/>
-          </a:prstGeom>
-          <a:noFill/>
-        </p:spPr>
-        <p:txBody>
-          <a:bodyPr wrap="square" rtlCol="0">
-            <a:spAutoFit/>
-          </a:bodyPr>
-          <a:lstStyle/>
-          <a:p>
-            <a:r>
-              <a:rPr lang="en-US" dirty="0"/>
-              <a:t>Briefly before we navigated through GITHUB. This serves as a refresher. </a:t>
-            </a:r>
-          </a:p>
-        </p:txBody>
-      </p:sp>
-    </p:spTree>
-    <p:extLst>
-      <p:ext uri="{BB962C8B-B14F-4D97-AF65-F5344CB8AC3E}">
-        <p14:creationId xmlns:p14="http://schemas.microsoft.com/office/powerpoint/2010/main" val="230952666"/>
-      </p:ext>
-    </p:extLst>
-  </p:cSld>
-  <p:clrMapOvr>
-    <a:masterClrMapping/>
-  </p:clrMapOvr>
-</p:sld>
-</file>
-
-<file path=ppt/slides/slide3.xml><?xml version="1.0" encoding="utf-8"?>
-<p:sld xmlns:a="http://schemas.openxmlformats.org/drawingml/2006/main" xmlns:r="http://schemas.openxmlformats.org/officeDocument/2006/relationships" xmlns:p="http://schemas.openxmlformats.org/presentationml/2006/main">
-  <p:cSld>
-    <p:spTree>
-      <p:nvGrpSpPr>
-        <p:cNvPr id="1" name=""/>
-        <p:cNvGrpSpPr/>
-        <p:nvPr/>
-      </p:nvGrpSpPr>
-      <p:grpSpPr>
-        <a:xfrm>
-          <a:off x="0" y="0"/>
-          <a:ext cx="0" cy="0"/>
-          <a:chOff x="0" y="0"/>
-          <a:chExt cx="0" cy="0"/>
-        </a:xfrm>
-      </p:grpSpPr>
-      <p:sp>
-        <p:nvSpPr>
-          <p:cNvPr id="2" name="Title 1">
-            <a:extLst>
-              <a:ext uri="{FF2B5EF4-FFF2-40B4-BE49-F238E27FC236}">
-                <a16:creationId xmlns:a16="http://schemas.microsoft.com/office/drawing/2014/main" id="{4263945F-3198-5C74-D6ED-F5EEB7A3D8E7}"/>
-              </a:ext>
-            </a:extLst>
-          </p:cNvPr>
-          <p:cNvSpPr>
-            <a:spLocks noGrp="1"/>
-          </p:cNvSpPr>
-          <p:nvPr>
-            <p:ph type="title"/>
-          </p:nvPr>
-        </p:nvSpPr>
-        <p:spPr/>
-        <p:txBody>
-          <a:bodyPr/>
-          <a:lstStyle/>
-          <a:p>
-            <a:r>
-              <a:rPr lang="en-US" dirty="0"/>
-              <a:t>Projects</a:t>
-            </a:r>
-          </a:p>
-        </p:txBody>
-      </p:sp>
-      <p:pic>
-        <p:nvPicPr>
-          <p:cNvPr id="5" name="Content Placeholder 4">
-            <a:extLst>
-              <a:ext uri="{FF2B5EF4-FFF2-40B4-BE49-F238E27FC236}">
-                <a16:creationId xmlns:a16="http://schemas.microsoft.com/office/drawing/2014/main" id="{88CE9286-4AF0-1D39-2B9C-EF76A29453A8}"/>
-              </a:ext>
-            </a:extLst>
-          </p:cNvPr>
-          <p:cNvPicPr>
-            <a:picLocks noGrp="1" noChangeAspect="1"/>
-          </p:cNvPicPr>
-          <p:nvPr>
-            <p:ph idx="1"/>
-          </p:nvPr>
-        </p:nvPicPr>
-        <p:blipFill>
-          <a:blip r:embed="rId2"/>
-          <a:stretch>
-            <a:fillRect/>
-          </a:stretch>
-        </p:blipFill>
-        <p:spPr>
-          <a:xfrm>
-            <a:off x="1141413" y="2231723"/>
-            <a:ext cx="3831640" cy="3945555"/>
-          </a:xfrm>
-        </p:spPr>
-      </p:pic>
-      <p:pic>
-        <p:nvPicPr>
-          <p:cNvPr id="7" name="Picture 6">
-            <a:extLst>
-              <a:ext uri="{FF2B5EF4-FFF2-40B4-BE49-F238E27FC236}">
-                <a16:creationId xmlns:a16="http://schemas.microsoft.com/office/drawing/2014/main" id="{56764281-CEB5-3326-4B8D-CB597015DFBA}"/>
-              </a:ext>
-            </a:extLst>
-          </p:cNvPr>
-          <p:cNvPicPr>
-            <a:picLocks noChangeAspect="1"/>
-          </p:cNvPicPr>
-          <p:nvPr/>
-        </p:nvPicPr>
-        <p:blipFill>
-          <a:blip r:embed="rId3"/>
-          <a:stretch>
-            <a:fillRect/>
-          </a:stretch>
-        </p:blipFill>
-        <p:spPr>
-          <a:xfrm>
-            <a:off x="4973052" y="2231723"/>
-            <a:ext cx="4084343" cy="3945555"/>
-          </a:xfrm>
-          <a:prstGeom prst="rect">
-            <a:avLst/>
-          </a:prstGeom>
-        </p:spPr>
-      </p:pic>
-    </p:spTree>
-    <p:extLst>
-      <p:ext uri="{BB962C8B-B14F-4D97-AF65-F5344CB8AC3E}">
-        <p14:creationId xmlns:p14="http://schemas.microsoft.com/office/powerpoint/2010/main" val="396251604"/>
-      </p:ext>
-    </p:extLst>
-  </p:cSld>
-  <p:clrMapOvr>
-    <a:masterClrMapping/>
-  </p:clrMapOvr>
-</p:sld>
-</file>
-
-<file path=ppt/slides/slide4.xml><?xml version="1.0" encoding="utf-8"?>
-<p:sld xmlns:a="http://schemas.openxmlformats.org/drawingml/2006/main" xmlns:r="http://schemas.openxmlformats.org/officeDocument/2006/relationships" xmlns:p="http://schemas.openxmlformats.org/presentationml/2006/main">
-  <p:cSld>
-    <p:spTree>
-      <p:nvGrpSpPr>
-        <p:cNvPr id="1" name=""/>
-        <p:cNvGrpSpPr/>
-        <p:nvPr/>
-      </p:nvGrpSpPr>
-      <p:grpSpPr>
-        <a:xfrm>
-          <a:off x="0" y="0"/>
-          <a:ext cx="0" cy="0"/>
-          <a:chOff x="0" y="0"/>
-          <a:chExt cx="0" cy="0"/>
-        </a:xfrm>
-      </p:grpSpPr>
-      <p:sp>
-        <p:nvSpPr>
-          <p:cNvPr id="2" name="Title 1">
-            <a:extLst>
-              <a:ext uri="{FF2B5EF4-FFF2-40B4-BE49-F238E27FC236}">
-                <a16:creationId xmlns:a16="http://schemas.microsoft.com/office/drawing/2014/main" id="{11B1F766-2509-E54E-274A-981E50E2BADF}"/>
-              </a:ext>
-            </a:extLst>
-          </p:cNvPr>
-          <p:cNvSpPr>
-            <a:spLocks noGrp="1"/>
-          </p:cNvSpPr>
-          <p:nvPr>
-            <p:ph type="title"/>
-          </p:nvPr>
-        </p:nvSpPr>
-        <p:spPr/>
-        <p:txBody>
-          <a:bodyPr/>
-          <a:lstStyle/>
-          <a:p>
-            <a:r>
-              <a:rPr lang="en-US" dirty="0"/>
-              <a:t>Repository</a:t>
-            </a:r>
-          </a:p>
-        </p:txBody>
-      </p:sp>
-      <p:sp>
-        <p:nvSpPr>
-          <p:cNvPr id="3" name="Content Placeholder 2">
-            <a:extLst>
-              <a:ext uri="{FF2B5EF4-FFF2-40B4-BE49-F238E27FC236}">
-                <a16:creationId xmlns:a16="http://schemas.microsoft.com/office/drawing/2014/main" id="{5D2AA86D-35B9-3C64-6AA8-2F0836C7DCE7}"/>
-              </a:ext>
-            </a:extLst>
-          </p:cNvPr>
-          <p:cNvSpPr>
-            <a:spLocks noGrp="1"/>
-          </p:cNvSpPr>
-          <p:nvPr>
-            <p:ph idx="1"/>
-          </p:nvPr>
-        </p:nvSpPr>
-        <p:spPr/>
-        <p:txBody>
-          <a:bodyPr/>
-          <a:lstStyle/>
-          <a:p>
-            <a:r>
-              <a:rPr lang="en-US" dirty="0"/>
-              <a:t>Only the  DEV_ repo’s shall have Issues associated. </a:t>
-            </a:r>
-          </a:p>
-          <a:p>
-            <a:r>
-              <a:rPr lang="en-US" dirty="0"/>
-              <a:t>No development shall be done directly on the </a:t>
-            </a:r>
-            <a:r>
-              <a:rPr lang="en-US" dirty="0" err="1"/>
-              <a:t>BreaultSWD</a:t>
-            </a:r>
-            <a:r>
-              <a:rPr lang="en-US" dirty="0"/>
-              <a:t> repo’s</a:t>
-            </a:r>
-          </a:p>
-          <a:p>
-            <a:r>
-              <a:rPr lang="en-US" dirty="0"/>
-              <a:t>All development shall be on forks</a:t>
-            </a:r>
-          </a:p>
-          <a:p>
-            <a:r>
-              <a:rPr lang="en-US" dirty="0"/>
-              <a:t>All test cases shall be in associated </a:t>
-            </a:r>
-            <a:r>
-              <a:rPr lang="en-US" dirty="0" err="1"/>
-              <a:t>Test_Repo</a:t>
-            </a:r>
-            <a:endParaRPr lang="en-US" dirty="0"/>
-          </a:p>
-        </p:txBody>
-      </p:sp>
-    </p:spTree>
-    <p:extLst>
-      <p:ext uri="{BB962C8B-B14F-4D97-AF65-F5344CB8AC3E}">
-        <p14:creationId xmlns:p14="http://schemas.microsoft.com/office/powerpoint/2010/main" val="1863103280"/>
-      </p:ext>
-    </p:extLst>
-  </p:cSld>
-  <p:clrMapOvr>
-    <a:masterClrMapping/>
-  </p:clrMapOvr>
-</p:sld>
-</file>
-
-<file path=ppt/slides/slide5.xml><?xml version="1.0" encoding="utf-8"?>
-<p:sld xmlns:a="http://schemas.openxmlformats.org/drawingml/2006/main" xmlns:r="http://schemas.openxmlformats.org/officeDocument/2006/relationships" xmlns:p="http://schemas.openxmlformats.org/presentationml/2006/main">
-  <p:cSld>
-    <p:spTree>
-      <p:nvGrpSpPr>
-        <p:cNvPr id="1" name=""/>
-        <p:cNvGrpSpPr/>
-        <p:nvPr/>
-      </p:nvGrpSpPr>
-      <p:grpSpPr>
-        <a:xfrm>
-          <a:off x="0" y="0"/>
-          <a:ext cx="0" cy="0"/>
-          <a:chOff x="0" y="0"/>
-          <a:chExt cx="0" cy="0"/>
-        </a:xfrm>
-      </p:grpSpPr>
-      <p:sp>
-        <p:nvSpPr>
-          <p:cNvPr id="2" name="Title 1">
-            <a:extLst>
-              <a:ext uri="{FF2B5EF4-FFF2-40B4-BE49-F238E27FC236}">
-                <a16:creationId xmlns:a16="http://schemas.microsoft.com/office/drawing/2014/main" id="{3214BDEF-35E5-7F7B-D581-5A2A96C5A6C4}"/>
-              </a:ext>
-            </a:extLst>
-          </p:cNvPr>
-          <p:cNvSpPr>
-            <a:spLocks noGrp="1"/>
-          </p:cNvSpPr>
-          <p:nvPr>
-            <p:ph type="title"/>
-          </p:nvPr>
-        </p:nvSpPr>
-        <p:spPr/>
-        <p:txBody>
-          <a:bodyPr/>
-          <a:lstStyle/>
-          <a:p>
-            <a:r>
-              <a:rPr lang="en-US" dirty="0"/>
-              <a:t>Creating a new fork</a:t>
-            </a:r>
-          </a:p>
-        </p:txBody>
-      </p:sp>
-      <p:pic>
-        <p:nvPicPr>
-          <p:cNvPr id="4" name="Content Placeholder 3" descr="A screenshot of a computer&#10;&#10;Description automatically generated">
-            <a:extLst>
-              <a:ext uri="{FF2B5EF4-FFF2-40B4-BE49-F238E27FC236}">
-                <a16:creationId xmlns:a16="http://schemas.microsoft.com/office/drawing/2014/main" id="{95B761B1-FE14-82FA-1C4D-C5C9AAB85C93}"/>
-              </a:ext>
-            </a:extLst>
-          </p:cNvPr>
-          <p:cNvPicPr>
-            <a:picLocks noGrp="1" noChangeAspect="1"/>
-          </p:cNvPicPr>
-          <p:nvPr>
-            <p:ph idx="1"/>
-          </p:nvPr>
-        </p:nvPicPr>
-        <p:blipFill rotWithShape="1">
-          <a:blip r:embed="rId2">
-            <a:extLst>
-              <a:ext uri="{28A0092B-C50C-407E-A947-70E740481C1C}">
-                <a14:useLocalDpi xmlns:a14="http://schemas.microsoft.com/office/drawing/2010/main" val="0"/>
-              </a:ext>
-            </a:extLst>
-          </a:blip>
-          <a:srcRect t="3973" r="7436" b="3311"/>
-          <a:stretch/>
-        </p:blipFill>
-        <p:spPr bwMode="auto">
-          <a:xfrm>
-            <a:off x="1631516" y="1701416"/>
-            <a:ext cx="7407314" cy="5027444"/>
-          </a:xfrm>
-          <a:prstGeom prst="rect">
-            <a:avLst/>
-          </a:prstGeom>
-          <a:ln>
-            <a:noFill/>
-          </a:ln>
-          <a:extLst>
-            <a:ext uri="{53640926-AAD7-44D8-BBD7-CCE9431645EC}">
-              <a14:shadowObscured xmlns:a14="http://schemas.microsoft.com/office/drawing/2010/main"/>
-            </a:ext>
-          </a:extLst>
-        </p:spPr>
-      </p:pic>
-      <p:pic>
-        <p:nvPicPr>
-          <p:cNvPr id="5" name="Picture 4" descr="A screenshot of a computer&#10;&#10;Description automatically generated">
-            <a:extLst>
-              <a:ext uri="{FF2B5EF4-FFF2-40B4-BE49-F238E27FC236}">
-                <a16:creationId xmlns:a16="http://schemas.microsoft.com/office/drawing/2014/main" id="{92DB6C5C-3533-FD89-C508-2AB84CAD1B8F}"/>
-              </a:ext>
-            </a:extLst>
-          </p:cNvPr>
-          <p:cNvPicPr>
-            <a:picLocks noChangeAspect="1"/>
-          </p:cNvPicPr>
-          <p:nvPr/>
-        </p:nvPicPr>
-        <p:blipFill rotWithShape="1">
-          <a:blip r:embed="rId3">
-            <a:extLst>
-              <a:ext uri="{28A0092B-C50C-407E-A947-70E740481C1C}">
-                <a14:useLocalDpi xmlns:a14="http://schemas.microsoft.com/office/drawing/2010/main" val="0"/>
-              </a:ext>
-            </a:extLst>
-          </a:blip>
-          <a:srcRect t="17984"/>
-          <a:stretch/>
-        </p:blipFill>
-        <p:spPr bwMode="auto">
-          <a:xfrm>
-            <a:off x="6347894" y="861946"/>
-            <a:ext cx="4212590" cy="839470"/>
-          </a:xfrm>
-          <a:prstGeom prst="rect">
-            <a:avLst/>
-          </a:prstGeom>
-          <a:ln>
-            <a:noFill/>
-          </a:ln>
-          <a:extLst>
-            <a:ext uri="{53640926-AAD7-44D8-BBD7-CCE9431645EC}">
-              <a14:shadowObscured xmlns:a14="http://schemas.microsoft.com/office/drawing/2010/main"/>
-            </a:ext>
-          </a:extLst>
-        </p:spPr>
-      </p:pic>
-    </p:spTree>
-    <p:extLst>
-      <p:ext uri="{BB962C8B-B14F-4D97-AF65-F5344CB8AC3E}">
-        <p14:creationId xmlns:p14="http://schemas.microsoft.com/office/powerpoint/2010/main" val="1090958267"/>
-      </p:ext>
-    </p:extLst>
-  </p:cSld>
-  <p:clrMapOvr>
-    <a:masterClrMapping/>
-  </p:clrMapOvr>
-</p:sld>
-</file>
-
-<file path=ppt/slides/slide6.xml><?xml version="1.0" encoding="utf-8"?>
-<p:sld xmlns:a="http://schemas.openxmlformats.org/drawingml/2006/main" xmlns:r="http://schemas.openxmlformats.org/officeDocument/2006/relationships" xmlns:p="http://schemas.openxmlformats.org/presentationml/2006/main">
-  <p:cSld>
-    <p:spTree>
-      <p:nvGrpSpPr>
-        <p:cNvPr id="1" name=""/>
-        <p:cNvGrpSpPr/>
-        <p:nvPr/>
-      </p:nvGrpSpPr>
-      <p:grpSpPr>
-        <a:xfrm>
-          <a:off x="0" y="0"/>
-          <a:ext cx="0" cy="0"/>
-          <a:chOff x="0" y="0"/>
-          <a:chExt cx="0" cy="0"/>
-        </a:xfrm>
-      </p:grpSpPr>
-      <p:sp>
-        <p:nvSpPr>
-          <p:cNvPr id="2" name="Title 1">
-            <a:extLst>
-              <a:ext uri="{FF2B5EF4-FFF2-40B4-BE49-F238E27FC236}">
-                <a16:creationId xmlns:a16="http://schemas.microsoft.com/office/drawing/2014/main" id="{92C58C41-C61A-7763-BB10-006C092DFCC3}"/>
-              </a:ext>
-            </a:extLst>
-          </p:cNvPr>
-          <p:cNvSpPr>
-            <a:spLocks noGrp="1"/>
-          </p:cNvSpPr>
-          <p:nvPr>
-            <p:ph type="title"/>
-          </p:nvPr>
-        </p:nvSpPr>
-        <p:spPr/>
-        <p:txBody>
-          <a:bodyPr/>
-          <a:lstStyle/>
-          <a:p>
-            <a:r>
-              <a:rPr lang="en-US" dirty="0"/>
-              <a:t>Issues</a:t>
-            </a:r>
-          </a:p>
-        </p:txBody>
-      </p:sp>
-      <p:sp>
-        <p:nvSpPr>
-          <p:cNvPr id="3" name="Content Placeholder 2">
-            <a:extLst>
-              <a:ext uri="{FF2B5EF4-FFF2-40B4-BE49-F238E27FC236}">
-                <a16:creationId xmlns:a16="http://schemas.microsoft.com/office/drawing/2014/main" id="{4D901822-48EA-73DB-BCCA-0C20DB06CC14}"/>
-              </a:ext>
-            </a:extLst>
-          </p:cNvPr>
-          <p:cNvSpPr>
-            <a:spLocks noGrp="1"/>
-          </p:cNvSpPr>
-          <p:nvPr>
-            <p:ph idx="1"/>
-          </p:nvPr>
-        </p:nvSpPr>
-        <p:spPr/>
-        <p:txBody>
-          <a:bodyPr/>
-          <a:lstStyle/>
-          <a:p>
-            <a:r>
-              <a:rPr lang="en-US" dirty="0"/>
-              <a:t>Shall be from the back-log</a:t>
-            </a:r>
-          </a:p>
-          <a:p>
-            <a:r>
-              <a:rPr lang="en-US" dirty="0"/>
-              <a:t>Shall be associated to a DEV_ project</a:t>
-            </a:r>
-          </a:p>
-          <a:p>
-            <a:r>
-              <a:rPr lang="en-US" dirty="0"/>
-              <a:t>Shall be created on a DEV_ branch</a:t>
-            </a:r>
-          </a:p>
-          <a:p>
-            <a:r>
-              <a:rPr lang="en-US" dirty="0"/>
-              <a:t>Developer cannot close out issue without review</a:t>
-            </a:r>
-          </a:p>
-          <a:p>
-            <a:r>
-              <a:rPr lang="en-US" dirty="0"/>
-              <a:t>The reviewer shall close out the issue</a:t>
-            </a:r>
-          </a:p>
-          <a:p>
-            <a:r>
-              <a:rPr lang="en-US" dirty="0"/>
-              <a:t>Development shall be linked with a pull-request</a:t>
-            </a:r>
-          </a:p>
-        </p:txBody>
-      </p:sp>
-    </p:spTree>
-    <p:extLst>
-      <p:ext uri="{BB962C8B-B14F-4D97-AF65-F5344CB8AC3E}">
-        <p14:creationId xmlns:p14="http://schemas.microsoft.com/office/powerpoint/2010/main" val="882162805"/>
-      </p:ext>
-    </p:extLst>
-  </p:cSld>
-  <p:clrMapOvr>
-    <a:masterClrMapping/>
-  </p:clrMapOvr>
-</p:sld>
-</file>
-
-<file path=ppt/slides/slide7.xml><?xml version="1.0" encoding="utf-8"?>
-<p:sld xmlns:a="http://schemas.openxmlformats.org/drawingml/2006/main" xmlns:r="http://schemas.openxmlformats.org/officeDocument/2006/relationships" xmlns:p="http://schemas.openxmlformats.org/presentationml/2006/main">
-  <p:cSld>
-    <p:spTree>
-      <p:nvGrpSpPr>
-        <p:cNvPr id="1" name=""/>
-        <p:cNvGrpSpPr/>
-        <p:nvPr/>
-      </p:nvGrpSpPr>
-      <p:grpSpPr>
-        <a:xfrm>
-          <a:off x="0" y="0"/>
-          <a:ext cx="0" cy="0"/>
-          <a:chOff x="0" y="0"/>
-          <a:chExt cx="0" cy="0"/>
-        </a:xfrm>
-      </p:grpSpPr>
-      <p:sp>
-        <p:nvSpPr>
-          <p:cNvPr id="2" name="Title 1">
-            <a:extLst>
-              <a:ext uri="{FF2B5EF4-FFF2-40B4-BE49-F238E27FC236}">
-                <a16:creationId xmlns:a16="http://schemas.microsoft.com/office/drawing/2014/main" id="{92717FEA-3CDA-872C-1F54-E792FE648AB0}"/>
-              </a:ext>
-            </a:extLst>
-          </p:cNvPr>
-          <p:cNvSpPr>
-            <a:spLocks noGrp="1"/>
-          </p:cNvSpPr>
-          <p:nvPr>
-            <p:ph type="title"/>
-          </p:nvPr>
-        </p:nvSpPr>
-        <p:spPr/>
-        <p:txBody>
-          <a:bodyPr/>
-          <a:lstStyle/>
-          <a:p>
-            <a:r>
-              <a:rPr lang="en-US" dirty="0"/>
-              <a:t>Issues</a:t>
-            </a:r>
-          </a:p>
-        </p:txBody>
-      </p:sp>
-      <p:pic>
-        <p:nvPicPr>
-          <p:cNvPr id="4" name="Content Placeholder 3" descr="A screenshot of a computer&#10;&#10;Description automatically generated">
-            <a:extLst>
-              <a:ext uri="{FF2B5EF4-FFF2-40B4-BE49-F238E27FC236}">
-                <a16:creationId xmlns:a16="http://schemas.microsoft.com/office/drawing/2014/main" id="{97209A42-D360-EF95-B3DC-FE9A1B9D0077}"/>
-              </a:ext>
-            </a:extLst>
-          </p:cNvPr>
-          <p:cNvPicPr>
-            <a:picLocks noGrp="1" noChangeAspect="1"/>
-          </p:cNvPicPr>
-          <p:nvPr>
-            <p:ph idx="1"/>
-          </p:nvPr>
-        </p:nvPicPr>
-        <p:blipFill rotWithShape="1">
-          <a:blip r:embed="rId2" cstate="print">
-            <a:extLst>
-              <a:ext uri="{28A0092B-C50C-407E-A947-70E740481C1C}">
-                <a14:useLocalDpi xmlns:a14="http://schemas.microsoft.com/office/drawing/2010/main" val="0"/>
-              </a:ext>
-            </a:extLst>
-          </a:blip>
-          <a:srcRect l="2563" t="-274" r="128" b="274"/>
-          <a:stretch/>
-        </p:blipFill>
-        <p:spPr bwMode="auto">
-          <a:xfrm>
-            <a:off x="1259987" y="1658144"/>
-            <a:ext cx="9518870" cy="4581338"/>
-          </a:xfrm>
-          <a:prstGeom prst="rect">
-            <a:avLst/>
-          </a:prstGeom>
-          <a:ln>
-            <a:noFill/>
-          </a:ln>
-          <a:extLst>
-            <a:ext uri="{53640926-AAD7-44D8-BBD7-CCE9431645EC}">
-              <a14:shadowObscured xmlns:a14="http://schemas.microsoft.com/office/drawing/2010/main"/>
-            </a:ext>
-          </a:extLst>
-        </p:spPr>
-      </p:pic>
-    </p:spTree>
-    <p:extLst>
-      <p:ext uri="{BB962C8B-B14F-4D97-AF65-F5344CB8AC3E}">
-        <p14:creationId xmlns:p14="http://schemas.microsoft.com/office/powerpoint/2010/main" val="944698361"/>
-      </p:ext>
-    </p:extLst>
-  </p:cSld>
-  <p:clrMapOvr>
-    <a:masterClrMapping/>
-  </p:clrMapOvr>
-</p:sld>
-</file>
-
-<file path=ppt/slides/slide8.xml><?xml version="1.0" encoding="utf-8"?>
-<p:sld xmlns:a="http://schemas.openxmlformats.org/drawingml/2006/main" xmlns:r="http://schemas.openxmlformats.org/officeDocument/2006/relationships" xmlns:p="http://schemas.openxmlformats.org/presentationml/2006/main">
-  <p:cSld>
-    <p:spTree>
-      <p:nvGrpSpPr>
-        <p:cNvPr id="1" name=""/>
-        <p:cNvGrpSpPr/>
-        <p:nvPr/>
-      </p:nvGrpSpPr>
-      <p:grpSpPr>
-        <a:xfrm>
-          <a:off x="0" y="0"/>
-          <a:ext cx="0" cy="0"/>
-          <a:chOff x="0" y="0"/>
-          <a:chExt cx="0" cy="0"/>
-        </a:xfrm>
-      </p:grpSpPr>
-      <p:sp>
-        <p:nvSpPr>
-          <p:cNvPr id="2" name="Title 1">
-            <a:extLst>
-              <a:ext uri="{FF2B5EF4-FFF2-40B4-BE49-F238E27FC236}">
-                <a16:creationId xmlns:a16="http://schemas.microsoft.com/office/drawing/2014/main" id="{48DFBDBF-7B87-A11F-42DD-AC8E4F665B84}"/>
-              </a:ext>
-            </a:extLst>
-          </p:cNvPr>
-          <p:cNvSpPr>
-            <a:spLocks noGrp="1"/>
-          </p:cNvSpPr>
-          <p:nvPr>
-            <p:ph type="title"/>
-          </p:nvPr>
-        </p:nvSpPr>
-        <p:spPr/>
-        <p:txBody>
-          <a:bodyPr/>
-          <a:lstStyle/>
-          <a:p>
-            <a:r>
-              <a:rPr lang="en-US" dirty="0"/>
-              <a:t>Obtaining the codebase bash files</a:t>
-            </a:r>
-          </a:p>
-        </p:txBody>
-      </p:sp>
-      <p:sp>
-        <p:nvSpPr>
-          <p:cNvPr id="3" name="Content Placeholder 2">
-            <a:extLst>
-              <a:ext uri="{FF2B5EF4-FFF2-40B4-BE49-F238E27FC236}">
-                <a16:creationId xmlns:a16="http://schemas.microsoft.com/office/drawing/2014/main" id="{37004F8C-88EC-EEFA-7036-55B34A399328}"/>
-              </a:ext>
-            </a:extLst>
-          </p:cNvPr>
-          <p:cNvSpPr>
-            <a:spLocks noGrp="1"/>
-          </p:cNvSpPr>
-          <p:nvPr>
-            <p:ph idx="1"/>
-          </p:nvPr>
-        </p:nvSpPr>
-        <p:spPr/>
-        <p:txBody>
-          <a:bodyPr/>
-          <a:lstStyle/>
-          <a:p>
-            <a:endParaRPr lang="en-US" dirty="0"/>
-          </a:p>
-        </p:txBody>
-      </p:sp>
-    </p:spTree>
-    <p:extLst>
-      <p:ext uri="{BB962C8B-B14F-4D97-AF65-F5344CB8AC3E}">
-        <p14:creationId xmlns:p14="http://schemas.microsoft.com/office/powerpoint/2010/main" val="819485861"/>
       </p:ext>
     </p:extLst>
   </p:cSld>
@@ -14009,7 +15446,7 @@
           <p:cNvPr id="2" name="Title 1">
             <a:extLst>
               <a:ext uri="{FF2B5EF4-FFF2-40B4-BE49-F238E27FC236}">
-                <a16:creationId xmlns:a16="http://schemas.microsoft.com/office/drawing/2014/main" id="{940A8AC8-75DF-B1EF-EF4E-3B0B9AF067DA}"/>
+                <a16:creationId xmlns:a16="http://schemas.microsoft.com/office/drawing/2014/main" id="{8A9F7A48-AB86-2BE9-3939-F96156266CB7}"/>
               </a:ext>
             </a:extLst>
           </p:cNvPr>
@@ -14027,310 +15464,107 @@
           <a:p>
             <a:r>
               <a:rPr lang="en-US" dirty="0"/>
-              <a:t>Commits in bash</a:t>
+              <a:t>Bash scripts to call for new development</a:t>
+            </a:r>
+          </a:p>
+        </p:txBody>
+      </p:sp>
+      <p:sp>
+        <p:nvSpPr>
+          <p:cNvPr id="3" name="Content Placeholder 2">
+            <a:extLst>
+              <a:ext uri="{FF2B5EF4-FFF2-40B4-BE49-F238E27FC236}">
+                <a16:creationId xmlns:a16="http://schemas.microsoft.com/office/drawing/2014/main" id="{560E46F6-2C1C-38E4-F921-833EDCE9FF65}"/>
+              </a:ext>
+            </a:extLst>
+          </p:cNvPr>
+          <p:cNvSpPr>
+            <a:spLocks noGrp="1"/>
+          </p:cNvSpPr>
+          <p:nvPr>
+            <p:ph idx="1"/>
+          </p:nvPr>
+        </p:nvSpPr>
+        <p:spPr/>
+        <p:txBody>
+          <a:bodyPr/>
+          <a:lstStyle/>
+          <a:p>
+            <a:r>
+              <a:rPr lang="en-US" dirty="0"/>
+              <a:t>Delete the files within and keep the  main folders</a:t>
+            </a:r>
+          </a:p>
+          <a:p>
+            <a:r>
+              <a:rPr lang="en-US" dirty="0"/>
+              <a:t>From VS7ZARBC call a git bash here</a:t>
             </a:r>
           </a:p>
         </p:txBody>
       </p:sp>
       <p:pic>
         <p:nvPicPr>
-          <p:cNvPr id="5" name="Content Placeholder 4">
+          <p:cNvPr id="5" name="Picture 4">
             <a:extLst>
               <a:ext uri="{FF2B5EF4-FFF2-40B4-BE49-F238E27FC236}">
-                <a16:creationId xmlns:a16="http://schemas.microsoft.com/office/drawing/2014/main" id="{F8560C1A-7386-18D9-9A51-B40E593F25C8}"/>
+                <a16:creationId xmlns:a16="http://schemas.microsoft.com/office/drawing/2014/main" id="{C175FC0D-A2F9-9DE7-8436-033C31F01F93}"/>
               </a:ext>
             </a:extLst>
           </p:cNvPr>
           <p:cNvPicPr>
-            <a:picLocks noGrp="1" noChangeAspect="1"/>
+            <a:picLocks noChangeAspect="1"/>
           </p:cNvPicPr>
-          <p:nvPr>
-            <p:ph idx="1"/>
-          </p:nvPr>
+          <p:nvPr/>
         </p:nvPicPr>
         <p:blipFill>
           <a:blip r:embed="rId2"/>
-          <a:stretch>
-            <a:fillRect/>
-          </a:stretch>
+          <a:srcRect l="6692"/>
+          <a:stretch/>
         </p:blipFill>
         <p:spPr>
           <a:xfrm>
-            <a:off x="5160397" y="1948875"/>
-            <a:ext cx="6782497" cy="2761445"/>
-          </a:xfrm>
-        </p:spPr>
-      </p:pic>
-      <p:sp>
-        <p:nvSpPr>
-          <p:cNvPr id="6" name="TextBox 5">
-            <a:extLst>
-              <a:ext uri="{FF2B5EF4-FFF2-40B4-BE49-F238E27FC236}">
-                <a16:creationId xmlns:a16="http://schemas.microsoft.com/office/drawing/2014/main" id="{4B3908E8-E7C2-0A08-F649-4D1054BB9D7F}"/>
-              </a:ext>
-            </a:extLst>
-          </p:cNvPr>
-          <p:cNvSpPr txBox="1"/>
-          <p:nvPr/>
-        </p:nvSpPr>
-        <p:spPr>
-          <a:xfrm>
-            <a:off x="730370" y="2097088"/>
-            <a:ext cx="4268797" cy="3162019"/>
+            <a:off x="7555832" y="2097088"/>
+            <a:ext cx="4636168" cy="1996613"/>
           </a:xfrm>
           <a:prstGeom prst="rect">
             <a:avLst/>
           </a:prstGeom>
-          <a:noFill/>
         </p:spPr>
-        <p:txBody>
-          <a:bodyPr wrap="none" rtlCol="0">
-            <a:spAutoFit/>
-          </a:bodyPr>
-          <a:lstStyle/>
-          <a:p>
-            <a:pPr marL="0" marR="0">
-              <a:lnSpc>
-                <a:spcPct val="107000"/>
-              </a:lnSpc>
-              <a:spcBef>
-                <a:spcPts val="0"/>
-              </a:spcBef>
-              <a:spcAft>
-                <a:spcPts val="800"/>
-              </a:spcAft>
-            </a:pPr>
-            <a:r>
-              <a:rPr lang="en-US" sz="1800" i="1" kern="100" dirty="0">
-                <a:effectLst/>
-                <a:latin typeface="Aptos" panose="020B0004020202020204" pitchFamily="34" charset="0"/>
-                <a:ea typeface="Aptos" panose="020B0004020202020204" pitchFamily="34" charset="0"/>
-                <a:cs typeface="Times New Roman" panose="02020603050405020304" pitchFamily="18" charset="0"/>
-              </a:rPr>
-              <a:t>git </a:t>
-            </a:r>
-            <a:r>
-              <a:rPr lang="en-US" sz="1800" i="1" kern="100" dirty="0" err="1">
-                <a:effectLst/>
-                <a:latin typeface="Aptos" panose="020B0004020202020204" pitchFamily="34" charset="0"/>
-                <a:ea typeface="Aptos" panose="020B0004020202020204" pitchFamily="34" charset="0"/>
-                <a:cs typeface="Times New Roman" panose="02020603050405020304" pitchFamily="18" charset="0"/>
-              </a:rPr>
-              <a:t>init</a:t>
-            </a:r>
-            <a:r>
-              <a:rPr lang="en-US" sz="1800" i="1" kern="100" dirty="0">
-                <a:effectLst/>
-                <a:latin typeface="Aptos" panose="020B0004020202020204" pitchFamily="34" charset="0"/>
-                <a:ea typeface="Aptos" panose="020B0004020202020204" pitchFamily="34" charset="0"/>
-                <a:cs typeface="Times New Roman" panose="02020603050405020304" pitchFamily="18" charset="0"/>
-              </a:rPr>
-              <a:t> -b &lt;name of the local branch&gt;</a:t>
-            </a:r>
-            <a:endParaRPr lang="en-US" sz="1800" kern="100" dirty="0">
-              <a:effectLst/>
-              <a:latin typeface="Aptos" panose="020B0004020202020204" pitchFamily="34" charset="0"/>
-              <a:ea typeface="Aptos" panose="020B0004020202020204" pitchFamily="34" charset="0"/>
-              <a:cs typeface="Times New Roman" panose="02020603050405020304" pitchFamily="18" charset="0"/>
-            </a:endParaRPr>
-          </a:p>
-          <a:p>
-            <a:pPr marL="0" marR="0">
-              <a:lnSpc>
-                <a:spcPct val="107000"/>
-              </a:lnSpc>
-              <a:spcBef>
-                <a:spcPts val="0"/>
-              </a:spcBef>
-              <a:spcAft>
-                <a:spcPts val="800"/>
-              </a:spcAft>
-            </a:pPr>
-            <a:r>
-              <a:rPr lang="en-US" sz="1800" i="1" kern="100" dirty="0">
-                <a:effectLst/>
-                <a:latin typeface="Aptos" panose="020B0004020202020204" pitchFamily="34" charset="0"/>
-                <a:ea typeface="Aptos" panose="020B0004020202020204" pitchFamily="34" charset="0"/>
-                <a:cs typeface="Times New Roman" panose="02020603050405020304" pitchFamily="18" charset="0"/>
-              </a:rPr>
-              <a:t>Git checkout -b &lt;name of branch&gt;</a:t>
-            </a:r>
-            <a:endParaRPr lang="en-US" sz="1800" kern="100" dirty="0">
-              <a:effectLst/>
-              <a:latin typeface="Aptos" panose="020B0004020202020204" pitchFamily="34" charset="0"/>
-              <a:ea typeface="Aptos" panose="020B0004020202020204" pitchFamily="34" charset="0"/>
-              <a:cs typeface="Times New Roman" panose="02020603050405020304" pitchFamily="18" charset="0"/>
-            </a:endParaRPr>
-          </a:p>
-          <a:p>
-            <a:pPr marL="0" marR="0">
-              <a:lnSpc>
-                <a:spcPct val="107000"/>
-              </a:lnSpc>
-              <a:spcBef>
-                <a:spcPts val="0"/>
-              </a:spcBef>
-              <a:spcAft>
-                <a:spcPts val="800"/>
-              </a:spcAft>
-            </a:pPr>
-            <a:r>
-              <a:rPr lang="en-US" sz="1800" kern="100" dirty="0">
-                <a:effectLst/>
-                <a:latin typeface="Aptos" panose="020B0004020202020204" pitchFamily="34" charset="0"/>
-                <a:ea typeface="Aptos" panose="020B0004020202020204" pitchFamily="34" charset="0"/>
-                <a:cs typeface="Times New Roman" panose="02020603050405020304" pitchFamily="18" charset="0"/>
-              </a:rPr>
-              <a:t>Add the files to your current local Branch:</a:t>
-            </a:r>
-          </a:p>
-          <a:p>
-            <a:pPr marL="0" marR="0">
-              <a:lnSpc>
-                <a:spcPct val="107000"/>
-              </a:lnSpc>
-              <a:spcBef>
-                <a:spcPts val="0"/>
-              </a:spcBef>
-              <a:spcAft>
-                <a:spcPts val="800"/>
-              </a:spcAft>
-            </a:pPr>
-            <a:r>
-              <a:rPr lang="en-US" sz="1800" i="1" kern="100" dirty="0">
-                <a:effectLst/>
-                <a:latin typeface="Aptos" panose="020B0004020202020204" pitchFamily="34" charset="0"/>
-                <a:ea typeface="Aptos" panose="020B0004020202020204" pitchFamily="34" charset="0"/>
-                <a:cs typeface="Times New Roman" panose="02020603050405020304" pitchFamily="18" charset="0"/>
-              </a:rPr>
-              <a:t>git add .</a:t>
-            </a:r>
-            <a:endParaRPr lang="en-US" sz="1800" kern="100" dirty="0">
-              <a:effectLst/>
-              <a:latin typeface="Aptos" panose="020B0004020202020204" pitchFamily="34" charset="0"/>
-              <a:ea typeface="Aptos" panose="020B0004020202020204" pitchFamily="34" charset="0"/>
-              <a:cs typeface="Times New Roman" panose="02020603050405020304" pitchFamily="18" charset="0"/>
-            </a:endParaRPr>
-          </a:p>
-          <a:p>
-            <a:pPr marL="0" marR="0">
-              <a:lnSpc>
-                <a:spcPct val="107000"/>
-              </a:lnSpc>
-              <a:spcBef>
-                <a:spcPts val="0"/>
-              </a:spcBef>
-              <a:spcAft>
-                <a:spcPts val="800"/>
-              </a:spcAft>
-            </a:pPr>
-            <a:r>
-              <a:rPr lang="en-US" sz="1800" i="1" kern="100" dirty="0">
-                <a:effectLst/>
-                <a:latin typeface="Aptos" panose="020B0004020202020204" pitchFamily="34" charset="0"/>
-                <a:ea typeface="Aptos" panose="020B0004020202020204" pitchFamily="34" charset="0"/>
-                <a:cs typeface="Times New Roman" panose="02020603050405020304" pitchFamily="18" charset="0"/>
-              </a:rPr>
-              <a:t>git commit -m “&lt;</a:t>
-            </a:r>
-            <a:r>
-              <a:rPr lang="en-US" sz="1800" i="1" kern="100" dirty="0" err="1">
-                <a:effectLst/>
-                <a:latin typeface="Aptos" panose="020B0004020202020204" pitchFamily="34" charset="0"/>
-                <a:ea typeface="Aptos" panose="020B0004020202020204" pitchFamily="34" charset="0"/>
-                <a:cs typeface="Times New Roman" panose="02020603050405020304" pitchFamily="18" charset="0"/>
-              </a:rPr>
-              <a:t>DEV_</a:t>
-            </a:r>
-            <a:r>
-              <a:rPr lang="en-US" i="1" kern="100" dirty="0" err="1">
-                <a:latin typeface="Aptos" panose="020B0004020202020204" pitchFamily="34" charset="0"/>
-                <a:ea typeface="Aptos" panose="020B0004020202020204" pitchFamily="34" charset="0"/>
-                <a:cs typeface="Times New Roman" panose="02020603050405020304" pitchFamily="18" charset="0"/>
-              </a:rPr>
-              <a:t>note</a:t>
-            </a:r>
-            <a:r>
-              <a:rPr lang="en-US" sz="1800" i="1" kern="100" dirty="0">
-                <a:effectLst/>
-                <a:latin typeface="Aptos" panose="020B0004020202020204" pitchFamily="34" charset="0"/>
-                <a:ea typeface="Aptos" panose="020B0004020202020204" pitchFamily="34" charset="0"/>
-                <a:cs typeface="Times New Roman" panose="02020603050405020304" pitchFamily="18" charset="0"/>
-              </a:rPr>
-              <a:t>&gt;”</a:t>
-            </a:r>
-            <a:endParaRPr lang="en-US" sz="1800" kern="100" dirty="0">
-              <a:effectLst/>
-              <a:latin typeface="Aptos" panose="020B0004020202020204" pitchFamily="34" charset="0"/>
-              <a:ea typeface="Aptos" panose="020B0004020202020204" pitchFamily="34" charset="0"/>
-              <a:cs typeface="Times New Roman" panose="02020603050405020304" pitchFamily="18" charset="0"/>
-            </a:endParaRPr>
-          </a:p>
-          <a:p>
-            <a:pPr marL="0" marR="0">
-              <a:lnSpc>
-                <a:spcPct val="107000"/>
-              </a:lnSpc>
-              <a:spcBef>
-                <a:spcPts val="0"/>
-              </a:spcBef>
-              <a:spcAft>
-                <a:spcPts val="800"/>
-              </a:spcAft>
-            </a:pPr>
-            <a:r>
-              <a:rPr lang="en-US" sz="1800" i="1" kern="100" dirty="0">
-                <a:effectLst/>
-                <a:latin typeface="Aptos" panose="020B0004020202020204" pitchFamily="34" charset="0"/>
-                <a:ea typeface="Aptos" panose="020B0004020202020204" pitchFamily="34" charset="0"/>
-                <a:cs typeface="Times New Roman" panose="02020603050405020304" pitchFamily="18" charset="0"/>
-              </a:rPr>
-              <a:t>git remote add &lt;name&gt; &lt;URL fork link&gt;</a:t>
-            </a:r>
-            <a:endParaRPr lang="en-US" sz="1800" kern="100" dirty="0">
-              <a:effectLst/>
-              <a:latin typeface="Aptos" panose="020B0004020202020204" pitchFamily="34" charset="0"/>
-              <a:ea typeface="Aptos" panose="020B0004020202020204" pitchFamily="34" charset="0"/>
-              <a:cs typeface="Times New Roman" panose="02020603050405020304" pitchFamily="18" charset="0"/>
-            </a:endParaRPr>
-          </a:p>
-          <a:p>
-            <a:pPr marL="0" marR="0">
-              <a:lnSpc>
-                <a:spcPct val="107000"/>
-              </a:lnSpc>
-              <a:spcBef>
-                <a:spcPts val="0"/>
-              </a:spcBef>
-              <a:spcAft>
-                <a:spcPts val="800"/>
-              </a:spcAft>
-            </a:pPr>
-            <a:r>
-              <a:rPr lang="en-US" sz="1800" i="1" kern="100" dirty="0">
-                <a:effectLst/>
-                <a:latin typeface="Aptos" panose="020B0004020202020204" pitchFamily="34" charset="0"/>
-                <a:ea typeface="Aptos" panose="020B0004020202020204" pitchFamily="34" charset="0"/>
-                <a:cs typeface="Times New Roman" panose="02020603050405020304" pitchFamily="18" charset="0"/>
-              </a:rPr>
-              <a:t>git push &lt;remote&gt; &lt;branch&gt;</a:t>
-            </a:r>
-            <a:endParaRPr lang="en-US" sz="1800" kern="100" dirty="0">
-              <a:effectLst/>
-              <a:latin typeface="Aptos" panose="020B0004020202020204" pitchFamily="34" charset="0"/>
-              <a:ea typeface="Aptos" panose="020B0004020202020204" pitchFamily="34" charset="0"/>
-              <a:cs typeface="Times New Roman" panose="02020603050405020304" pitchFamily="18" charset="0"/>
-            </a:endParaRPr>
-          </a:p>
-          <a:p>
-            <a:endParaRPr lang="en-US" dirty="0"/>
-          </a:p>
-        </p:txBody>
-      </p:sp>
+      </p:pic>
+      <p:pic>
+        <p:nvPicPr>
+          <p:cNvPr id="7" name="Picture 6">
+            <a:extLst>
+              <a:ext uri="{FF2B5EF4-FFF2-40B4-BE49-F238E27FC236}">
+                <a16:creationId xmlns:a16="http://schemas.microsoft.com/office/drawing/2014/main" id="{78D65101-9341-7C7A-31D7-C3B092D33495}"/>
+              </a:ext>
+            </a:extLst>
+          </p:cNvPr>
+          <p:cNvPicPr>
+            <a:picLocks noChangeAspect="1"/>
+          </p:cNvPicPr>
+          <p:nvPr/>
+        </p:nvPicPr>
+        <p:blipFill>
+          <a:blip r:embed="rId3"/>
+          <a:srcRect b="36573"/>
+          <a:stretch/>
+        </p:blipFill>
+        <p:spPr>
+          <a:xfrm>
+            <a:off x="845833" y="3429000"/>
+            <a:ext cx="6264183" cy="3296477"/>
+          </a:xfrm>
+          <a:prstGeom prst="rect">
+            <a:avLst/>
+          </a:prstGeom>
+        </p:spPr>
+      </p:pic>
     </p:spTree>
     <p:extLst>
       <p:ext uri="{BB962C8B-B14F-4D97-AF65-F5344CB8AC3E}">
-        <p14:creationId xmlns:p14="http://schemas.microsoft.com/office/powerpoint/2010/main" val="3641515971"/>
+        <p14:creationId xmlns:p14="http://schemas.microsoft.com/office/powerpoint/2010/main" val="2374872806"/>
       </p:ext>
     </p:extLst>
   </p:cSld>

</xml_diff>